<commit_message>
changed frontend to Beta polar angle
</commit_message>
<xml_diff>
--- a/out/pictures.pptx
+++ b/out/pictures.pptx
@@ -4,6 +4,9 @@
   <p:sldMasterIdLst>
     <p:sldMasterId id="2147483648" r:id="rId1"/>
   </p:sldMasterIdLst>
+  <p:notesMasterIdLst>
+    <p:notesMasterId r:id="rId4"/>
+  </p:notesMasterIdLst>
   <p:sldIdLst>
     <p:sldId id="256" r:id="rId2"/>
     <p:sldId id="257" r:id="rId3"/>
@@ -124,6 +127,439 @@
 </p:presentation>
 </file>
 
+<file path=ppt/notesMasters/notesMaster1.xml><?xml version="1.0" encoding="utf-8"?>
+<p:notesMaster xmlns:a="http://schemas.openxmlformats.org/drawingml/2006/main" xmlns:r="http://schemas.openxmlformats.org/officeDocument/2006/relationships" xmlns:p="http://schemas.openxmlformats.org/presentationml/2006/main">
+  <p:cSld>
+    <p:bg>
+      <p:bgRef idx="1001">
+        <a:schemeClr val="bg1"/>
+      </p:bgRef>
+    </p:bg>
+    <p:spTree>
+      <p:nvGrpSpPr>
+        <p:cNvPr id="1" name=""/>
+        <p:cNvGrpSpPr/>
+        <p:nvPr/>
+      </p:nvGrpSpPr>
+      <p:grpSpPr>
+        <a:xfrm>
+          <a:off x="0" y="0"/>
+          <a:ext cx="0" cy="0"/>
+          <a:chOff x="0" y="0"/>
+          <a:chExt cx="0" cy="0"/>
+        </a:xfrm>
+      </p:grpSpPr>
+      <p:sp>
+        <p:nvSpPr>
+          <p:cNvPr id="2" name="Верхний колонтитул 1"/>
+          <p:cNvSpPr>
+            <a:spLocks noGrp="1"/>
+          </p:cNvSpPr>
+          <p:nvPr>
+            <p:ph type="hdr" sz="quarter"/>
+          </p:nvPr>
+        </p:nvSpPr>
+        <p:spPr>
+          <a:xfrm>
+            <a:off x="0" y="0"/>
+            <a:ext cx="2971800" cy="458788"/>
+          </a:xfrm>
+          <a:prstGeom prst="rect">
+            <a:avLst/>
+          </a:prstGeom>
+        </p:spPr>
+        <p:txBody>
+          <a:bodyPr vert="horz" lIns="91440" tIns="45720" rIns="91440" bIns="45720" rtlCol="0"/>
+          <a:lstStyle>
+            <a:lvl1pPr algn="l">
+              <a:defRPr sz="1200"/>
+            </a:lvl1pPr>
+          </a:lstStyle>
+          <a:p>
+            <a:endParaRPr lang="ru-RU"/>
+          </a:p>
+        </p:txBody>
+      </p:sp>
+      <p:sp>
+        <p:nvSpPr>
+          <p:cNvPr id="3" name="Дата 2"/>
+          <p:cNvSpPr>
+            <a:spLocks noGrp="1"/>
+          </p:cNvSpPr>
+          <p:nvPr>
+            <p:ph type="dt" idx="1"/>
+          </p:nvPr>
+        </p:nvSpPr>
+        <p:spPr>
+          <a:xfrm>
+            <a:off x="3884613" y="0"/>
+            <a:ext cx="2971800" cy="458788"/>
+          </a:xfrm>
+          <a:prstGeom prst="rect">
+            <a:avLst/>
+          </a:prstGeom>
+        </p:spPr>
+        <p:txBody>
+          <a:bodyPr vert="horz" lIns="91440" tIns="45720" rIns="91440" bIns="45720" rtlCol="0"/>
+          <a:lstStyle>
+            <a:lvl1pPr algn="r">
+              <a:defRPr sz="1200"/>
+            </a:lvl1pPr>
+          </a:lstStyle>
+          <a:p>
+            <a:fld id="{DF6124F9-195E-453D-9F90-F9370D18DA72}" type="datetimeFigureOut">
+              <a:rPr lang="ru-RU" smtClean="0"/>
+              <a:t>02.12.2023</a:t>
+            </a:fld>
+            <a:endParaRPr lang="ru-RU"/>
+          </a:p>
+        </p:txBody>
+      </p:sp>
+      <p:sp>
+        <p:nvSpPr>
+          <p:cNvPr id="4" name="Образ слайда 3"/>
+          <p:cNvSpPr>
+            <a:spLocks noGrp="1" noRot="1" noChangeAspect="1"/>
+          </p:cNvSpPr>
+          <p:nvPr>
+            <p:ph type="sldImg" idx="2"/>
+          </p:nvPr>
+        </p:nvSpPr>
+        <p:spPr>
+          <a:xfrm>
+            <a:off x="685800" y="1143000"/>
+            <a:ext cx="5486400" cy="3086100"/>
+          </a:xfrm>
+          <a:prstGeom prst="rect">
+            <a:avLst/>
+          </a:prstGeom>
+          <a:noFill/>
+          <a:ln w="12700">
+            <a:solidFill>
+              <a:prstClr val="black"/>
+            </a:solidFill>
+          </a:ln>
+        </p:spPr>
+        <p:txBody>
+          <a:bodyPr vert="horz" lIns="91440" tIns="45720" rIns="91440" bIns="45720" rtlCol="0" anchor="ctr"/>
+          <a:lstStyle/>
+          <a:p>
+            <a:endParaRPr lang="ru-RU"/>
+          </a:p>
+        </p:txBody>
+      </p:sp>
+      <p:sp>
+        <p:nvSpPr>
+          <p:cNvPr id="5" name="Заметки 4"/>
+          <p:cNvSpPr>
+            <a:spLocks noGrp="1"/>
+          </p:cNvSpPr>
+          <p:nvPr>
+            <p:ph type="body" sz="quarter" idx="3"/>
+          </p:nvPr>
+        </p:nvSpPr>
+        <p:spPr>
+          <a:xfrm>
+            <a:off x="685800" y="4400550"/>
+            <a:ext cx="5486400" cy="3600450"/>
+          </a:xfrm>
+          <a:prstGeom prst="rect">
+            <a:avLst/>
+          </a:prstGeom>
+        </p:spPr>
+        <p:txBody>
+          <a:bodyPr vert="horz" lIns="91440" tIns="45720" rIns="91440" bIns="45720" rtlCol="0"/>
+          <a:lstStyle/>
+          <a:p>
+            <a:pPr lvl="0"/>
+            <a:r>
+              <a:rPr lang="ru-RU"/>
+              <a:t>Образец текста</a:t>
+            </a:r>
+          </a:p>
+          <a:p>
+            <a:pPr lvl="1"/>
+            <a:r>
+              <a:rPr lang="ru-RU"/>
+              <a:t>Второй уровень</a:t>
+            </a:r>
+          </a:p>
+          <a:p>
+            <a:pPr lvl="2"/>
+            <a:r>
+              <a:rPr lang="ru-RU"/>
+              <a:t>Третий уровень</a:t>
+            </a:r>
+          </a:p>
+          <a:p>
+            <a:pPr lvl="3"/>
+            <a:r>
+              <a:rPr lang="ru-RU"/>
+              <a:t>Четвертый уровень</a:t>
+            </a:r>
+          </a:p>
+          <a:p>
+            <a:pPr lvl="4"/>
+            <a:r>
+              <a:rPr lang="ru-RU"/>
+              <a:t>Пятый уровень</a:t>
+            </a:r>
+          </a:p>
+        </p:txBody>
+      </p:sp>
+      <p:sp>
+        <p:nvSpPr>
+          <p:cNvPr id="6" name="Нижний колонтитул 5"/>
+          <p:cNvSpPr>
+            <a:spLocks noGrp="1"/>
+          </p:cNvSpPr>
+          <p:nvPr>
+            <p:ph type="ftr" sz="quarter" idx="4"/>
+          </p:nvPr>
+        </p:nvSpPr>
+        <p:spPr>
+          <a:xfrm>
+            <a:off x="0" y="8685213"/>
+            <a:ext cx="2971800" cy="458787"/>
+          </a:xfrm>
+          <a:prstGeom prst="rect">
+            <a:avLst/>
+          </a:prstGeom>
+        </p:spPr>
+        <p:txBody>
+          <a:bodyPr vert="horz" lIns="91440" tIns="45720" rIns="91440" bIns="45720" rtlCol="0" anchor="b"/>
+          <a:lstStyle>
+            <a:lvl1pPr algn="l">
+              <a:defRPr sz="1200"/>
+            </a:lvl1pPr>
+          </a:lstStyle>
+          <a:p>
+            <a:endParaRPr lang="ru-RU"/>
+          </a:p>
+        </p:txBody>
+      </p:sp>
+      <p:sp>
+        <p:nvSpPr>
+          <p:cNvPr id="7" name="Номер слайда 6"/>
+          <p:cNvSpPr>
+            <a:spLocks noGrp="1"/>
+          </p:cNvSpPr>
+          <p:nvPr>
+            <p:ph type="sldNum" sz="quarter" idx="5"/>
+          </p:nvPr>
+        </p:nvSpPr>
+        <p:spPr>
+          <a:xfrm>
+            <a:off x="3884613" y="8685213"/>
+            <a:ext cx="2971800" cy="458787"/>
+          </a:xfrm>
+          <a:prstGeom prst="rect">
+            <a:avLst/>
+          </a:prstGeom>
+        </p:spPr>
+        <p:txBody>
+          <a:bodyPr vert="horz" lIns="91440" tIns="45720" rIns="91440" bIns="45720" rtlCol="0" anchor="b"/>
+          <a:lstStyle>
+            <a:lvl1pPr algn="r">
+              <a:defRPr sz="1200"/>
+            </a:lvl1pPr>
+          </a:lstStyle>
+          <a:p>
+            <a:fld id="{3A84656C-4896-42D5-839D-B66A23BDAB1A}" type="slidenum">
+              <a:rPr lang="ru-RU" smtClean="0"/>
+              <a:t>‹#›</a:t>
+            </a:fld>
+            <a:endParaRPr lang="ru-RU"/>
+          </a:p>
+        </p:txBody>
+      </p:sp>
+    </p:spTree>
+    <p:extLst>
+      <p:ext uri="{BB962C8B-B14F-4D97-AF65-F5344CB8AC3E}">
+        <p14:creationId xmlns:p14="http://schemas.microsoft.com/office/powerpoint/2010/main" val="1862521949"/>
+      </p:ext>
+    </p:extLst>
+  </p:cSld>
+  <p:clrMap bg1="lt1" tx1="dk1" bg2="lt2" tx2="dk2" accent1="accent1" accent2="accent2" accent3="accent3" accent4="accent4" accent5="accent5" accent6="accent6" hlink="hlink" folHlink="folHlink"/>
+  <p:notesStyle>
+    <a:lvl1pPr marL="0" algn="l" defTabSz="914400" rtl="0" eaLnBrk="1" latinLnBrk="0" hangingPunct="1">
+      <a:defRPr sz="1200" kern="1200">
+        <a:solidFill>
+          <a:schemeClr val="tx1"/>
+        </a:solidFill>
+        <a:latin typeface="+mn-lt"/>
+        <a:ea typeface="+mn-ea"/>
+        <a:cs typeface="+mn-cs"/>
+      </a:defRPr>
+    </a:lvl1pPr>
+    <a:lvl2pPr marL="457200" algn="l" defTabSz="914400" rtl="0" eaLnBrk="1" latinLnBrk="0" hangingPunct="1">
+      <a:defRPr sz="1200" kern="1200">
+        <a:solidFill>
+          <a:schemeClr val="tx1"/>
+        </a:solidFill>
+        <a:latin typeface="+mn-lt"/>
+        <a:ea typeface="+mn-ea"/>
+        <a:cs typeface="+mn-cs"/>
+      </a:defRPr>
+    </a:lvl2pPr>
+    <a:lvl3pPr marL="914400" algn="l" defTabSz="914400" rtl="0" eaLnBrk="1" latinLnBrk="0" hangingPunct="1">
+      <a:defRPr sz="1200" kern="1200">
+        <a:solidFill>
+          <a:schemeClr val="tx1"/>
+        </a:solidFill>
+        <a:latin typeface="+mn-lt"/>
+        <a:ea typeface="+mn-ea"/>
+        <a:cs typeface="+mn-cs"/>
+      </a:defRPr>
+    </a:lvl3pPr>
+    <a:lvl4pPr marL="1371600" algn="l" defTabSz="914400" rtl="0" eaLnBrk="1" latinLnBrk="0" hangingPunct="1">
+      <a:defRPr sz="1200" kern="1200">
+        <a:solidFill>
+          <a:schemeClr val="tx1"/>
+        </a:solidFill>
+        <a:latin typeface="+mn-lt"/>
+        <a:ea typeface="+mn-ea"/>
+        <a:cs typeface="+mn-cs"/>
+      </a:defRPr>
+    </a:lvl4pPr>
+    <a:lvl5pPr marL="1828800" algn="l" defTabSz="914400" rtl="0" eaLnBrk="1" latinLnBrk="0" hangingPunct="1">
+      <a:defRPr sz="1200" kern="1200">
+        <a:solidFill>
+          <a:schemeClr val="tx1"/>
+        </a:solidFill>
+        <a:latin typeface="+mn-lt"/>
+        <a:ea typeface="+mn-ea"/>
+        <a:cs typeface="+mn-cs"/>
+      </a:defRPr>
+    </a:lvl5pPr>
+    <a:lvl6pPr marL="2286000" algn="l" defTabSz="914400" rtl="0" eaLnBrk="1" latinLnBrk="0" hangingPunct="1">
+      <a:defRPr sz="1200" kern="1200">
+        <a:solidFill>
+          <a:schemeClr val="tx1"/>
+        </a:solidFill>
+        <a:latin typeface="+mn-lt"/>
+        <a:ea typeface="+mn-ea"/>
+        <a:cs typeface="+mn-cs"/>
+      </a:defRPr>
+    </a:lvl6pPr>
+    <a:lvl7pPr marL="2743200" algn="l" defTabSz="914400" rtl="0" eaLnBrk="1" latinLnBrk="0" hangingPunct="1">
+      <a:defRPr sz="1200" kern="1200">
+        <a:solidFill>
+          <a:schemeClr val="tx1"/>
+        </a:solidFill>
+        <a:latin typeface="+mn-lt"/>
+        <a:ea typeface="+mn-ea"/>
+        <a:cs typeface="+mn-cs"/>
+      </a:defRPr>
+    </a:lvl7pPr>
+    <a:lvl8pPr marL="3200400" algn="l" defTabSz="914400" rtl="0" eaLnBrk="1" latinLnBrk="0" hangingPunct="1">
+      <a:defRPr sz="1200" kern="1200">
+        <a:solidFill>
+          <a:schemeClr val="tx1"/>
+        </a:solidFill>
+        <a:latin typeface="+mn-lt"/>
+        <a:ea typeface="+mn-ea"/>
+        <a:cs typeface="+mn-cs"/>
+      </a:defRPr>
+    </a:lvl8pPr>
+    <a:lvl9pPr marL="3657600" algn="l" defTabSz="914400" rtl="0" eaLnBrk="1" latinLnBrk="0" hangingPunct="1">
+      <a:defRPr sz="1200" kern="1200">
+        <a:solidFill>
+          <a:schemeClr val="tx1"/>
+        </a:solidFill>
+        <a:latin typeface="+mn-lt"/>
+        <a:ea typeface="+mn-ea"/>
+        <a:cs typeface="+mn-cs"/>
+      </a:defRPr>
+    </a:lvl9pPr>
+  </p:notesStyle>
+</p:notesMaster>
+</file>
+
+<file path=ppt/notesSlides/notesSlide1.xml><?xml version="1.0" encoding="utf-8"?>
+<p:notes xmlns:a="http://schemas.openxmlformats.org/drawingml/2006/main" xmlns:r="http://schemas.openxmlformats.org/officeDocument/2006/relationships" xmlns:p="http://schemas.openxmlformats.org/presentationml/2006/main">
+  <p:cSld>
+    <p:spTree>
+      <p:nvGrpSpPr>
+        <p:cNvPr id="1" name=""/>
+        <p:cNvGrpSpPr/>
+        <p:nvPr/>
+      </p:nvGrpSpPr>
+      <p:grpSpPr>
+        <a:xfrm>
+          <a:off x="0" y="0"/>
+          <a:ext cx="0" cy="0"/>
+          <a:chOff x="0" y="0"/>
+          <a:chExt cx="0" cy="0"/>
+        </a:xfrm>
+      </p:grpSpPr>
+      <p:sp>
+        <p:nvSpPr>
+          <p:cNvPr id="2" name="Образ слайда 1"/>
+          <p:cNvSpPr>
+            <a:spLocks noGrp="1" noRot="1" noChangeAspect="1"/>
+          </p:cNvSpPr>
+          <p:nvPr>
+            <p:ph type="sldImg"/>
+          </p:nvPr>
+        </p:nvSpPr>
+        <p:spPr/>
+      </p:sp>
+      <p:sp>
+        <p:nvSpPr>
+          <p:cNvPr id="3" name="Заметки 2"/>
+          <p:cNvSpPr>
+            <a:spLocks noGrp="1"/>
+          </p:cNvSpPr>
+          <p:nvPr>
+            <p:ph type="body" idx="1"/>
+          </p:nvPr>
+        </p:nvSpPr>
+        <p:spPr/>
+        <p:txBody>
+          <a:bodyPr/>
+          <a:lstStyle/>
+          <a:p>
+            <a:endParaRPr lang="ru-RU" dirty="0"/>
+          </a:p>
+        </p:txBody>
+      </p:sp>
+      <p:sp>
+        <p:nvSpPr>
+          <p:cNvPr id="4" name="Номер слайда 3"/>
+          <p:cNvSpPr>
+            <a:spLocks noGrp="1"/>
+          </p:cNvSpPr>
+          <p:nvPr>
+            <p:ph type="sldNum" sz="quarter" idx="5"/>
+          </p:nvPr>
+        </p:nvSpPr>
+        <p:spPr/>
+        <p:txBody>
+          <a:bodyPr/>
+          <a:lstStyle/>
+          <a:p>
+            <a:fld id="{3A84656C-4896-42D5-839D-B66A23BDAB1A}" type="slidenum">
+              <a:rPr lang="ru-RU" smtClean="0"/>
+              <a:t>2</a:t>
+            </a:fld>
+            <a:endParaRPr lang="ru-RU"/>
+          </a:p>
+        </p:txBody>
+      </p:sp>
+    </p:spTree>
+    <p:extLst>
+      <p:ext uri="{BB962C8B-B14F-4D97-AF65-F5344CB8AC3E}">
+        <p14:creationId xmlns:p14="http://schemas.microsoft.com/office/powerpoint/2010/main" val="228067772"/>
+      </p:ext>
+    </p:extLst>
+  </p:cSld>
+  <p:clrMapOvr>
+    <a:masterClrMapping/>
+  </p:clrMapOvr>
+</p:notes>
+</file>
+
 <file path=ppt/slideLayouts/slideLayout1.xml><?xml version="1.0" encoding="utf-8"?>
 <p:sldLayout xmlns:a="http://schemas.openxmlformats.org/drawingml/2006/main" xmlns:r="http://schemas.openxmlformats.org/officeDocument/2006/relationships" xmlns:p="http://schemas.openxmlformats.org/presentationml/2006/main" type="title" preserve="1">
   <p:cSld name="Титульный слайд">
@@ -253,7 +689,7 @@
           <a:p>
             <a:fld id="{0BCAC639-30B3-41D2-99B8-FB7EB2DDCB37}" type="datetimeFigureOut">
               <a:rPr lang="ru-RU" smtClean="0"/>
-              <a:t>28.09.2020</a:t>
+              <a:t>02.12.2023</a:t>
             </a:fld>
             <a:endParaRPr lang="ru-RU"/>
           </a:p>
@@ -421,7 +857,7 @@
           <a:p>
             <a:fld id="{0BCAC639-30B3-41D2-99B8-FB7EB2DDCB37}" type="datetimeFigureOut">
               <a:rPr lang="ru-RU" smtClean="0"/>
-              <a:t>28.09.2020</a:t>
+              <a:t>02.12.2023</a:t>
             </a:fld>
             <a:endParaRPr lang="ru-RU"/>
           </a:p>
@@ -599,7 +1035,7 @@
           <a:p>
             <a:fld id="{0BCAC639-30B3-41D2-99B8-FB7EB2DDCB37}" type="datetimeFigureOut">
               <a:rPr lang="ru-RU" smtClean="0"/>
-              <a:t>28.09.2020</a:t>
+              <a:t>02.12.2023</a:t>
             </a:fld>
             <a:endParaRPr lang="ru-RU"/>
           </a:p>
@@ -767,7 +1203,7 @@
           <a:p>
             <a:fld id="{0BCAC639-30B3-41D2-99B8-FB7EB2DDCB37}" type="datetimeFigureOut">
               <a:rPr lang="ru-RU" smtClean="0"/>
-              <a:t>28.09.2020</a:t>
+              <a:t>02.12.2023</a:t>
             </a:fld>
             <a:endParaRPr lang="ru-RU"/>
           </a:p>
@@ -1012,7 +1448,7 @@
           <a:p>
             <a:fld id="{0BCAC639-30B3-41D2-99B8-FB7EB2DDCB37}" type="datetimeFigureOut">
               <a:rPr lang="ru-RU" smtClean="0"/>
-              <a:t>28.09.2020</a:t>
+              <a:t>02.12.2023</a:t>
             </a:fld>
             <a:endParaRPr lang="ru-RU"/>
           </a:p>
@@ -1241,7 +1677,7 @@
           <a:p>
             <a:fld id="{0BCAC639-30B3-41D2-99B8-FB7EB2DDCB37}" type="datetimeFigureOut">
               <a:rPr lang="ru-RU" smtClean="0"/>
-              <a:t>28.09.2020</a:t>
+              <a:t>02.12.2023</a:t>
             </a:fld>
             <a:endParaRPr lang="ru-RU"/>
           </a:p>
@@ -1605,7 +2041,7 @@
           <a:p>
             <a:fld id="{0BCAC639-30B3-41D2-99B8-FB7EB2DDCB37}" type="datetimeFigureOut">
               <a:rPr lang="ru-RU" smtClean="0"/>
-              <a:t>28.09.2020</a:t>
+              <a:t>02.12.2023</a:t>
             </a:fld>
             <a:endParaRPr lang="ru-RU"/>
           </a:p>
@@ -1722,7 +2158,7 @@
           <a:p>
             <a:fld id="{0BCAC639-30B3-41D2-99B8-FB7EB2DDCB37}" type="datetimeFigureOut">
               <a:rPr lang="ru-RU" smtClean="0"/>
-              <a:t>28.09.2020</a:t>
+              <a:t>02.12.2023</a:t>
             </a:fld>
             <a:endParaRPr lang="ru-RU"/>
           </a:p>
@@ -1817,7 +2253,7 @@
           <a:p>
             <a:fld id="{0BCAC639-30B3-41D2-99B8-FB7EB2DDCB37}" type="datetimeFigureOut">
               <a:rPr lang="ru-RU" smtClean="0"/>
-              <a:t>28.09.2020</a:t>
+              <a:t>02.12.2023</a:t>
             </a:fld>
             <a:endParaRPr lang="ru-RU"/>
           </a:p>
@@ -2092,7 +2528,7 @@
           <a:p>
             <a:fld id="{0BCAC639-30B3-41D2-99B8-FB7EB2DDCB37}" type="datetimeFigureOut">
               <a:rPr lang="ru-RU" smtClean="0"/>
-              <a:t>28.09.2020</a:t>
+              <a:t>02.12.2023</a:t>
             </a:fld>
             <a:endParaRPr lang="ru-RU"/>
           </a:p>
@@ -2344,7 +2780,7 @@
           <a:p>
             <a:fld id="{0BCAC639-30B3-41D2-99B8-FB7EB2DDCB37}" type="datetimeFigureOut">
               <a:rPr lang="ru-RU" smtClean="0"/>
-              <a:t>28.09.2020</a:t>
+              <a:t>02.12.2023</a:t>
             </a:fld>
             <a:endParaRPr lang="ru-RU"/>
           </a:p>
@@ -2555,7 +2991,7 @@
           <a:p>
             <a:fld id="{0BCAC639-30B3-41D2-99B8-FB7EB2DDCB37}" type="datetimeFigureOut">
               <a:rPr lang="ru-RU" smtClean="0"/>
-              <a:t>28.09.2020</a:t>
+              <a:t>02.12.2023</a:t>
             </a:fld>
             <a:endParaRPr lang="ru-RU"/>
           </a:p>
@@ -4173,10 +4609,10 @@
       </p:grpSpPr>
       <p:grpSp>
         <p:nvGrpSpPr>
-          <p:cNvPr id="2" name="Группа 1">
+          <p:cNvPr id="119" name="Группа 118">
             <a:extLst>
               <a:ext uri="{FF2B5EF4-FFF2-40B4-BE49-F238E27FC236}">
-                <a16:creationId xmlns:a16="http://schemas.microsoft.com/office/drawing/2014/main" id="{E7ECA80E-0F08-4762-BC4B-3D94C4D2E6DF}"/>
+                <a16:creationId xmlns:a16="http://schemas.microsoft.com/office/drawing/2014/main" id="{1939F703-E99A-6D09-ECD1-2822D5FAC7B6}"/>
               </a:ext>
             </a:extLst>
           </p:cNvPr>
@@ -4185,65 +4621,40 @@
         </p:nvGrpSpPr>
         <p:grpSpPr>
           <a:xfrm>
-            <a:off x="2040354" y="499659"/>
-            <a:ext cx="7900073" cy="5653053"/>
-            <a:chOff x="2111375" y="455271"/>
-            <a:chExt cx="7900073" cy="5653053"/>
+            <a:off x="50017" y="-479250"/>
+            <a:ext cx="12515851" cy="7985381"/>
+            <a:chOff x="50017" y="-479250"/>
+            <a:chExt cx="12515851" cy="7985381"/>
           </a:xfrm>
         </p:grpSpPr>
-        <p:cxnSp>
-          <p:nvCxnSpPr>
-            <p:cNvPr id="7" name="Прямая соединительная линия 6"/>
-            <p:cNvCxnSpPr/>
+        <p:sp>
+          <p:nvSpPr>
+            <p:cNvPr id="24" name="Дуга 23">
+              <a:extLst>
+                <a:ext uri="{FF2B5EF4-FFF2-40B4-BE49-F238E27FC236}">
+                  <a16:creationId xmlns:a16="http://schemas.microsoft.com/office/drawing/2014/main" id="{2CA21F90-9A67-3957-0B86-1AC59DF562E0}"/>
+                </a:ext>
+              </a:extLst>
+            </p:cNvPr>
+            <p:cNvSpPr/>
             <p:nvPr/>
-          </p:nvCxnSpPr>
+          </p:nvSpPr>
           <p:spPr>
-            <a:xfrm flipV="1">
-              <a:off x="2111375" y="3256492"/>
-              <a:ext cx="3805237" cy="15876"/>
+            <a:xfrm rot="6682943">
+              <a:off x="5331485" y="3292404"/>
+              <a:ext cx="1546415" cy="1370095"/>
             </a:xfrm>
-            <a:prstGeom prst="line">
-              <a:avLst/>
+            <a:prstGeom prst="arc">
+              <a:avLst>
+                <a:gd name="adj1" fmla="val 17451488"/>
+                <a:gd name="adj2" fmla="val 0"/>
+              </a:avLst>
             </a:prstGeom>
-            <a:ln w="38100">
+            <a:ln w="28575">
               <a:solidFill>
-                <a:schemeClr val="tx1"/>
-              </a:solidFill>
-              <a:prstDash val="lgDash"/>
-            </a:ln>
-          </p:spPr>
-          <p:style>
-            <a:lnRef idx="1">
-              <a:schemeClr val="accent1"/>
-            </a:lnRef>
-            <a:fillRef idx="0">
-              <a:schemeClr val="accent1"/>
-            </a:fillRef>
-            <a:effectRef idx="0">
-              <a:schemeClr val="accent1"/>
-            </a:effectRef>
-            <a:fontRef idx="minor">
-              <a:schemeClr val="tx1"/>
-            </a:fontRef>
-          </p:style>
-        </p:cxnSp>
-        <p:cxnSp>
-          <p:nvCxnSpPr>
-            <p:cNvPr id="12" name="Прямая соединительная линия 11"/>
-            <p:cNvCxnSpPr/>
-            <p:nvPr/>
-          </p:nvCxnSpPr>
-          <p:spPr>
-            <a:xfrm flipV="1">
-              <a:off x="5916612" y="3240616"/>
-              <a:ext cx="3805237" cy="15876"/>
-            </a:xfrm>
-            <a:prstGeom prst="line">
-              <a:avLst/>
-            </a:prstGeom>
-            <a:ln w="38100">
-              <a:solidFill>
-                <a:schemeClr val="tx1"/>
+                <a:schemeClr val="bg2">
+                  <a:lumMod val="75000"/>
+                </a:schemeClr>
               </a:solidFill>
               <a:prstDash val="solid"/>
             </a:ln>
@@ -4260,252 +4671,6 @@
             </a:effectRef>
             <a:fontRef idx="minor">
               <a:schemeClr val="tx1"/>
-            </a:fontRef>
-          </p:style>
-        </p:cxnSp>
-        <p:cxnSp>
-          <p:nvCxnSpPr>
-            <p:cNvPr id="13" name="Прямая соединительная линия 12"/>
-            <p:cNvCxnSpPr/>
-            <p:nvPr/>
-          </p:nvCxnSpPr>
-          <p:spPr>
-            <a:xfrm>
-              <a:off x="5868179" y="3231936"/>
-              <a:ext cx="18521" cy="2805642"/>
-            </a:xfrm>
-            <a:prstGeom prst="line">
-              <a:avLst/>
-            </a:prstGeom>
-            <a:ln w="38100">
-              <a:solidFill>
-                <a:schemeClr val="tx1"/>
-              </a:solidFill>
-              <a:prstDash val="solid"/>
-            </a:ln>
-          </p:spPr>
-          <p:style>
-            <a:lnRef idx="1">
-              <a:schemeClr val="accent1"/>
-            </a:lnRef>
-            <a:fillRef idx="0">
-              <a:schemeClr val="accent1"/>
-            </a:fillRef>
-            <a:effectRef idx="0">
-              <a:schemeClr val="accent1"/>
-            </a:effectRef>
-            <a:fontRef idx="minor">
-              <a:schemeClr val="tx1"/>
-            </a:fontRef>
-          </p:style>
-        </p:cxnSp>
-        <p:cxnSp>
-          <p:nvCxnSpPr>
-            <p:cNvPr id="14" name="Прямая соединительная линия 13"/>
-            <p:cNvCxnSpPr/>
-            <p:nvPr/>
-          </p:nvCxnSpPr>
-          <p:spPr>
-            <a:xfrm>
-              <a:off x="5857578" y="458788"/>
-              <a:ext cx="5291" cy="2805642"/>
-            </a:xfrm>
-            <a:prstGeom prst="line">
-              <a:avLst/>
-            </a:prstGeom>
-            <a:ln w="38100">
-              <a:solidFill>
-                <a:schemeClr val="tx1"/>
-              </a:solidFill>
-              <a:prstDash val="lgDash"/>
-            </a:ln>
-          </p:spPr>
-          <p:style>
-            <a:lnRef idx="1">
-              <a:schemeClr val="accent1"/>
-            </a:lnRef>
-            <a:fillRef idx="0">
-              <a:schemeClr val="accent1"/>
-            </a:fillRef>
-            <a:effectRef idx="0">
-              <a:schemeClr val="accent1"/>
-            </a:effectRef>
-            <a:fontRef idx="minor">
-              <a:schemeClr val="tx1"/>
-            </a:fontRef>
-          </p:style>
-        </p:cxnSp>
-        <p:grpSp>
-          <p:nvGrpSpPr>
-            <p:cNvPr id="26" name="Группа 25"/>
-            <p:cNvGrpSpPr/>
-            <p:nvPr/>
-          </p:nvGrpSpPr>
-          <p:grpSpPr>
-            <a:xfrm>
-              <a:off x="3652307" y="645324"/>
-              <a:ext cx="4636030" cy="5017557"/>
-              <a:chOff x="3526763" y="1009391"/>
-              <a:chExt cx="4636030" cy="5017557"/>
-            </a:xfrm>
-          </p:grpSpPr>
-          <p:cxnSp>
-            <p:nvCxnSpPr>
-              <p:cNvPr id="22" name="Прямая соединительная линия 21"/>
-              <p:cNvCxnSpPr/>
-              <p:nvPr/>
-            </p:nvCxnSpPr>
-            <p:spPr>
-              <a:xfrm flipV="1">
-                <a:off x="3526763" y="3504540"/>
-                <a:ext cx="2332170" cy="2522408"/>
-              </a:xfrm>
-              <a:prstGeom prst="line">
-                <a:avLst/>
-              </a:prstGeom>
-              <a:ln w="38100">
-                <a:solidFill>
-                  <a:schemeClr val="tx1"/>
-                </a:solidFill>
-                <a:prstDash val="lgDash"/>
-              </a:ln>
-            </p:spPr>
-            <p:style>
-              <a:lnRef idx="1">
-                <a:schemeClr val="accent1"/>
-              </a:lnRef>
-              <a:fillRef idx="0">
-                <a:schemeClr val="accent1"/>
-              </a:fillRef>
-              <a:effectRef idx="0">
-                <a:schemeClr val="accent1"/>
-              </a:effectRef>
-              <a:fontRef idx="minor">
-                <a:schemeClr val="tx1"/>
-              </a:fontRef>
-            </p:style>
-          </p:cxnSp>
-          <p:cxnSp>
-            <p:nvCxnSpPr>
-              <p:cNvPr id="25" name="Прямая соединительная линия 24"/>
-              <p:cNvCxnSpPr/>
-              <p:nvPr/>
-            </p:nvCxnSpPr>
-            <p:spPr>
-              <a:xfrm flipV="1">
-                <a:off x="5830623" y="1009391"/>
-                <a:ext cx="2332170" cy="2522408"/>
-              </a:xfrm>
-              <a:prstGeom prst="line">
-                <a:avLst/>
-              </a:prstGeom>
-              <a:ln w="38100">
-                <a:solidFill>
-                  <a:schemeClr val="tx1"/>
-                </a:solidFill>
-              </a:ln>
-            </p:spPr>
-            <p:style>
-              <a:lnRef idx="1">
-                <a:schemeClr val="accent1"/>
-              </a:lnRef>
-              <a:fillRef idx="0">
-                <a:schemeClr val="accent1"/>
-              </a:fillRef>
-              <a:effectRef idx="0">
-                <a:schemeClr val="accent1"/>
-              </a:effectRef>
-              <a:fontRef idx="minor">
-                <a:schemeClr val="tx1"/>
-              </a:fontRef>
-            </p:style>
-          </p:cxnSp>
-        </p:grpSp>
-        <p:sp>
-          <p:nvSpPr>
-            <p:cNvPr id="27" name="Блок-схема: извлечение 26"/>
-            <p:cNvSpPr/>
-            <p:nvPr/>
-          </p:nvSpPr>
-          <p:spPr>
-            <a:xfrm rot="10800000">
-              <a:off x="5812728" y="5838919"/>
-              <a:ext cx="135467" cy="269405"/>
-            </a:xfrm>
-            <a:prstGeom prst="flowChartExtract">
-              <a:avLst/>
-            </a:prstGeom>
-            <a:solidFill>
-              <a:schemeClr val="tx1"/>
-            </a:solidFill>
-            <a:ln>
-              <a:solidFill>
-                <a:schemeClr val="tx1"/>
-              </a:solidFill>
-            </a:ln>
-          </p:spPr>
-          <p:style>
-            <a:lnRef idx="2">
-              <a:schemeClr val="accent1">
-                <a:shade val="50000"/>
-              </a:schemeClr>
-            </a:lnRef>
-            <a:fillRef idx="1">
-              <a:schemeClr val="accent1"/>
-            </a:fillRef>
-            <a:effectRef idx="0">
-              <a:schemeClr val="accent1"/>
-            </a:effectRef>
-            <a:fontRef idx="minor">
-              <a:schemeClr val="lt1"/>
-            </a:fontRef>
-          </p:style>
-          <p:txBody>
-            <a:bodyPr rtlCol="0" anchor="ctr"/>
-            <a:lstStyle/>
-            <a:p>
-              <a:pPr algn="ctr"/>
-              <a:endParaRPr lang="ru-RU" dirty="0"/>
-            </a:p>
-          </p:txBody>
-        </p:sp>
-        <p:sp>
-          <p:nvSpPr>
-            <p:cNvPr id="28" name="Блок-схема: извлечение 27"/>
-            <p:cNvSpPr/>
-            <p:nvPr/>
-          </p:nvSpPr>
-          <p:spPr>
-            <a:xfrm rot="2292888">
-              <a:off x="8206158" y="464947"/>
-              <a:ext cx="164357" cy="288462"/>
-            </a:xfrm>
-            <a:prstGeom prst="flowChartExtract">
-              <a:avLst/>
-            </a:prstGeom>
-            <a:solidFill>
-              <a:schemeClr val="tx1"/>
-            </a:solidFill>
-            <a:ln>
-              <a:solidFill>
-                <a:schemeClr val="tx1"/>
-              </a:solidFill>
-            </a:ln>
-          </p:spPr>
-          <p:style>
-            <a:lnRef idx="2">
-              <a:schemeClr val="accent1">
-                <a:shade val="50000"/>
-              </a:schemeClr>
-            </a:lnRef>
-            <a:fillRef idx="1">
-              <a:schemeClr val="accent1"/>
-            </a:fillRef>
-            <a:effectRef idx="0">
-              <a:schemeClr val="accent1"/>
-            </a:effectRef>
-            <a:fontRef idx="minor">
-              <a:schemeClr val="lt1"/>
             </a:fontRef>
           </p:style>
           <p:txBody>
@@ -4517,54 +4682,52 @@
             </a:p>
           </p:txBody>
         </p:sp>
-        <p:sp>
-          <p:nvSpPr>
-            <p:cNvPr id="29" name="Блок-схема: извлечение 28"/>
-            <p:cNvSpPr/>
+        <p:cxnSp>
+          <p:nvCxnSpPr>
+            <p:cNvPr id="34" name="Прямая соединительная линия 33">
+              <a:extLst>
+                <a:ext uri="{FF2B5EF4-FFF2-40B4-BE49-F238E27FC236}">
+                  <a16:creationId xmlns:a16="http://schemas.microsoft.com/office/drawing/2014/main" id="{28CB976A-AA0C-535F-D1C8-D80C2DEB303D}"/>
+                </a:ext>
+              </a:extLst>
+            </p:cNvPr>
+            <p:cNvCxnSpPr>
+              <a:cxnSpLocks/>
+            </p:cNvCxnSpPr>
             <p:nvPr/>
-          </p:nvSpPr>
+          </p:nvCxnSpPr>
           <p:spPr>
-            <a:xfrm rot="5400000">
-              <a:off x="9746671" y="3073121"/>
-              <a:ext cx="178689" cy="350865"/>
+            <a:xfrm>
+              <a:off x="7075280" y="2698242"/>
+              <a:ext cx="0" cy="3185065"/>
             </a:xfrm>
-            <a:prstGeom prst="flowChartExtract">
+            <a:prstGeom prst="line">
               <a:avLst/>
             </a:prstGeom>
-            <a:solidFill>
-              <a:schemeClr val="tx1"/>
-            </a:solidFill>
-            <a:ln>
+            <a:ln w="12700">
               <a:solidFill>
-                <a:schemeClr val="tx1"/>
+                <a:schemeClr val="bg1">
+                  <a:lumMod val="50000"/>
+                </a:schemeClr>
               </a:solidFill>
+              <a:prstDash val="dash"/>
             </a:ln>
           </p:spPr>
           <p:style>
-            <a:lnRef idx="2">
-              <a:schemeClr val="accent1">
-                <a:shade val="50000"/>
-              </a:schemeClr>
+            <a:lnRef idx="1">
+              <a:schemeClr val="accent1"/>
             </a:lnRef>
-            <a:fillRef idx="1">
+            <a:fillRef idx="0">
               <a:schemeClr val="accent1"/>
             </a:fillRef>
             <a:effectRef idx="0">
               <a:schemeClr val="accent1"/>
             </a:effectRef>
             <a:fontRef idx="minor">
-              <a:schemeClr val="lt1"/>
+              <a:schemeClr val="tx1"/>
             </a:fontRef>
           </p:style>
-          <p:txBody>
-            <a:bodyPr rtlCol="0" anchor="ctr"/>
-            <a:lstStyle/>
-            <a:p>
-              <a:pPr algn="ctr"/>
-              <a:endParaRPr lang="ru-RU"/>
-            </a:p>
-          </p:txBody>
-        </p:sp>
+        </p:cxnSp>
         <p:sp>
           <p:nvSpPr>
             <p:cNvPr id="30" name="Прямоугольник 29"/>
@@ -4573,7 +4736,7 @@
           </p:nvSpPr>
           <p:spPr>
             <a:xfrm>
-              <a:off x="5748866" y="5378059"/>
+              <a:off x="5677844" y="5560967"/>
               <a:ext cx="694267" cy="550755"/>
             </a:xfrm>
             <a:prstGeom prst="rect">
@@ -4637,13 +4800,722 @@
         </p:sp>
         <p:sp>
           <p:nvSpPr>
+            <p:cNvPr id="27" name="Блок-схема: извлечение 26"/>
+            <p:cNvSpPr/>
+            <p:nvPr/>
+          </p:nvSpPr>
+          <p:spPr>
+            <a:xfrm rot="10800000">
+              <a:off x="5741707" y="5883307"/>
+              <a:ext cx="135467" cy="269405"/>
+            </a:xfrm>
+            <a:prstGeom prst="flowChartExtract">
+              <a:avLst/>
+            </a:prstGeom>
+            <a:solidFill>
+              <a:schemeClr val="tx1"/>
+            </a:solidFill>
+            <a:ln>
+              <a:solidFill>
+                <a:schemeClr val="tx1"/>
+              </a:solidFill>
+            </a:ln>
+          </p:spPr>
+          <p:style>
+            <a:lnRef idx="2">
+              <a:schemeClr val="accent1">
+                <a:shade val="50000"/>
+              </a:schemeClr>
+            </a:lnRef>
+            <a:fillRef idx="1">
+              <a:schemeClr val="accent1"/>
+            </a:fillRef>
+            <a:effectRef idx="0">
+              <a:schemeClr val="accent1"/>
+            </a:effectRef>
+            <a:fontRef idx="minor">
+              <a:schemeClr val="lt1"/>
+            </a:fontRef>
+          </p:style>
+          <p:txBody>
+            <a:bodyPr rtlCol="0" anchor="ctr"/>
+            <a:lstStyle/>
+            <a:p>
+              <a:pPr algn="ctr"/>
+              <a:endParaRPr lang="ru-RU" dirty="0"/>
+            </a:p>
+          </p:txBody>
+        </p:sp>
+        <p:cxnSp>
+          <p:nvCxnSpPr>
+            <p:cNvPr id="13" name="Прямая соединительная линия 12"/>
+            <p:cNvCxnSpPr/>
+            <p:nvPr/>
+          </p:nvCxnSpPr>
+          <p:spPr>
+            <a:xfrm>
+              <a:off x="5792396" y="3276324"/>
+              <a:ext cx="18521" cy="2805642"/>
+            </a:xfrm>
+            <a:prstGeom prst="line">
+              <a:avLst/>
+            </a:prstGeom>
+            <a:ln w="38100">
+              <a:solidFill>
+                <a:schemeClr val="tx1"/>
+              </a:solidFill>
+              <a:prstDash val="solid"/>
+            </a:ln>
+          </p:spPr>
+          <p:style>
+            <a:lnRef idx="1">
+              <a:schemeClr val="accent1"/>
+            </a:lnRef>
+            <a:fillRef idx="0">
+              <a:schemeClr val="accent1"/>
+            </a:fillRef>
+            <a:effectRef idx="0">
+              <a:schemeClr val="accent1"/>
+            </a:effectRef>
+            <a:fontRef idx="minor">
+              <a:schemeClr val="tx1"/>
+            </a:fontRef>
+          </p:style>
+        </p:cxnSp>
+        <p:sp>
+          <p:nvSpPr>
+            <p:cNvPr id="21" name="Прямоугольник 20">
+              <a:extLst>
+                <a:ext uri="{FF2B5EF4-FFF2-40B4-BE49-F238E27FC236}">
+                  <a16:creationId xmlns:a16="http://schemas.microsoft.com/office/drawing/2014/main" id="{FA1B1604-0B22-5AFE-8534-A87B52985DA8}"/>
+                </a:ext>
+              </a:extLst>
+            </p:cNvPr>
+            <p:cNvSpPr/>
+            <p:nvPr/>
+          </p:nvSpPr>
+          <p:spPr>
+            <a:xfrm>
+              <a:off x="5790311" y="4604216"/>
+              <a:ext cx="694267" cy="550755"/>
+            </a:xfrm>
+            <a:prstGeom prst="rect">
+              <a:avLst/>
+            </a:prstGeom>
+            <a:noFill/>
+            <a:ln>
+              <a:noFill/>
+            </a:ln>
+          </p:spPr>
+          <p:style>
+            <a:lnRef idx="2">
+              <a:schemeClr val="accent1">
+                <a:shade val="50000"/>
+              </a:schemeClr>
+            </a:lnRef>
+            <a:fillRef idx="1">
+              <a:schemeClr val="accent1"/>
+            </a:fillRef>
+            <a:effectRef idx="0">
+              <a:schemeClr val="accent1"/>
+            </a:effectRef>
+            <a:fontRef idx="minor">
+              <a:schemeClr val="lt1"/>
+            </a:fontRef>
+          </p:style>
+          <p:txBody>
+            <a:bodyPr rtlCol="0" anchor="ctr"/>
+            <a:lstStyle/>
+            <a:p>
+              <a:pPr algn="ctr"/>
+              <a:r>
+                <a:rPr lang="el-GR" sz="2400" b="1" dirty="0">
+                  <a:solidFill>
+                    <a:srgbClr val="0070C0"/>
+                  </a:solidFill>
+                  <a:effectLst>
+                    <a:outerShdw blurRad="38100" dist="38100" dir="2700000" algn="tl">
+                      <a:srgbClr val="000000">
+                        <a:alpha val="43137"/>
+                      </a:srgbClr>
+                    </a:outerShdw>
+                  </a:effectLst>
+                </a:rPr>
+                <a:t>β</a:t>
+              </a:r>
+              <a:endParaRPr lang="ru-RU" sz="2400" b="1" dirty="0">
+                <a:solidFill>
+                  <a:srgbClr val="0070C0"/>
+                </a:solidFill>
+                <a:effectLst>
+                  <a:outerShdw blurRad="38100" dist="38100" dir="2700000" algn="tl">
+                    <a:srgbClr val="000000">
+                      <a:alpha val="43137"/>
+                    </a:srgbClr>
+                  </a:outerShdw>
+                </a:effectLst>
+              </a:endParaRPr>
+            </a:p>
+          </p:txBody>
+        </p:sp>
+        <p:sp>
+          <p:nvSpPr>
+            <p:cNvPr id="19" name="Блок-схема: извлечение 18">
+              <a:extLst>
+                <a:ext uri="{FF2B5EF4-FFF2-40B4-BE49-F238E27FC236}">
+                  <a16:creationId xmlns:a16="http://schemas.microsoft.com/office/drawing/2014/main" id="{24E412D7-7A06-29AD-2A9E-612685966BE8}"/>
+                </a:ext>
+              </a:extLst>
+            </p:cNvPr>
+            <p:cNvSpPr/>
+            <p:nvPr/>
+          </p:nvSpPr>
+          <p:spPr>
+            <a:xfrm rot="8619694">
+              <a:off x="6776415" y="4655070"/>
+              <a:ext cx="283169" cy="491298"/>
+            </a:xfrm>
+            <a:prstGeom prst="flowChartExtract">
+              <a:avLst/>
+            </a:prstGeom>
+            <a:solidFill>
+              <a:srgbClr val="0070C0"/>
+            </a:solidFill>
+            <a:ln>
+              <a:solidFill>
+                <a:srgbClr val="0070C0"/>
+              </a:solidFill>
+            </a:ln>
+          </p:spPr>
+          <p:style>
+            <a:lnRef idx="2">
+              <a:schemeClr val="accent1">
+                <a:shade val="50000"/>
+              </a:schemeClr>
+            </a:lnRef>
+            <a:fillRef idx="1">
+              <a:schemeClr val="accent1"/>
+            </a:fillRef>
+            <a:effectRef idx="0">
+              <a:schemeClr val="accent1"/>
+            </a:effectRef>
+            <a:fontRef idx="minor">
+              <a:schemeClr val="lt1"/>
+            </a:fontRef>
+          </p:style>
+          <p:txBody>
+            <a:bodyPr rtlCol="0" anchor="ctr"/>
+            <a:lstStyle/>
+            <a:p>
+              <a:pPr algn="ctr"/>
+              <a:endParaRPr lang="ru-RU"/>
+            </a:p>
+          </p:txBody>
+        </p:sp>
+        <p:sp>
+          <p:nvSpPr>
+            <p:cNvPr id="4" name="TextBox 3">
+              <a:extLst>
+                <a:ext uri="{FF2B5EF4-FFF2-40B4-BE49-F238E27FC236}">
+                  <a16:creationId xmlns:a16="http://schemas.microsoft.com/office/drawing/2014/main" id="{6A0EB1A5-15A7-1566-D95D-D641EB1BDBDA}"/>
+                </a:ext>
+              </a:extLst>
+            </p:cNvPr>
+            <p:cNvSpPr txBox="1"/>
+            <p:nvPr/>
+          </p:nvSpPr>
+          <p:spPr>
+            <a:xfrm>
+              <a:off x="6306869" y="3389095"/>
+              <a:ext cx="627816" cy="461665"/>
+            </a:xfrm>
+            <a:prstGeom prst="rect">
+              <a:avLst/>
+            </a:prstGeom>
+            <a:noFill/>
+          </p:spPr>
+          <p:txBody>
+            <a:bodyPr wrap="square">
+              <a:spAutoFit/>
+            </a:bodyPr>
+            <a:lstStyle/>
+            <a:p>
+              <a:r>
+                <a:rPr lang="el-GR" sz="2400" b="1" dirty="0">
+                  <a:solidFill>
+                    <a:sysClr val="windowText" lastClr="000000"/>
+                  </a:solidFill>
+                  <a:effectLst>
+                    <a:outerShdw blurRad="38100" dist="38100" dir="2700000" algn="tl">
+                      <a:srgbClr val="000000">
+                        <a:alpha val="43137"/>
+                      </a:srgbClr>
+                    </a:outerShdw>
+                  </a:effectLst>
+                  <a:latin typeface="Times New Roman" panose="02020603050405020304" pitchFamily="18" charset="0"/>
+                  <a:cs typeface="Times New Roman" panose="02020603050405020304" pitchFamily="18" charset="0"/>
+                </a:rPr>
+                <a:t>θ</a:t>
+              </a:r>
+              <a:endParaRPr lang="ru-RU" sz="2400" b="1" dirty="0">
+                <a:solidFill>
+                  <a:sysClr val="windowText" lastClr="000000"/>
+                </a:solidFill>
+                <a:effectLst>
+                  <a:outerShdw blurRad="38100" dist="38100" dir="2700000" algn="tl">
+                    <a:srgbClr val="000000">
+                      <a:alpha val="43137"/>
+                    </a:srgbClr>
+                  </a:outerShdw>
+                </a:effectLst>
+                <a:latin typeface="Times New Roman" panose="02020603050405020304" pitchFamily="18" charset="0"/>
+                <a:cs typeface="Times New Roman" panose="02020603050405020304" pitchFamily="18" charset="0"/>
+              </a:endParaRPr>
+            </a:p>
+          </p:txBody>
+        </p:sp>
+        <p:cxnSp>
+          <p:nvCxnSpPr>
+            <p:cNvPr id="9" name="Прямая соединительная линия 8">
+              <a:extLst>
+                <a:ext uri="{FF2B5EF4-FFF2-40B4-BE49-F238E27FC236}">
+                  <a16:creationId xmlns:a16="http://schemas.microsoft.com/office/drawing/2014/main" id="{CACB550A-6B52-8EAB-E843-84646610F3B6}"/>
+                </a:ext>
+              </a:extLst>
+            </p:cNvPr>
+            <p:cNvCxnSpPr>
+              <a:cxnSpLocks/>
+            </p:cNvCxnSpPr>
+            <p:nvPr/>
+          </p:nvCxnSpPr>
+          <p:spPr>
+            <a:xfrm>
+              <a:off x="3374872" y="1179650"/>
+              <a:ext cx="3500027" cy="3088670"/>
+            </a:xfrm>
+            <a:prstGeom prst="line">
+              <a:avLst/>
+            </a:prstGeom>
+            <a:ln w="38100">
+              <a:solidFill>
+                <a:srgbClr val="FF0000"/>
+              </a:solidFill>
+              <a:prstDash val="sysDash"/>
+            </a:ln>
+          </p:spPr>
+          <p:style>
+            <a:lnRef idx="1">
+              <a:schemeClr val="accent1"/>
+            </a:lnRef>
+            <a:fillRef idx="0">
+              <a:schemeClr val="accent1"/>
+            </a:fillRef>
+            <a:effectRef idx="0">
+              <a:schemeClr val="accent1"/>
+            </a:effectRef>
+            <a:fontRef idx="minor">
+              <a:schemeClr val="tx1"/>
+            </a:fontRef>
+          </p:style>
+        </p:cxnSp>
+        <p:cxnSp>
+          <p:nvCxnSpPr>
+            <p:cNvPr id="17" name="Прямая соединительная линия 16">
+              <a:extLst>
+                <a:ext uri="{FF2B5EF4-FFF2-40B4-BE49-F238E27FC236}">
+                  <a16:creationId xmlns:a16="http://schemas.microsoft.com/office/drawing/2014/main" id="{625571C9-DD9D-57D8-A5DB-B2E615802022}"/>
+                </a:ext>
+              </a:extLst>
+            </p:cNvPr>
+            <p:cNvCxnSpPr>
+              <a:cxnSpLocks/>
+              <a:endCxn id="19" idx="2"/>
+            </p:cNvCxnSpPr>
+            <p:nvPr/>
+          </p:nvCxnSpPr>
+          <p:spPr>
+            <a:xfrm>
+              <a:off x="5812967" y="3316083"/>
+              <a:ext cx="959472" cy="1386758"/>
+            </a:xfrm>
+            <a:prstGeom prst="line">
+              <a:avLst/>
+            </a:prstGeom>
+            <a:ln w="38100">
+              <a:solidFill>
+                <a:srgbClr val="0070C0"/>
+              </a:solidFill>
+              <a:prstDash val="solid"/>
+            </a:ln>
+          </p:spPr>
+          <p:style>
+            <a:lnRef idx="1">
+              <a:schemeClr val="accent1"/>
+            </a:lnRef>
+            <a:fillRef idx="0">
+              <a:schemeClr val="accent1"/>
+            </a:fillRef>
+            <a:effectRef idx="0">
+              <a:schemeClr val="accent1"/>
+            </a:effectRef>
+            <a:fontRef idx="minor">
+              <a:schemeClr val="tx1"/>
+            </a:fontRef>
+          </p:style>
+        </p:cxnSp>
+        <p:sp>
+          <p:nvSpPr>
+            <p:cNvPr id="16" name="Параллелограмм 15">
+              <a:extLst>
+                <a:ext uri="{FF2B5EF4-FFF2-40B4-BE49-F238E27FC236}">
+                  <a16:creationId xmlns:a16="http://schemas.microsoft.com/office/drawing/2014/main" id="{C42D4EDB-D12D-FAA3-0719-4718AFCDDD66}"/>
+                </a:ext>
+              </a:extLst>
+            </p:cNvPr>
+            <p:cNvSpPr/>
+            <p:nvPr/>
+          </p:nvSpPr>
+          <p:spPr>
+            <a:xfrm>
+              <a:off x="50017" y="501529"/>
+              <a:ext cx="12515851" cy="5664522"/>
+            </a:xfrm>
+            <a:prstGeom prst="parallelogram">
+              <a:avLst>
+                <a:gd name="adj" fmla="val 93255"/>
+              </a:avLst>
+            </a:prstGeom>
+            <a:solidFill>
+              <a:schemeClr val="accent4">
+                <a:lumMod val="40000"/>
+                <a:lumOff val="60000"/>
+                <a:alpha val="32000"/>
+              </a:schemeClr>
+            </a:solidFill>
+            <a:ln>
+              <a:solidFill>
+                <a:schemeClr val="tx1"/>
+              </a:solidFill>
+            </a:ln>
+          </p:spPr>
+          <p:style>
+            <a:lnRef idx="2">
+              <a:schemeClr val="accent1">
+                <a:shade val="15000"/>
+              </a:schemeClr>
+            </a:lnRef>
+            <a:fillRef idx="1">
+              <a:schemeClr val="accent1"/>
+            </a:fillRef>
+            <a:effectRef idx="0">
+              <a:schemeClr val="accent1"/>
+            </a:effectRef>
+            <a:fontRef idx="minor">
+              <a:schemeClr val="lt1"/>
+            </a:fontRef>
+          </p:style>
+          <p:txBody>
+            <a:bodyPr rtlCol="0" anchor="ctr"/>
+            <a:lstStyle/>
+            <a:p>
+              <a:pPr algn="ctr"/>
+              <a:endParaRPr lang="ru-RU"/>
+            </a:p>
+          </p:txBody>
+        </p:sp>
+        <p:sp>
+          <p:nvSpPr>
+            <p:cNvPr id="10" name="Дуга 9">
+              <a:extLst>
+                <a:ext uri="{FF2B5EF4-FFF2-40B4-BE49-F238E27FC236}">
+                  <a16:creationId xmlns:a16="http://schemas.microsoft.com/office/drawing/2014/main" id="{88BEC717-ADEE-4FCF-2C38-3420EB47F533}"/>
+                </a:ext>
+              </a:extLst>
+            </p:cNvPr>
+            <p:cNvSpPr/>
+            <p:nvPr/>
+          </p:nvSpPr>
+          <p:spPr>
+            <a:xfrm rot="1827711">
+              <a:off x="4267930" y="2497178"/>
+              <a:ext cx="2094982" cy="1954166"/>
+            </a:xfrm>
+            <a:prstGeom prst="arc">
+              <a:avLst>
+                <a:gd name="adj1" fmla="val 17104809"/>
+                <a:gd name="adj2" fmla="val 20765066"/>
+              </a:avLst>
+            </a:prstGeom>
+            <a:ln w="28575">
+              <a:solidFill>
+                <a:schemeClr val="bg2">
+                  <a:lumMod val="75000"/>
+                </a:schemeClr>
+              </a:solidFill>
+              <a:prstDash val="solid"/>
+            </a:ln>
+          </p:spPr>
+          <p:style>
+            <a:lnRef idx="1">
+              <a:schemeClr val="accent1"/>
+            </a:lnRef>
+            <a:fillRef idx="0">
+              <a:schemeClr val="accent1"/>
+            </a:fillRef>
+            <a:effectRef idx="0">
+              <a:schemeClr val="accent1"/>
+            </a:effectRef>
+            <a:fontRef idx="minor">
+              <a:schemeClr val="tx1"/>
+            </a:fontRef>
+          </p:style>
+          <p:txBody>
+            <a:bodyPr rtlCol="0" anchor="ctr"/>
+            <a:lstStyle/>
+            <a:p>
+              <a:pPr algn="ctr"/>
+              <a:endParaRPr lang="ru-RU"/>
+            </a:p>
+          </p:txBody>
+        </p:sp>
+        <p:sp>
+          <p:nvSpPr>
+            <p:cNvPr id="65" name="Дуга 64"/>
+            <p:cNvSpPr/>
+            <p:nvPr/>
+          </p:nvSpPr>
+          <p:spPr>
+            <a:xfrm rot="19540383">
+              <a:off x="5245061" y="1882213"/>
+              <a:ext cx="1177863" cy="1163151"/>
+            </a:xfrm>
+            <a:prstGeom prst="arc">
+              <a:avLst>
+                <a:gd name="adj1" fmla="val 18147507"/>
+                <a:gd name="adj2" fmla="val 0"/>
+              </a:avLst>
+            </a:prstGeom>
+            <a:ln w="28575">
+              <a:solidFill>
+                <a:schemeClr val="bg2">
+                  <a:lumMod val="75000"/>
+                </a:schemeClr>
+              </a:solidFill>
+              <a:prstDash val="solid"/>
+            </a:ln>
+          </p:spPr>
+          <p:style>
+            <a:lnRef idx="1">
+              <a:schemeClr val="accent1"/>
+            </a:lnRef>
+            <a:fillRef idx="0">
+              <a:schemeClr val="accent1"/>
+            </a:fillRef>
+            <a:effectRef idx="0">
+              <a:schemeClr val="accent1"/>
+            </a:effectRef>
+            <a:fontRef idx="minor">
+              <a:schemeClr val="tx1"/>
+            </a:fontRef>
+          </p:style>
+          <p:txBody>
+            <a:bodyPr rtlCol="0" anchor="ctr"/>
+            <a:lstStyle/>
+            <a:p>
+              <a:pPr algn="ctr"/>
+              <a:endParaRPr lang="ru-RU"/>
+            </a:p>
+          </p:txBody>
+        </p:sp>
+        <p:sp>
+          <p:nvSpPr>
+            <p:cNvPr id="58" name="Дуга 57"/>
+            <p:cNvSpPr/>
+            <p:nvPr/>
+          </p:nvSpPr>
+          <p:spPr>
+            <a:xfrm rot="1233551">
+              <a:off x="5728298" y="2756747"/>
+              <a:ext cx="881653" cy="750593"/>
+            </a:xfrm>
+            <a:prstGeom prst="arc">
+              <a:avLst>
+                <a:gd name="adj1" fmla="val 18938136"/>
+                <a:gd name="adj2" fmla="val 0"/>
+              </a:avLst>
+            </a:prstGeom>
+            <a:ln w="28575">
+              <a:solidFill>
+                <a:schemeClr val="bg2">
+                  <a:lumMod val="75000"/>
+                </a:schemeClr>
+              </a:solidFill>
+              <a:prstDash val="solid"/>
+            </a:ln>
+          </p:spPr>
+          <p:style>
+            <a:lnRef idx="1">
+              <a:schemeClr val="accent1"/>
+            </a:lnRef>
+            <a:fillRef idx="0">
+              <a:schemeClr val="accent1"/>
+            </a:fillRef>
+            <a:effectRef idx="0">
+              <a:schemeClr val="accent1"/>
+            </a:effectRef>
+            <a:fontRef idx="minor">
+              <a:schemeClr val="tx1"/>
+            </a:fontRef>
+          </p:style>
+          <p:txBody>
+            <a:bodyPr rtlCol="0" anchor="ctr"/>
+            <a:lstStyle/>
+            <a:p>
+              <a:pPr algn="ctr"/>
+              <a:endParaRPr lang="ru-RU"/>
+            </a:p>
+          </p:txBody>
+        </p:sp>
+        <p:cxnSp>
+          <p:nvCxnSpPr>
+            <p:cNvPr id="25" name="Прямая соединительная линия 24"/>
+            <p:cNvCxnSpPr/>
+            <p:nvPr/>
+          </p:nvCxnSpPr>
+          <p:spPr>
+            <a:xfrm flipV="1">
+              <a:off x="5885146" y="689712"/>
+              <a:ext cx="2332170" cy="2522408"/>
+            </a:xfrm>
+            <a:prstGeom prst="line">
+              <a:avLst/>
+            </a:prstGeom>
+            <a:ln w="38100">
+              <a:solidFill>
+                <a:schemeClr val="tx1"/>
+              </a:solidFill>
+            </a:ln>
+          </p:spPr>
+          <p:style>
+            <a:lnRef idx="1">
+              <a:schemeClr val="accent1"/>
+            </a:lnRef>
+            <a:fillRef idx="0">
+              <a:schemeClr val="accent1"/>
+            </a:fillRef>
+            <a:effectRef idx="0">
+              <a:schemeClr val="accent1"/>
+            </a:effectRef>
+            <a:fontRef idx="minor">
+              <a:schemeClr val="tx1"/>
+            </a:fontRef>
+          </p:style>
+        </p:cxnSp>
+        <p:sp>
+          <p:nvSpPr>
+            <p:cNvPr id="28" name="Блок-схема: извлечение 27"/>
+            <p:cNvSpPr/>
+            <p:nvPr/>
+          </p:nvSpPr>
+          <p:spPr>
+            <a:xfrm rot="2292888">
+              <a:off x="8135137" y="509335"/>
+              <a:ext cx="164357" cy="288462"/>
+            </a:xfrm>
+            <a:prstGeom prst="flowChartExtract">
+              <a:avLst/>
+            </a:prstGeom>
+            <a:solidFill>
+              <a:schemeClr val="tx1"/>
+            </a:solidFill>
+            <a:ln>
+              <a:solidFill>
+                <a:schemeClr val="tx1"/>
+              </a:solidFill>
+            </a:ln>
+          </p:spPr>
+          <p:style>
+            <a:lnRef idx="2">
+              <a:schemeClr val="accent1">
+                <a:shade val="50000"/>
+              </a:schemeClr>
+            </a:lnRef>
+            <a:fillRef idx="1">
+              <a:schemeClr val="accent1"/>
+            </a:fillRef>
+            <a:effectRef idx="0">
+              <a:schemeClr val="accent1"/>
+            </a:effectRef>
+            <a:fontRef idx="minor">
+              <a:schemeClr val="lt1"/>
+            </a:fontRef>
+          </p:style>
+          <p:txBody>
+            <a:bodyPr rtlCol="0" anchor="ctr"/>
+            <a:lstStyle/>
+            <a:p>
+              <a:pPr algn="ctr"/>
+              <a:endParaRPr lang="ru-RU"/>
+            </a:p>
+          </p:txBody>
+        </p:sp>
+        <p:sp>
+          <p:nvSpPr>
+            <p:cNvPr id="29" name="Блок-схема: извлечение 28"/>
+            <p:cNvSpPr/>
+            <p:nvPr/>
+          </p:nvSpPr>
+          <p:spPr>
+            <a:xfrm rot="5400000">
+              <a:off x="9675650" y="3117509"/>
+              <a:ext cx="178689" cy="350865"/>
+            </a:xfrm>
+            <a:prstGeom prst="flowChartExtract">
+              <a:avLst/>
+            </a:prstGeom>
+            <a:solidFill>
+              <a:schemeClr val="tx1"/>
+            </a:solidFill>
+            <a:ln>
+              <a:solidFill>
+                <a:schemeClr val="tx1"/>
+              </a:solidFill>
+            </a:ln>
+          </p:spPr>
+          <p:style>
+            <a:lnRef idx="2">
+              <a:schemeClr val="accent1">
+                <a:shade val="50000"/>
+              </a:schemeClr>
+            </a:lnRef>
+            <a:fillRef idx="1">
+              <a:schemeClr val="accent1"/>
+            </a:fillRef>
+            <a:effectRef idx="0">
+              <a:schemeClr val="accent1"/>
+            </a:effectRef>
+            <a:fontRef idx="minor">
+              <a:schemeClr val="lt1"/>
+            </a:fontRef>
+          </p:style>
+          <p:txBody>
+            <a:bodyPr rtlCol="0" anchor="ctr"/>
+            <a:lstStyle/>
+            <a:p>
+              <a:pPr algn="ctr"/>
+              <a:endParaRPr lang="ru-RU"/>
+            </a:p>
+          </p:txBody>
+        </p:sp>
+        <p:sp>
+          <p:nvSpPr>
             <p:cNvPr id="31" name="Прямоугольник 30"/>
             <p:cNvSpPr/>
             <p:nvPr/>
           </p:nvSpPr>
           <p:spPr>
             <a:xfrm>
-              <a:off x="8134546" y="466725"/>
+              <a:off x="8063525" y="511113"/>
               <a:ext cx="694267" cy="550755"/>
             </a:xfrm>
             <a:prstGeom prst="rect">
@@ -4713,7 +5585,7 @@
           </p:nvSpPr>
           <p:spPr>
             <a:xfrm>
-              <a:off x="9172381" y="2701030"/>
+              <a:off x="9101360" y="2745418"/>
               <a:ext cx="694267" cy="550755"/>
             </a:xfrm>
             <a:prstGeom prst="rect">
@@ -4783,7 +5655,7 @@
           </p:nvCxnSpPr>
           <p:spPr>
             <a:xfrm flipV="1">
-              <a:off x="5875367" y="466725"/>
+              <a:off x="5804346" y="511113"/>
               <a:ext cx="1264641" cy="2773891"/>
             </a:xfrm>
             <a:prstGeom prst="line">
@@ -4811,42 +5683,6 @@
             </a:fontRef>
           </p:style>
         </p:cxnSp>
-        <p:cxnSp>
-          <p:nvCxnSpPr>
-            <p:cNvPr id="37" name="Прямая соединительная линия 36"/>
-            <p:cNvCxnSpPr/>
-            <p:nvPr/>
-          </p:nvCxnSpPr>
-          <p:spPr>
-            <a:xfrm flipH="1" flipV="1">
-              <a:off x="3430586" y="652688"/>
-              <a:ext cx="2411414" cy="2619680"/>
-            </a:xfrm>
-            <a:prstGeom prst="line">
-              <a:avLst/>
-            </a:prstGeom>
-            <a:ln w="38100">
-              <a:solidFill>
-                <a:srgbClr val="FF0000"/>
-              </a:solidFill>
-              <a:prstDash val="solid"/>
-            </a:ln>
-          </p:spPr>
-          <p:style>
-            <a:lnRef idx="1">
-              <a:schemeClr val="accent1"/>
-            </a:lnRef>
-            <a:fillRef idx="0">
-              <a:schemeClr val="accent1"/>
-            </a:fillRef>
-            <a:effectRef idx="0">
-              <a:schemeClr val="accent1"/>
-            </a:effectRef>
-            <a:fontRef idx="minor">
-              <a:schemeClr val="tx1"/>
-            </a:fontRef>
-          </p:style>
-        </p:cxnSp>
         <p:sp>
           <p:nvSpPr>
             <p:cNvPr id="39" name="Блок-схема: извлечение 38"/>
@@ -4855,7 +5691,7 @@
           </p:nvSpPr>
           <p:spPr>
             <a:xfrm rot="8214100">
-              <a:off x="4353179" y="1566614"/>
+              <a:off x="5506411" y="2895149"/>
               <a:ext cx="250218" cy="473971"/>
             </a:xfrm>
             <a:prstGeom prst="flowChartExtract">
@@ -4867,54 +5703,6 @@
             <a:ln>
               <a:solidFill>
                 <a:srgbClr val="FF0000"/>
-              </a:solidFill>
-            </a:ln>
-          </p:spPr>
-          <p:style>
-            <a:lnRef idx="2">
-              <a:schemeClr val="accent1">
-                <a:shade val="50000"/>
-              </a:schemeClr>
-            </a:lnRef>
-            <a:fillRef idx="1">
-              <a:schemeClr val="accent1"/>
-            </a:fillRef>
-            <a:effectRef idx="0">
-              <a:schemeClr val="accent1"/>
-            </a:effectRef>
-            <a:fontRef idx="minor">
-              <a:schemeClr val="lt1"/>
-            </a:fontRef>
-          </p:style>
-          <p:txBody>
-            <a:bodyPr rtlCol="0" anchor="ctr"/>
-            <a:lstStyle/>
-            <a:p>
-              <a:pPr algn="ctr"/>
-              <a:endParaRPr lang="ru-RU"/>
-            </a:p>
-          </p:txBody>
-        </p:sp>
-        <p:sp>
-          <p:nvSpPr>
-            <p:cNvPr id="40" name="Блок-схема: извлечение 39"/>
-            <p:cNvSpPr/>
-            <p:nvPr/>
-          </p:nvSpPr>
-          <p:spPr>
-            <a:xfrm rot="1573129">
-              <a:off x="6894140" y="455271"/>
-              <a:ext cx="283169" cy="488828"/>
-            </a:xfrm>
-            <a:prstGeom prst="flowChartExtract">
-              <a:avLst/>
-            </a:prstGeom>
-            <a:solidFill>
-              <a:srgbClr val="00B050"/>
-            </a:solidFill>
-            <a:ln>
-              <a:solidFill>
-                <a:srgbClr val="00B050"/>
               </a:solidFill>
             </a:ln>
           </p:spPr>
@@ -4951,7 +5739,7 @@
           </p:nvCxnSpPr>
           <p:spPr>
             <a:xfrm>
-              <a:off x="7145287" y="466726"/>
+              <a:off x="7074266" y="511114"/>
               <a:ext cx="0" cy="2191807"/>
             </a:xfrm>
             <a:prstGeom prst="line">
@@ -4959,7 +5747,9 @@
             </a:prstGeom>
             <a:ln w="12700">
               <a:solidFill>
-                <a:srgbClr val="193797"/>
+                <a:schemeClr val="bg1">
+                  <a:lumMod val="50000"/>
+                </a:schemeClr>
               </a:solidFill>
               <a:prstDash val="dash"/>
             </a:ln>
@@ -4987,7 +5777,7 @@
           </p:nvCxnSpPr>
           <p:spPr>
             <a:xfrm flipH="1">
-              <a:off x="5909735" y="2658533"/>
+              <a:off x="5838714" y="2702921"/>
               <a:ext cx="1235552" cy="605897"/>
             </a:xfrm>
             <a:prstGeom prst="line">
@@ -4995,7 +5785,7 @@
             </a:prstGeom>
             <a:ln w="12700">
               <a:solidFill>
-                <a:srgbClr val="00B050"/>
+                <a:schemeClr val="tx1"/>
               </a:solidFill>
               <a:prstDash val="dash"/>
             </a:ln>
@@ -5023,7 +5813,7 @@
           </p:nvCxnSpPr>
           <p:spPr>
             <a:xfrm flipH="1">
-              <a:off x="5865623" y="506505"/>
+              <a:off x="5794602" y="550893"/>
               <a:ext cx="1235552" cy="605897"/>
             </a:xfrm>
             <a:prstGeom prst="line">
@@ -5031,7 +5821,9 @@
             </a:prstGeom>
             <a:ln w="12700">
               <a:solidFill>
-                <a:srgbClr val="193797"/>
+                <a:schemeClr val="bg1">
+                  <a:lumMod val="50000"/>
+                </a:schemeClr>
               </a:solidFill>
               <a:prstDash val="dash"/>
             </a:ln>
@@ -5054,20 +5846,24 @@
         <p:cxnSp>
           <p:nvCxnSpPr>
             <p:cNvPr id="48" name="Прямая соединительная линия 47"/>
-            <p:cNvCxnSpPr/>
+            <p:cNvCxnSpPr>
+              <a:cxnSpLocks/>
+            </p:cNvCxnSpPr>
             <p:nvPr/>
           </p:nvCxnSpPr>
           <p:spPr>
             <a:xfrm flipH="1">
-              <a:off x="6714067" y="2658533"/>
-              <a:ext cx="431220" cy="562462"/>
+              <a:off x="6575985" y="2728619"/>
+              <a:ext cx="494001" cy="544556"/>
             </a:xfrm>
             <a:prstGeom prst="line">
               <a:avLst/>
             </a:prstGeom>
             <a:ln w="12700">
               <a:solidFill>
-                <a:srgbClr val="193797"/>
+                <a:schemeClr val="bg1">
+                  <a:lumMod val="50000"/>
+                </a:schemeClr>
               </a:solidFill>
               <a:prstDash val="dash"/>
             </a:ln>
@@ -5090,20 +5886,24 @@
         <p:cxnSp>
           <p:nvCxnSpPr>
             <p:cNvPr id="51" name="Прямая соединительная линия 50"/>
-            <p:cNvCxnSpPr/>
+            <p:cNvCxnSpPr>
+              <a:cxnSpLocks/>
+            </p:cNvCxnSpPr>
             <p:nvPr/>
           </p:nvCxnSpPr>
           <p:spPr>
-            <a:xfrm flipH="1" flipV="1">
-              <a:off x="6555599" y="2577127"/>
-              <a:ext cx="522846" cy="40703"/>
+            <a:xfrm flipH="1">
+              <a:off x="6359461" y="2707268"/>
+              <a:ext cx="722149" cy="14086"/>
             </a:xfrm>
             <a:prstGeom prst="line">
               <a:avLst/>
             </a:prstGeom>
             <a:ln w="12700">
               <a:solidFill>
-                <a:srgbClr val="193797"/>
+                <a:schemeClr val="bg1">
+                  <a:lumMod val="50000"/>
+                </a:schemeClr>
               </a:solidFill>
               <a:prstDash val="dash"/>
             </a:ln>
@@ -5131,8 +5931,405 @@
           </p:nvSpPr>
           <p:spPr>
             <a:xfrm rot="3794235">
-              <a:off x="6814846" y="2632995"/>
+              <a:off x="6857955" y="2632611"/>
               <a:ext cx="136866" cy="298204"/>
+            </a:xfrm>
+            <a:prstGeom prst="flowChartExtract">
+              <a:avLst/>
+            </a:prstGeom>
+            <a:solidFill>
+              <a:schemeClr val="tx1"/>
+            </a:solidFill>
+            <a:ln>
+              <a:solidFill>
+                <a:schemeClr val="tx1"/>
+              </a:solidFill>
+            </a:ln>
+          </p:spPr>
+          <p:style>
+            <a:lnRef idx="2">
+              <a:schemeClr val="accent1">
+                <a:shade val="50000"/>
+              </a:schemeClr>
+            </a:lnRef>
+            <a:fillRef idx="1">
+              <a:schemeClr val="accent1"/>
+            </a:fillRef>
+            <a:effectRef idx="0">
+              <a:schemeClr val="accent1"/>
+            </a:effectRef>
+            <a:fontRef idx="minor">
+              <a:schemeClr val="lt1"/>
+            </a:fontRef>
+          </p:style>
+          <p:txBody>
+            <a:bodyPr rtlCol="0" anchor="ctr"/>
+            <a:lstStyle/>
+            <a:p>
+              <a:pPr algn="ctr"/>
+              <a:endParaRPr lang="ru-RU">
+                <a:ln>
+                  <a:solidFill>
+                    <a:sysClr val="windowText" lastClr="000000"/>
+                  </a:solidFill>
+                </a:ln>
+                <a:solidFill>
+                  <a:schemeClr val="tx1"/>
+                </a:solidFill>
+              </a:endParaRPr>
+            </a:p>
+          </p:txBody>
+        </p:sp>
+        <p:sp>
+          <p:nvSpPr>
+            <p:cNvPr id="61" name="Прямоугольник 60"/>
+            <p:cNvSpPr/>
+            <p:nvPr/>
+          </p:nvSpPr>
+          <p:spPr>
+            <a:xfrm>
+              <a:off x="6299789" y="2899534"/>
+              <a:ext cx="356188" cy="400110"/>
+            </a:xfrm>
+            <a:prstGeom prst="rect">
+              <a:avLst/>
+            </a:prstGeom>
+          </p:spPr>
+          <p:txBody>
+            <a:bodyPr wrap="none">
+              <a:spAutoFit/>
+            </a:bodyPr>
+            <a:lstStyle/>
+            <a:p>
+              <a:r>
+                <a:rPr lang="el-GR" sz="2000" b="1" dirty="0">
+                  <a:solidFill>
+                    <a:sysClr val="windowText" lastClr="000000"/>
+                  </a:solidFill>
+                  <a:effectLst>
+                    <a:outerShdw blurRad="38100" dist="38100" dir="2700000" algn="tl">
+                      <a:srgbClr val="000000">
+                        <a:alpha val="43137"/>
+                      </a:srgbClr>
+                    </a:outerShdw>
+                  </a:effectLst>
+                  <a:latin typeface="Bahnschrift Light" panose="020B0502040204020203" pitchFamily="34" charset="0"/>
+                  <a:cs typeface="Times New Roman" panose="02020603050405020304" pitchFamily="18" charset="0"/>
+                </a:rPr>
+                <a:t>ϕ</a:t>
+              </a:r>
+              <a:endParaRPr lang="ru-RU" sz="2000" dirty="0">
+                <a:latin typeface="Bahnschrift Light" panose="020B0502040204020203" pitchFamily="34" charset="0"/>
+                <a:cs typeface="Times New Roman" panose="02020603050405020304" pitchFamily="18" charset="0"/>
+              </a:endParaRPr>
+            </a:p>
+          </p:txBody>
+        </p:sp>
+        <p:sp>
+          <p:nvSpPr>
+            <p:cNvPr id="64" name="Прямоугольник 63"/>
+            <p:cNvSpPr/>
+            <p:nvPr/>
+          </p:nvSpPr>
+          <p:spPr>
+            <a:xfrm>
+              <a:off x="7300352" y="1726684"/>
+              <a:ext cx="2321618" cy="1569660"/>
+            </a:xfrm>
+            <a:prstGeom prst="rect">
+              <a:avLst/>
+            </a:prstGeom>
+          </p:spPr>
+          <p:txBody>
+            <a:bodyPr wrap="square">
+              <a:spAutoFit/>
+            </a:bodyPr>
+            <a:lstStyle/>
+            <a:p>
+              <a:r>
+                <a:rPr lang="ru-RU" sz="3200" b="1" dirty="0">
+                  <a:solidFill>
+                    <a:sysClr val="windowText" lastClr="000000"/>
+                  </a:solidFill>
+                  <a:effectLst>
+                    <a:outerShdw blurRad="38100" dist="38100" dir="2700000" algn="tl">
+                      <a:srgbClr val="000000">
+                        <a:alpha val="43137"/>
+                      </a:srgbClr>
+                    </a:outerShdw>
+                  </a:effectLst>
+                  <a:latin typeface="+mj-lt"/>
+                </a:rPr>
+                <a:t>0</a:t>
+              </a:r>
+              <a:r>
+                <a:rPr lang="en-GB" sz="3200" b="1" dirty="0">
+                  <a:solidFill>
+                    <a:sysClr val="windowText" lastClr="000000"/>
+                  </a:solidFill>
+                  <a:effectLst>
+                    <a:outerShdw blurRad="38100" dist="38100" dir="2700000" algn="tl">
+                      <a:srgbClr val="000000">
+                        <a:alpha val="43137"/>
+                      </a:srgbClr>
+                    </a:outerShdw>
+                  </a:effectLst>
+                  <a:latin typeface="+mj-lt"/>
+                </a:rPr>
+                <a:t>&lt;</a:t>
+              </a:r>
+              <a:r>
+                <a:rPr lang="el-GR" sz="3200" b="1" dirty="0">
+                  <a:solidFill>
+                    <a:sysClr val="windowText" lastClr="000000"/>
+                  </a:solidFill>
+                  <a:effectLst>
+                    <a:outerShdw blurRad="38100" dist="38100" dir="2700000" algn="tl">
+                      <a:srgbClr val="000000">
+                        <a:alpha val="43137"/>
+                      </a:srgbClr>
+                    </a:outerShdw>
+                  </a:effectLst>
+                  <a:latin typeface="+mj-lt"/>
+                </a:rPr>
+                <a:t>α</a:t>
+              </a:r>
+              <a:r>
+                <a:rPr lang="en-US" sz="3200" b="1" dirty="0">
+                  <a:solidFill>
+                    <a:sysClr val="windowText" lastClr="000000"/>
+                  </a:solidFill>
+                  <a:effectLst>
+                    <a:outerShdw blurRad="38100" dist="38100" dir="2700000" algn="tl">
+                      <a:srgbClr val="000000">
+                        <a:alpha val="43137"/>
+                      </a:srgbClr>
+                    </a:outerShdw>
+                  </a:effectLst>
+                  <a:latin typeface="+mj-lt"/>
+                </a:rPr>
+                <a:t>&lt;90</a:t>
+              </a:r>
+            </a:p>
+            <a:p>
+              <a:r>
+                <a:rPr lang="en-US" sz="3200" b="1" dirty="0">
+                  <a:solidFill>
+                    <a:sysClr val="windowText" lastClr="000000"/>
+                  </a:solidFill>
+                  <a:effectLst>
+                    <a:outerShdw blurRad="38100" dist="38100" dir="2700000" algn="tl">
+                      <a:srgbClr val="000000">
+                        <a:alpha val="43137"/>
+                      </a:srgbClr>
+                    </a:outerShdw>
+                  </a:effectLst>
+                  <a:latin typeface="+mj-lt"/>
+                </a:rPr>
+                <a:t>0&lt;</a:t>
+              </a:r>
+              <a:r>
+                <a:rPr lang="el-GR" sz="3200" b="1" dirty="0">
+                  <a:solidFill>
+                    <a:sysClr val="windowText" lastClr="000000"/>
+                  </a:solidFill>
+                  <a:effectLst>
+                    <a:outerShdw blurRad="38100" dist="38100" dir="2700000" algn="tl">
+                      <a:srgbClr val="000000">
+                        <a:alpha val="43137"/>
+                      </a:srgbClr>
+                    </a:outerShdw>
+                  </a:effectLst>
+                  <a:latin typeface="+mj-lt"/>
+                </a:rPr>
+                <a:t>β</a:t>
+              </a:r>
+              <a:r>
+                <a:rPr lang="en-US" sz="3200" b="1" dirty="0">
+                  <a:solidFill>
+                    <a:sysClr val="windowText" lastClr="000000"/>
+                  </a:solidFill>
+                  <a:effectLst>
+                    <a:outerShdw blurRad="38100" dist="38100" dir="2700000" algn="tl">
+                      <a:srgbClr val="000000">
+                        <a:alpha val="43137"/>
+                      </a:srgbClr>
+                    </a:outerShdw>
+                  </a:effectLst>
+                  <a:latin typeface="+mj-lt"/>
+                </a:rPr>
+                <a:t>&lt;90</a:t>
+              </a:r>
+            </a:p>
+            <a:p>
+              <a:r>
+                <a:rPr lang="en-US" sz="3200" b="1" dirty="0">
+                  <a:solidFill>
+                    <a:sysClr val="windowText" lastClr="000000"/>
+                  </a:solidFill>
+                  <a:effectLst>
+                    <a:outerShdw blurRad="38100" dist="38100" dir="2700000" algn="tl">
+                      <a:srgbClr val="000000">
+                        <a:alpha val="43137"/>
+                      </a:srgbClr>
+                    </a:outerShdw>
+                  </a:effectLst>
+                  <a:latin typeface="+mj-lt"/>
+                </a:rPr>
+                <a:t>0&lt;</a:t>
+              </a:r>
+              <a:r>
+                <a:rPr lang="el-GR" sz="3200" b="1" dirty="0">
+                  <a:solidFill>
+                    <a:sysClr val="windowText" lastClr="000000"/>
+                  </a:solidFill>
+                  <a:effectLst>
+                    <a:outerShdw blurRad="38100" dist="38100" dir="2700000" algn="tl">
+                      <a:srgbClr val="000000">
+                        <a:alpha val="43137"/>
+                      </a:srgbClr>
+                    </a:outerShdw>
+                  </a:effectLst>
+                  <a:latin typeface="Bahnschrift Light" panose="020B0502040204020203" pitchFamily="34" charset="0"/>
+                  <a:cs typeface="Times New Roman" panose="02020603050405020304" pitchFamily="18" charset="0"/>
+                </a:rPr>
+                <a:t>ϕ</a:t>
+              </a:r>
+              <a:r>
+                <a:rPr lang="en-US" sz="3200" b="1" dirty="0">
+                  <a:solidFill>
+                    <a:sysClr val="windowText" lastClr="000000"/>
+                  </a:solidFill>
+                  <a:effectLst>
+                    <a:outerShdw blurRad="38100" dist="38100" dir="2700000" algn="tl">
+                      <a:srgbClr val="000000">
+                        <a:alpha val="43137"/>
+                      </a:srgbClr>
+                    </a:outerShdw>
+                  </a:effectLst>
+                  <a:latin typeface="+mj-lt"/>
+                </a:rPr>
+                <a:t>&lt;180</a:t>
+              </a:r>
+            </a:p>
+          </p:txBody>
+        </p:sp>
+        <p:sp>
+          <p:nvSpPr>
+            <p:cNvPr id="66" name="Прямоугольник 65"/>
+            <p:cNvSpPr/>
+            <p:nvPr/>
+          </p:nvSpPr>
+          <p:spPr>
+            <a:xfrm>
+              <a:off x="5762223" y="1445686"/>
+              <a:ext cx="694267" cy="550755"/>
+            </a:xfrm>
+            <a:prstGeom prst="rect">
+              <a:avLst/>
+            </a:prstGeom>
+            <a:noFill/>
+            <a:ln>
+              <a:noFill/>
+            </a:ln>
+          </p:spPr>
+          <p:style>
+            <a:lnRef idx="2">
+              <a:schemeClr val="accent1">
+                <a:shade val="50000"/>
+              </a:schemeClr>
+            </a:lnRef>
+            <a:fillRef idx="1">
+              <a:schemeClr val="accent1"/>
+            </a:fillRef>
+            <a:effectRef idx="0">
+              <a:schemeClr val="accent1"/>
+            </a:effectRef>
+            <a:fontRef idx="minor">
+              <a:schemeClr val="lt1"/>
+            </a:fontRef>
+          </p:style>
+          <p:txBody>
+            <a:bodyPr rtlCol="0" anchor="ctr"/>
+            <a:lstStyle/>
+            <a:p>
+              <a:pPr algn="ctr"/>
+              <a:r>
+                <a:rPr lang="el-GR" sz="2400" b="1" dirty="0">
+                  <a:solidFill>
+                    <a:srgbClr val="00B050"/>
+                  </a:solidFill>
+                  <a:effectLst>
+                    <a:outerShdw blurRad="38100" dist="38100" dir="2700000" algn="tl">
+                      <a:srgbClr val="000000">
+                        <a:alpha val="43137"/>
+                      </a:srgbClr>
+                    </a:outerShdw>
+                  </a:effectLst>
+                </a:rPr>
+                <a:t>β</a:t>
+              </a:r>
+              <a:endParaRPr lang="ru-RU" sz="2400" b="1" dirty="0">
+                <a:solidFill>
+                  <a:srgbClr val="00B050"/>
+                </a:solidFill>
+                <a:effectLst>
+                  <a:outerShdw blurRad="38100" dist="38100" dir="2700000" algn="tl">
+                    <a:srgbClr val="000000">
+                      <a:alpha val="43137"/>
+                    </a:srgbClr>
+                  </a:outerShdw>
+                </a:effectLst>
+              </a:endParaRPr>
+            </a:p>
+          </p:txBody>
+        </p:sp>
+        <p:cxnSp>
+          <p:nvCxnSpPr>
+            <p:cNvPr id="12" name="Прямая соединительная линия 11"/>
+            <p:cNvCxnSpPr/>
+            <p:nvPr/>
+          </p:nvCxnSpPr>
+          <p:spPr>
+            <a:xfrm flipV="1">
+              <a:off x="5847143" y="3284753"/>
+              <a:ext cx="3805237" cy="15876"/>
+            </a:xfrm>
+            <a:prstGeom prst="line">
+              <a:avLst/>
+            </a:prstGeom>
+            <a:ln w="38100">
+              <a:solidFill>
+                <a:schemeClr val="tx1"/>
+              </a:solidFill>
+              <a:prstDash val="solid"/>
+            </a:ln>
+          </p:spPr>
+          <p:style>
+            <a:lnRef idx="1">
+              <a:schemeClr val="accent1"/>
+            </a:lnRef>
+            <a:fillRef idx="0">
+              <a:schemeClr val="accent1"/>
+            </a:fillRef>
+            <a:effectRef idx="0">
+              <a:schemeClr val="accent1"/>
+            </a:effectRef>
+            <a:fontRef idx="minor">
+              <a:schemeClr val="tx1"/>
+            </a:fontRef>
+          </p:style>
+        </p:cxnSp>
+        <p:sp>
+          <p:nvSpPr>
+            <p:cNvPr id="40" name="Блок-схема: извлечение 39"/>
+            <p:cNvSpPr/>
+            <p:nvPr/>
+          </p:nvSpPr>
+          <p:spPr>
+            <a:xfrm rot="1573129">
+              <a:off x="6823119" y="499659"/>
+              <a:ext cx="283169" cy="488828"/>
             </a:xfrm>
             <a:prstGeom prst="flowChartExtract">
               <a:avLst/>
@@ -5173,18 +6370,702 @@
         </p:sp>
         <p:sp>
           <p:nvSpPr>
-            <p:cNvPr id="56" name="Дуга 55"/>
+            <p:cNvPr id="38" name="Овал 37">
+              <a:extLst>
+                <a:ext uri="{FF2B5EF4-FFF2-40B4-BE49-F238E27FC236}">
+                  <a16:creationId xmlns:a16="http://schemas.microsoft.com/office/drawing/2014/main" id="{C42FCB13-71DA-54CA-64E1-7506E716401B}"/>
+                </a:ext>
+              </a:extLst>
+            </p:cNvPr>
             <p:cNvSpPr/>
             <p:nvPr/>
           </p:nvSpPr>
           <p:spPr>
-            <a:xfrm rot="17936238">
-              <a:off x="4841761" y="1598796"/>
-              <a:ext cx="1295400" cy="1191496"/>
+            <a:xfrm>
+              <a:off x="5709967" y="3216833"/>
+              <a:ext cx="155787" cy="156654"/>
+            </a:xfrm>
+            <a:prstGeom prst="ellipse">
+              <a:avLst/>
+            </a:prstGeom>
+            <a:solidFill>
+              <a:schemeClr val="tx1"/>
+            </a:solidFill>
+            <a:ln>
+              <a:solidFill>
+                <a:schemeClr val="tx1"/>
+              </a:solidFill>
+            </a:ln>
+          </p:spPr>
+          <p:style>
+            <a:lnRef idx="2">
+              <a:schemeClr val="accent1">
+                <a:shade val="15000"/>
+              </a:schemeClr>
+            </a:lnRef>
+            <a:fillRef idx="1">
+              <a:schemeClr val="accent1"/>
+            </a:fillRef>
+            <a:effectRef idx="0">
+              <a:schemeClr val="accent1"/>
+            </a:effectRef>
+            <a:fontRef idx="minor">
+              <a:schemeClr val="lt1"/>
+            </a:fontRef>
+          </p:style>
+          <p:txBody>
+            <a:bodyPr rtlCol="0" anchor="ctr"/>
+            <a:lstStyle/>
+            <a:p>
+              <a:pPr algn="ctr"/>
+              <a:endParaRPr lang="ru-RU"/>
+            </a:p>
+          </p:txBody>
+        </p:sp>
+        <p:sp>
+          <p:nvSpPr>
+            <p:cNvPr id="44" name="TextBox 43">
+              <a:extLst>
+                <a:ext uri="{FF2B5EF4-FFF2-40B4-BE49-F238E27FC236}">
+                  <a16:creationId xmlns:a16="http://schemas.microsoft.com/office/drawing/2014/main" id="{DB174D58-4068-533D-4C75-B707504A9573}"/>
+                </a:ext>
+              </a:extLst>
+            </p:cNvPr>
+            <p:cNvSpPr txBox="1"/>
+            <p:nvPr/>
+          </p:nvSpPr>
+          <p:spPr>
+            <a:xfrm>
+              <a:off x="178310" y="5258875"/>
+              <a:ext cx="2931479" cy="923330"/>
+            </a:xfrm>
+            <a:prstGeom prst="rect">
+              <a:avLst/>
+            </a:prstGeom>
+            <a:noFill/>
+          </p:spPr>
+          <p:txBody>
+            <a:bodyPr wrap="square">
+              <a:spAutoFit/>
+            </a:bodyPr>
+            <a:lstStyle/>
+            <a:p>
+              <a:pPr algn="r"/>
+              <a:r>
+                <a:rPr lang="en-US" b="1" dirty="0">
+                  <a:solidFill>
+                    <a:srgbClr val="FF0000"/>
+                  </a:solidFill>
+                  <a:effectLst>
+                    <a:outerShdw blurRad="38100" dist="38100" dir="2700000" algn="tl">
+                      <a:srgbClr val="000000">
+                        <a:alpha val="43137"/>
+                      </a:srgbClr>
+                    </a:outerShdw>
+                  </a:effectLst>
+                  <a:latin typeface="+mj-lt"/>
+                </a:rPr>
+                <a:t>red</a:t>
+              </a:r>
+              <a:r>
+                <a:rPr lang="en-US" b="1" dirty="0">
+                  <a:solidFill>
+                    <a:srgbClr val="00B050"/>
+                  </a:solidFill>
+                  <a:effectLst>
+                    <a:outerShdw blurRad="38100" dist="38100" dir="2700000" algn="tl">
+                      <a:srgbClr val="000000">
+                        <a:alpha val="43137"/>
+                      </a:srgbClr>
+                    </a:outerShdw>
+                  </a:effectLst>
+                  <a:latin typeface="+mj-lt"/>
+                </a:rPr>
+                <a:t> </a:t>
+              </a:r>
+              <a:r>
+                <a:rPr lang="en-US" b="1" dirty="0">
+                  <a:effectLst>
+                    <a:outerShdw blurRad="38100" dist="38100" dir="2700000" algn="tl">
+                      <a:srgbClr val="000000">
+                        <a:alpha val="43137"/>
+                      </a:srgbClr>
+                    </a:outerShdw>
+                  </a:effectLst>
+                  <a:latin typeface="+mj-lt"/>
+                </a:rPr>
+                <a:t>- incident</a:t>
+              </a:r>
+            </a:p>
+            <a:p>
+              <a:pPr algn="r"/>
+              <a:r>
+                <a:rPr lang="en-US" b="1" dirty="0">
+                  <a:solidFill>
+                    <a:srgbClr val="0070C0"/>
+                  </a:solidFill>
+                  <a:effectLst>
+                    <a:outerShdw blurRad="38100" dist="38100" dir="2700000" algn="tl">
+                      <a:srgbClr val="000000">
+                        <a:alpha val="43137"/>
+                      </a:srgbClr>
+                    </a:outerShdw>
+                  </a:effectLst>
+                  <a:latin typeface="+mj-lt"/>
+                </a:rPr>
+                <a:t>blue</a:t>
+              </a:r>
+              <a:r>
+                <a:rPr lang="en-US" b="1" dirty="0">
+                  <a:solidFill>
+                    <a:sysClr val="windowText" lastClr="000000"/>
+                  </a:solidFill>
+                  <a:effectLst>
+                    <a:outerShdw blurRad="38100" dist="38100" dir="2700000" algn="tl">
+                      <a:srgbClr val="000000">
+                        <a:alpha val="43137"/>
+                      </a:srgbClr>
+                    </a:outerShdw>
+                  </a:effectLst>
+                  <a:latin typeface="+mj-lt"/>
+                </a:rPr>
+                <a:t> – transmitted</a:t>
+              </a:r>
+              <a:endParaRPr lang="en-US" b="1" dirty="0">
+                <a:solidFill>
+                  <a:srgbClr val="00B050"/>
+                </a:solidFill>
+                <a:effectLst>
+                  <a:outerShdw blurRad="38100" dist="38100" dir="2700000" algn="tl">
+                    <a:srgbClr val="000000">
+                      <a:alpha val="43137"/>
+                    </a:srgbClr>
+                  </a:outerShdw>
+                </a:effectLst>
+                <a:latin typeface="+mj-lt"/>
+              </a:endParaRPr>
+            </a:p>
+            <a:p>
+              <a:pPr algn="r"/>
+              <a:r>
+                <a:rPr lang="en-US" b="1" dirty="0">
+                  <a:solidFill>
+                    <a:srgbClr val="00B050"/>
+                  </a:solidFill>
+                  <a:effectLst>
+                    <a:outerShdw blurRad="38100" dist="38100" dir="2700000" algn="tl">
+                      <a:srgbClr val="000000">
+                        <a:alpha val="43137"/>
+                      </a:srgbClr>
+                    </a:outerShdw>
+                  </a:effectLst>
+                  <a:latin typeface="+mj-lt"/>
+                </a:rPr>
+                <a:t>green</a:t>
+              </a:r>
+              <a:r>
+                <a:rPr lang="en-US" b="1" dirty="0">
+                  <a:solidFill>
+                    <a:sysClr val="windowText" lastClr="000000"/>
+                  </a:solidFill>
+                  <a:effectLst>
+                    <a:outerShdw blurRad="38100" dist="38100" dir="2700000" algn="tl">
+                      <a:srgbClr val="000000">
+                        <a:alpha val="43137"/>
+                      </a:srgbClr>
+                    </a:outerShdw>
+                  </a:effectLst>
+                  <a:latin typeface="+mj-lt"/>
+                </a:rPr>
+                <a:t> – scattered, sputtered</a:t>
+              </a:r>
+            </a:p>
+          </p:txBody>
+        </p:sp>
+        <p:sp>
+          <p:nvSpPr>
+            <p:cNvPr id="70" name="Параллелограмм 69">
+              <a:extLst>
+                <a:ext uri="{FF2B5EF4-FFF2-40B4-BE49-F238E27FC236}">
+                  <a16:creationId xmlns:a16="http://schemas.microsoft.com/office/drawing/2014/main" id="{0400DA8B-1BF6-A4B6-B37A-3D218EFC215D}"/>
+                </a:ext>
+              </a:extLst>
+            </p:cNvPr>
+            <p:cNvSpPr/>
+            <p:nvPr/>
+          </p:nvSpPr>
+          <p:spPr>
+            <a:xfrm rot="18780000">
+              <a:off x="5936420" y="3395739"/>
+              <a:ext cx="7985381" cy="235404"/>
+            </a:xfrm>
+            <a:prstGeom prst="parallelogram">
+              <a:avLst>
+                <a:gd name="adj" fmla="val 106276"/>
+              </a:avLst>
+            </a:prstGeom>
+            <a:solidFill>
+              <a:schemeClr val="accent4">
+                <a:lumMod val="40000"/>
+                <a:lumOff val="60000"/>
+                <a:alpha val="32000"/>
+              </a:schemeClr>
+            </a:solidFill>
+            <a:ln>
+              <a:solidFill>
+                <a:schemeClr val="tx1"/>
+              </a:solidFill>
+            </a:ln>
+          </p:spPr>
+          <p:style>
+            <a:lnRef idx="2">
+              <a:schemeClr val="accent1">
+                <a:shade val="15000"/>
+              </a:schemeClr>
+            </a:lnRef>
+            <a:fillRef idx="1">
+              <a:schemeClr val="accent1"/>
+            </a:fillRef>
+            <a:effectRef idx="0">
+              <a:schemeClr val="accent1"/>
+            </a:effectRef>
+            <a:fontRef idx="minor">
+              <a:schemeClr val="lt1"/>
+            </a:fontRef>
+          </p:style>
+          <p:txBody>
+            <a:bodyPr rtlCol="0" anchor="ctr"/>
+            <a:lstStyle/>
+            <a:p>
+              <a:pPr algn="ctr"/>
+              <a:endParaRPr lang="ru-RU"/>
+            </a:p>
+          </p:txBody>
+        </p:sp>
+        <p:sp>
+          <p:nvSpPr>
+            <p:cNvPr id="71" name="Параллелограмм 70">
+              <a:extLst>
+                <a:ext uri="{FF2B5EF4-FFF2-40B4-BE49-F238E27FC236}">
+                  <a16:creationId xmlns:a16="http://schemas.microsoft.com/office/drawing/2014/main" id="{AB7DDB4B-7FE7-A5EC-F7BD-D4A95725FFF6}"/>
+                </a:ext>
+              </a:extLst>
+            </p:cNvPr>
+            <p:cNvSpPr/>
+            <p:nvPr/>
+          </p:nvSpPr>
+          <p:spPr>
+            <a:xfrm>
+              <a:off x="50017" y="6171646"/>
+              <a:ext cx="7237635" cy="348910"/>
+            </a:xfrm>
+            <a:prstGeom prst="parallelogram">
+              <a:avLst>
+                <a:gd name="adj" fmla="val 0"/>
+              </a:avLst>
+            </a:prstGeom>
+            <a:solidFill>
+              <a:schemeClr val="accent4">
+                <a:lumMod val="40000"/>
+                <a:lumOff val="60000"/>
+                <a:alpha val="32000"/>
+              </a:schemeClr>
+            </a:solidFill>
+            <a:ln>
+              <a:solidFill>
+                <a:schemeClr val="tx1"/>
+              </a:solidFill>
+            </a:ln>
+          </p:spPr>
+          <p:style>
+            <a:lnRef idx="2">
+              <a:schemeClr val="accent1">
+                <a:shade val="15000"/>
+              </a:schemeClr>
+            </a:lnRef>
+            <a:fillRef idx="1">
+              <a:schemeClr val="accent1"/>
+            </a:fillRef>
+            <a:effectRef idx="0">
+              <a:schemeClr val="accent1"/>
+            </a:effectRef>
+            <a:fontRef idx="minor">
+              <a:schemeClr val="lt1"/>
+            </a:fontRef>
+          </p:style>
+          <p:txBody>
+            <a:bodyPr rtlCol="0" anchor="ctr"/>
+            <a:lstStyle/>
+            <a:p>
+              <a:pPr algn="ctr"/>
+              <a:endParaRPr lang="ru-RU"/>
+            </a:p>
+          </p:txBody>
+        </p:sp>
+        <p:sp>
+          <p:nvSpPr>
+            <p:cNvPr id="73" name="TextBox 72">
+              <a:extLst>
+                <a:ext uri="{FF2B5EF4-FFF2-40B4-BE49-F238E27FC236}">
+                  <a16:creationId xmlns:a16="http://schemas.microsoft.com/office/drawing/2014/main" id="{1937CCD3-94DD-54FE-8DCD-D111A6BCAB76}"/>
+                </a:ext>
+              </a:extLst>
+            </p:cNvPr>
+            <p:cNvSpPr txBox="1"/>
+            <p:nvPr/>
+          </p:nvSpPr>
+          <p:spPr>
+            <a:xfrm>
+              <a:off x="10800580" y="505046"/>
+              <a:ext cx="1634309" cy="369332"/>
+            </a:xfrm>
+            <a:prstGeom prst="rect">
+              <a:avLst/>
+            </a:prstGeom>
+            <a:noFill/>
+          </p:spPr>
+          <p:txBody>
+            <a:bodyPr wrap="square">
+              <a:spAutoFit/>
+            </a:bodyPr>
+            <a:lstStyle/>
+            <a:p>
+              <a:r>
+                <a:rPr lang="en-US" b="1" dirty="0" err="1">
+                  <a:effectLst>
+                    <a:outerShdw blurRad="38100" dist="38100" dir="2700000" algn="tl">
+                      <a:srgbClr val="000000">
+                        <a:alpha val="43137"/>
+                      </a:srgbClr>
+                    </a:outerShdw>
+                  </a:effectLst>
+                  <a:latin typeface="+mj-lt"/>
+                </a:rPr>
+                <a:t>ISInCa</a:t>
+              </a:r>
+              <a:r>
+                <a:rPr lang="en-US" b="1" dirty="0">
+                  <a:effectLst>
+                    <a:outerShdw blurRad="38100" dist="38100" dir="2700000" algn="tl">
+                      <a:srgbClr val="000000">
+                        <a:alpha val="43137"/>
+                      </a:srgbClr>
+                    </a:outerShdw>
+                  </a:effectLst>
+                  <a:latin typeface="+mj-lt"/>
+                </a:rPr>
+                <a:t> angles</a:t>
+              </a:r>
+              <a:endParaRPr lang="ru-RU" dirty="0">
+                <a:latin typeface="+mj-lt"/>
+              </a:endParaRPr>
+            </a:p>
+          </p:txBody>
+        </p:sp>
+        <p:cxnSp>
+          <p:nvCxnSpPr>
+            <p:cNvPr id="76" name="Прямая соединительная линия 75">
+              <a:extLst>
+                <a:ext uri="{FF2B5EF4-FFF2-40B4-BE49-F238E27FC236}">
+                  <a16:creationId xmlns:a16="http://schemas.microsoft.com/office/drawing/2014/main" id="{3B62448B-1A59-CD63-3609-59A9C48746BF}"/>
+                </a:ext>
+              </a:extLst>
+            </p:cNvPr>
+            <p:cNvCxnSpPr>
+              <a:cxnSpLocks/>
+            </p:cNvCxnSpPr>
+            <p:nvPr/>
+          </p:nvCxnSpPr>
+          <p:spPr>
+            <a:xfrm flipH="1">
+              <a:off x="3351420" y="3358862"/>
+              <a:ext cx="2374116" cy="427199"/>
+            </a:xfrm>
+            <a:prstGeom prst="line">
+              <a:avLst/>
+            </a:prstGeom>
+            <a:ln w="12700">
+              <a:solidFill>
+                <a:schemeClr val="tx1"/>
+              </a:solidFill>
+              <a:prstDash val="dash"/>
+            </a:ln>
+          </p:spPr>
+          <p:style>
+            <a:lnRef idx="1">
+              <a:schemeClr val="accent1"/>
+            </a:lnRef>
+            <a:fillRef idx="0">
+              <a:schemeClr val="accent1"/>
+            </a:fillRef>
+            <a:effectRef idx="0">
+              <a:schemeClr val="accent1"/>
+            </a:effectRef>
+            <a:fontRef idx="minor">
+              <a:schemeClr val="tx1"/>
+            </a:fontRef>
+          </p:style>
+        </p:cxnSp>
+        <p:cxnSp>
+          <p:nvCxnSpPr>
+            <p:cNvPr id="78" name="Прямая соединительная линия 77">
+              <a:extLst>
+                <a:ext uri="{FF2B5EF4-FFF2-40B4-BE49-F238E27FC236}">
+                  <a16:creationId xmlns:a16="http://schemas.microsoft.com/office/drawing/2014/main" id="{111A3702-DB4F-BD3E-4F7F-D4828FFF4B99}"/>
+                </a:ext>
+              </a:extLst>
+            </p:cNvPr>
+            <p:cNvCxnSpPr>
+              <a:cxnSpLocks/>
+              <a:endCxn id="85" idx="0"/>
+            </p:cNvCxnSpPr>
+            <p:nvPr/>
+          </p:nvCxnSpPr>
+          <p:spPr>
+            <a:xfrm>
+              <a:off x="3350918" y="1156790"/>
+              <a:ext cx="0" cy="2631453"/>
+            </a:xfrm>
+            <a:prstGeom prst="line">
+              <a:avLst/>
+            </a:prstGeom>
+            <a:ln w="12700">
+              <a:solidFill>
+                <a:schemeClr val="bg1">
+                  <a:lumMod val="50000"/>
+                </a:schemeClr>
+              </a:solidFill>
+              <a:prstDash val="dash"/>
+            </a:ln>
+          </p:spPr>
+          <p:style>
+            <a:lnRef idx="1">
+              <a:schemeClr val="accent1"/>
+            </a:lnRef>
+            <a:fillRef idx="0">
+              <a:schemeClr val="accent1"/>
+            </a:fillRef>
+            <a:effectRef idx="0">
+              <a:schemeClr val="accent1"/>
+            </a:effectRef>
+            <a:fontRef idx="minor">
+              <a:schemeClr val="tx1"/>
+            </a:fontRef>
+          </p:style>
+        </p:cxnSp>
+        <p:cxnSp>
+          <p:nvCxnSpPr>
+            <p:cNvPr id="81" name="Прямая соединительная линия 80">
+              <a:extLst>
+                <a:ext uri="{FF2B5EF4-FFF2-40B4-BE49-F238E27FC236}">
+                  <a16:creationId xmlns:a16="http://schemas.microsoft.com/office/drawing/2014/main" id="{060F6AA0-6D0E-201D-2E25-1E9F6BA6447F}"/>
+                </a:ext>
+              </a:extLst>
+            </p:cNvPr>
+            <p:cNvCxnSpPr>
+              <a:cxnSpLocks/>
+            </p:cNvCxnSpPr>
+            <p:nvPr/>
+          </p:nvCxnSpPr>
+          <p:spPr>
+            <a:xfrm flipH="1">
+              <a:off x="3346063" y="3793326"/>
+              <a:ext cx="2021410" cy="16681"/>
+            </a:xfrm>
+            <a:prstGeom prst="line">
+              <a:avLst/>
+            </a:prstGeom>
+            <a:ln w="12700">
+              <a:solidFill>
+                <a:schemeClr val="bg1">
+                  <a:lumMod val="50000"/>
+                </a:schemeClr>
+              </a:solidFill>
+              <a:prstDash val="dash"/>
+            </a:ln>
+          </p:spPr>
+          <p:style>
+            <a:lnRef idx="1">
+              <a:schemeClr val="accent1"/>
+            </a:lnRef>
+            <a:fillRef idx="0">
+              <a:schemeClr val="accent1"/>
+            </a:fillRef>
+            <a:effectRef idx="0">
+              <a:schemeClr val="accent1"/>
+            </a:effectRef>
+            <a:fontRef idx="minor">
+              <a:schemeClr val="tx1"/>
+            </a:fontRef>
+          </p:style>
+        </p:cxnSp>
+        <p:cxnSp>
+          <p:nvCxnSpPr>
+            <p:cNvPr id="83" name="Прямая соединительная линия 82">
+              <a:extLst>
+                <a:ext uri="{FF2B5EF4-FFF2-40B4-BE49-F238E27FC236}">
+                  <a16:creationId xmlns:a16="http://schemas.microsoft.com/office/drawing/2014/main" id="{399E18C0-9D8F-CE81-CF67-22867F1C3934}"/>
+                </a:ext>
+              </a:extLst>
+            </p:cNvPr>
+            <p:cNvCxnSpPr>
+              <a:cxnSpLocks/>
+            </p:cNvCxnSpPr>
+            <p:nvPr/>
+          </p:nvCxnSpPr>
+          <p:spPr>
+            <a:xfrm flipH="1">
+              <a:off x="3362703" y="3347618"/>
+              <a:ext cx="412556" cy="438444"/>
+            </a:xfrm>
+            <a:prstGeom prst="line">
+              <a:avLst/>
+            </a:prstGeom>
+            <a:ln w="12700">
+              <a:solidFill>
+                <a:schemeClr val="bg1">
+                  <a:lumMod val="50000"/>
+                </a:schemeClr>
+              </a:solidFill>
+              <a:prstDash val="dash"/>
+            </a:ln>
+          </p:spPr>
+          <p:style>
+            <a:lnRef idx="1">
+              <a:schemeClr val="accent1"/>
+            </a:lnRef>
+            <a:fillRef idx="0">
+              <a:schemeClr val="accent1"/>
+            </a:fillRef>
+            <a:effectRef idx="0">
+              <a:schemeClr val="accent1"/>
+            </a:effectRef>
+            <a:fontRef idx="minor">
+              <a:schemeClr val="tx1"/>
+            </a:fontRef>
+          </p:style>
+        </p:cxnSp>
+        <p:sp>
+          <p:nvSpPr>
+            <p:cNvPr id="85" name="Блок-схема: извлечение 84">
+              <a:extLst>
+                <a:ext uri="{FF2B5EF4-FFF2-40B4-BE49-F238E27FC236}">
+                  <a16:creationId xmlns:a16="http://schemas.microsoft.com/office/drawing/2014/main" id="{D3D9D717-B4F7-00BE-FE89-6F4FB6F0C62E}"/>
+                </a:ext>
+              </a:extLst>
+            </p:cNvPr>
+            <p:cNvSpPr/>
+            <p:nvPr/>
+          </p:nvSpPr>
+          <p:spPr>
+            <a:xfrm rot="15488436">
+              <a:off x="3420734" y="3608499"/>
+              <a:ext cx="152206" cy="298204"/>
+            </a:xfrm>
+            <a:prstGeom prst="flowChartExtract">
+              <a:avLst/>
+            </a:prstGeom>
+            <a:solidFill>
+              <a:schemeClr val="tx1"/>
+            </a:solidFill>
+            <a:ln>
+              <a:solidFill>
+                <a:schemeClr val="tx1"/>
+              </a:solidFill>
+            </a:ln>
+          </p:spPr>
+          <p:style>
+            <a:lnRef idx="2">
+              <a:schemeClr val="accent1">
+                <a:shade val="50000"/>
+              </a:schemeClr>
+            </a:lnRef>
+            <a:fillRef idx="1">
+              <a:schemeClr val="accent1"/>
+            </a:fillRef>
+            <a:effectRef idx="0">
+              <a:schemeClr val="accent1"/>
+            </a:effectRef>
+            <a:fontRef idx="minor">
+              <a:schemeClr val="lt1"/>
+            </a:fontRef>
+          </p:style>
+          <p:txBody>
+            <a:bodyPr rtlCol="0" anchor="ctr"/>
+            <a:lstStyle/>
+            <a:p>
+              <a:pPr algn="ctr"/>
+              <a:endParaRPr lang="ru-RU">
+                <a:ln>
+                  <a:solidFill>
+                    <a:sysClr val="windowText" lastClr="000000"/>
+                  </a:solidFill>
+                </a:ln>
+                <a:solidFill>
+                  <a:schemeClr val="tx1"/>
+                </a:solidFill>
+              </a:endParaRPr>
+            </a:p>
+          </p:txBody>
+        </p:sp>
+        <p:cxnSp>
+          <p:nvCxnSpPr>
+            <p:cNvPr id="22" name="Прямая соединительная линия 21"/>
+            <p:cNvCxnSpPr>
+              <a:cxnSpLocks/>
+            </p:cNvCxnSpPr>
+            <p:nvPr/>
+          </p:nvCxnSpPr>
+          <p:spPr>
+            <a:xfrm flipV="1">
+              <a:off x="3177817" y="3145792"/>
+              <a:ext cx="2769809" cy="3013697"/>
+            </a:xfrm>
+            <a:prstGeom prst="line">
+              <a:avLst/>
+            </a:prstGeom>
+            <a:ln w="38100">
+              <a:solidFill>
+                <a:schemeClr val="tx1"/>
+              </a:solidFill>
+              <a:prstDash val="lgDash"/>
+            </a:ln>
+          </p:spPr>
+          <p:style>
+            <a:lnRef idx="1">
+              <a:schemeClr val="accent1"/>
+            </a:lnRef>
+            <a:fillRef idx="0">
+              <a:schemeClr val="accent1"/>
+            </a:fillRef>
+            <a:effectRef idx="0">
+              <a:schemeClr val="accent1"/>
+            </a:effectRef>
+            <a:fontRef idx="minor">
+              <a:schemeClr val="tx1"/>
+            </a:fontRef>
+          </p:style>
+        </p:cxnSp>
+        <p:sp>
+          <p:nvSpPr>
+            <p:cNvPr id="96" name="Дуга 95">
+              <a:extLst>
+                <a:ext uri="{FF2B5EF4-FFF2-40B4-BE49-F238E27FC236}">
+                  <a16:creationId xmlns:a16="http://schemas.microsoft.com/office/drawing/2014/main" id="{84AE6B91-AA1E-CE05-26B9-38F0A0B4A656}"/>
+                </a:ext>
+              </a:extLst>
+            </p:cNvPr>
+            <p:cNvSpPr/>
+            <p:nvPr/>
+          </p:nvSpPr>
+          <p:spPr>
+            <a:xfrm rot="11592051">
+              <a:off x="4125891" y="3029936"/>
+              <a:ext cx="881653" cy="750593"/>
             </a:xfrm>
             <a:prstGeom prst="arc">
               <a:avLst>
-                <a:gd name="adj1" fmla="val 14237168"/>
+                <a:gd name="adj1" fmla="val 18938136"/>
                 <a:gd name="adj2" fmla="val 0"/>
               </a:avLst>
             </a:prstGeom>
@@ -5220,21 +7101,267 @@
             </a:p>
           </p:txBody>
         </p:sp>
+        <p:cxnSp>
+          <p:nvCxnSpPr>
+            <p:cNvPr id="7" name="Прямая соединительная линия 6"/>
+            <p:cNvCxnSpPr>
+              <a:cxnSpLocks/>
+            </p:cNvCxnSpPr>
+            <p:nvPr/>
+          </p:nvCxnSpPr>
+          <p:spPr>
+            <a:xfrm flipV="1">
+              <a:off x="2676525" y="3301158"/>
+              <a:ext cx="3327288" cy="27948"/>
+            </a:xfrm>
+            <a:prstGeom prst="line">
+              <a:avLst/>
+            </a:prstGeom>
+            <a:ln w="38100">
+              <a:solidFill>
+                <a:schemeClr val="tx1"/>
+              </a:solidFill>
+              <a:prstDash val="lgDash"/>
+            </a:ln>
+          </p:spPr>
+          <p:style>
+            <a:lnRef idx="1">
+              <a:schemeClr val="accent1"/>
+            </a:lnRef>
+            <a:fillRef idx="0">
+              <a:schemeClr val="accent1"/>
+            </a:fillRef>
+            <a:effectRef idx="0">
+              <a:schemeClr val="accent1"/>
+            </a:effectRef>
+            <a:fontRef idx="minor">
+              <a:schemeClr val="tx1"/>
+            </a:fontRef>
+          </p:style>
+        </p:cxnSp>
         <p:sp>
           <p:nvSpPr>
-            <p:cNvPr id="58" name="Дуга 57"/>
+            <p:cNvPr id="97" name="Прямоугольник 96">
+              <a:extLst>
+                <a:ext uri="{FF2B5EF4-FFF2-40B4-BE49-F238E27FC236}">
+                  <a16:creationId xmlns:a16="http://schemas.microsoft.com/office/drawing/2014/main" id="{5B1F6646-8794-5CCD-BE75-A79AF0737BB8}"/>
+                </a:ext>
+              </a:extLst>
+            </p:cNvPr>
             <p:cNvSpPr/>
             <p:nvPr/>
           </p:nvSpPr>
           <p:spPr>
-            <a:xfrm rot="1233551">
-              <a:off x="5808641" y="2779067"/>
-              <a:ext cx="848672" cy="747459"/>
+            <a:xfrm>
+              <a:off x="3739909" y="3227258"/>
+              <a:ext cx="450764" cy="400110"/>
+            </a:xfrm>
+            <a:prstGeom prst="rect">
+              <a:avLst/>
+            </a:prstGeom>
+          </p:spPr>
+          <p:txBody>
+            <a:bodyPr wrap="none">
+              <a:spAutoFit/>
+            </a:bodyPr>
+            <a:lstStyle/>
+            <a:p>
+              <a:r>
+                <a:rPr lang="el-GR" sz="2000" b="1" dirty="0">
+                  <a:solidFill>
+                    <a:sysClr val="windowText" lastClr="000000"/>
+                  </a:solidFill>
+                  <a:effectLst>
+                    <a:outerShdw blurRad="38100" dist="38100" dir="2700000" algn="tl">
+                      <a:srgbClr val="000000">
+                        <a:alpha val="43137"/>
+                      </a:srgbClr>
+                    </a:outerShdw>
+                  </a:effectLst>
+                  <a:latin typeface="Bahnschrift Light" panose="020B0502040204020203" pitchFamily="34" charset="0"/>
+                  <a:cs typeface="Times New Roman" panose="02020603050405020304" pitchFamily="18" charset="0"/>
+                </a:rPr>
+                <a:t>ϕ</a:t>
+              </a:r>
+              <a:r>
+                <a:rPr lang="en-US" sz="2000" b="1" baseline="-25000" dirty="0">
+                  <a:solidFill>
+                    <a:sysClr val="windowText" lastClr="000000"/>
+                  </a:solidFill>
+                  <a:effectLst>
+                    <a:outerShdw blurRad="38100" dist="38100" dir="2700000" algn="tl">
+                      <a:srgbClr val="000000">
+                        <a:alpha val="43137"/>
+                      </a:srgbClr>
+                    </a:outerShdw>
+                  </a:effectLst>
+                  <a:latin typeface="Bahnschrift Light" panose="020B0502040204020203" pitchFamily="34" charset="0"/>
+                  <a:cs typeface="Times New Roman" panose="02020603050405020304" pitchFamily="18" charset="0"/>
+                </a:rPr>
+                <a:t>0</a:t>
+              </a:r>
+              <a:endParaRPr lang="ru-RU" sz="2000" baseline="-25000" dirty="0">
+                <a:latin typeface="Bahnschrift Light" panose="020B0502040204020203" pitchFamily="34" charset="0"/>
+                <a:cs typeface="Times New Roman" panose="02020603050405020304" pitchFamily="18" charset="0"/>
+              </a:endParaRPr>
+            </a:p>
+          </p:txBody>
+        </p:sp>
+        <p:sp>
+          <p:nvSpPr>
+            <p:cNvPr id="101" name="Параллелограмм 100">
+              <a:extLst>
+                <a:ext uri="{FF2B5EF4-FFF2-40B4-BE49-F238E27FC236}">
+                  <a16:creationId xmlns:a16="http://schemas.microsoft.com/office/drawing/2014/main" id="{FCE91DE8-2E2B-DC5E-4098-83DFD5BBAAA3}"/>
+                </a:ext>
+              </a:extLst>
+            </p:cNvPr>
+            <p:cNvSpPr/>
+            <p:nvPr/>
+          </p:nvSpPr>
+          <p:spPr>
+            <a:xfrm rot="10137664">
+              <a:off x="3059175" y="962009"/>
+              <a:ext cx="3002052" cy="2584661"/>
+            </a:xfrm>
+            <a:prstGeom prst="parallelogram">
+              <a:avLst>
+                <a:gd name="adj" fmla="val 19709"/>
+              </a:avLst>
+            </a:prstGeom>
+            <a:solidFill>
+              <a:srgbClr val="FF0000">
+                <a:alpha val="22000"/>
+              </a:srgbClr>
+            </a:solidFill>
+            <a:ln>
+              <a:noFill/>
+            </a:ln>
+          </p:spPr>
+          <p:style>
+            <a:lnRef idx="2">
+              <a:schemeClr val="accent1">
+                <a:shade val="15000"/>
+              </a:schemeClr>
+            </a:lnRef>
+            <a:fillRef idx="1">
+              <a:schemeClr val="accent1"/>
+            </a:fillRef>
+            <a:effectRef idx="0">
+              <a:schemeClr val="accent1"/>
+            </a:effectRef>
+            <a:fontRef idx="minor">
+              <a:schemeClr val="lt1"/>
+            </a:fontRef>
+          </p:style>
+          <p:txBody>
+            <a:bodyPr rtlCol="0" anchor="ctr"/>
+            <a:lstStyle/>
+            <a:p>
+              <a:pPr algn="ctr"/>
+              <a:endParaRPr lang="ru-RU"/>
+            </a:p>
+          </p:txBody>
+        </p:sp>
+        <p:cxnSp>
+          <p:nvCxnSpPr>
+            <p:cNvPr id="99" name="Прямая соединительная линия 98">
+              <a:extLst>
+                <a:ext uri="{FF2B5EF4-FFF2-40B4-BE49-F238E27FC236}">
+                  <a16:creationId xmlns:a16="http://schemas.microsoft.com/office/drawing/2014/main" id="{1ACD8C17-2294-0CF4-31C1-8C5122D82022}"/>
+                </a:ext>
+              </a:extLst>
+            </p:cNvPr>
+            <p:cNvCxnSpPr>
+              <a:cxnSpLocks/>
+            </p:cNvCxnSpPr>
+            <p:nvPr/>
+          </p:nvCxnSpPr>
+          <p:spPr>
+            <a:xfrm flipH="1">
+              <a:off x="3346063" y="691949"/>
+              <a:ext cx="2419656" cy="480081"/>
+            </a:xfrm>
+            <a:prstGeom prst="line">
+              <a:avLst/>
+            </a:prstGeom>
+            <a:ln w="12700">
+              <a:solidFill>
+                <a:schemeClr val="bg1">
+                  <a:lumMod val="50000"/>
+                </a:schemeClr>
+              </a:solidFill>
+              <a:prstDash val="dash"/>
+            </a:ln>
+          </p:spPr>
+          <p:style>
+            <a:lnRef idx="1">
+              <a:schemeClr val="accent1"/>
+            </a:lnRef>
+            <a:fillRef idx="0">
+              <a:schemeClr val="accent1"/>
+            </a:fillRef>
+            <a:effectRef idx="0">
+              <a:schemeClr val="accent1"/>
+            </a:effectRef>
+            <a:fontRef idx="minor">
+              <a:schemeClr val="tx1"/>
+            </a:fontRef>
+          </p:style>
+        </p:cxnSp>
+        <p:cxnSp>
+          <p:nvCxnSpPr>
+            <p:cNvPr id="37" name="Прямая соединительная линия 36"/>
+            <p:cNvCxnSpPr>
+              <a:cxnSpLocks/>
+            </p:cNvCxnSpPr>
+            <p:nvPr/>
+          </p:nvCxnSpPr>
+          <p:spPr>
+            <a:xfrm flipH="1" flipV="1">
+              <a:off x="3349904" y="1156790"/>
+              <a:ext cx="2441394" cy="2159966"/>
+            </a:xfrm>
+            <a:prstGeom prst="line">
+              <a:avLst/>
+            </a:prstGeom>
+            <a:ln w="38100">
+              <a:solidFill>
+                <a:srgbClr val="FF0000"/>
+              </a:solidFill>
+              <a:prstDash val="solid"/>
+            </a:ln>
+          </p:spPr>
+          <p:style>
+            <a:lnRef idx="1">
+              <a:schemeClr val="accent1"/>
+            </a:lnRef>
+            <a:fillRef idx="0">
+              <a:schemeClr val="accent1"/>
+            </a:fillRef>
+            <a:effectRef idx="0">
+              <a:schemeClr val="accent1"/>
+            </a:effectRef>
+            <a:fontRef idx="minor">
+              <a:schemeClr val="tx1"/>
+            </a:fontRef>
+          </p:style>
+        </p:cxnSp>
+        <p:sp>
+          <p:nvSpPr>
+            <p:cNvPr id="56" name="Дуга 55"/>
+            <p:cNvSpPr/>
+            <p:nvPr/>
+          </p:nvSpPr>
+          <p:spPr>
+            <a:xfrm rot="17936238">
+              <a:off x="4338775" y="1743957"/>
+              <a:ext cx="2236148" cy="2228681"/>
             </a:xfrm>
             <a:prstGeom prst="arc">
               <a:avLst>
-                <a:gd name="adj1" fmla="val 18169281"/>
-                <a:gd name="adj2" fmla="val 0"/>
+                <a:gd name="adj1" fmla="val 16657041"/>
+                <a:gd name="adj2" fmla="val 20888558"/>
               </a:avLst>
             </a:prstGeom>
             <a:ln w="28575">
@@ -5269,6 +7396,42 @@
             </a:p>
           </p:txBody>
         </p:sp>
+        <p:cxnSp>
+          <p:nvCxnSpPr>
+            <p:cNvPr id="14" name="Прямая соединительная линия 13"/>
+            <p:cNvCxnSpPr/>
+            <p:nvPr/>
+          </p:nvCxnSpPr>
+          <p:spPr>
+            <a:xfrm>
+              <a:off x="5786557" y="503176"/>
+              <a:ext cx="5291" cy="2805642"/>
+            </a:xfrm>
+            <a:prstGeom prst="line">
+              <a:avLst/>
+            </a:prstGeom>
+            <a:ln w="38100">
+              <a:solidFill>
+                <a:schemeClr val="tx1"/>
+              </a:solidFill>
+              <a:prstDash val="lgDash"/>
+            </a:ln>
+          </p:spPr>
+          <p:style>
+            <a:lnRef idx="1">
+              <a:schemeClr val="accent1"/>
+            </a:lnRef>
+            <a:fillRef idx="0">
+              <a:schemeClr val="accent1"/>
+            </a:fillRef>
+            <a:effectRef idx="0">
+              <a:schemeClr val="accent1"/>
+            </a:effectRef>
+            <a:fontRef idx="minor">
+              <a:schemeClr val="tx1"/>
+            </a:fontRef>
+          </p:style>
+        </p:cxnSp>
         <p:sp>
           <p:nvSpPr>
             <p:cNvPr id="60" name="Прямоугольник 59"/>
@@ -5277,7 +7440,7 @@
           </p:nvSpPr>
           <p:spPr>
             <a:xfrm>
-              <a:off x="4684492" y="1188912"/>
+              <a:off x="4729579" y="1220561"/>
               <a:ext cx="694267" cy="550755"/>
             </a:xfrm>
             <a:prstGeom prst="rect">
@@ -5312,7 +7475,7 @@
               <a:r>
                 <a:rPr lang="el-GR" sz="2400" b="1" dirty="0">
                   <a:solidFill>
-                    <a:sysClr val="windowText" lastClr="000000"/>
+                    <a:srgbClr val="FF0000"/>
                   </a:solidFill>
                   <a:effectLst>
                     <a:outerShdw blurRad="38100" dist="38100" dir="2700000" algn="tl">
@@ -5322,10 +7485,10 @@
                     </a:outerShdw>
                   </a:effectLst>
                 </a:rPr>
-                <a:t>θ</a:t>
+                <a:t>α</a:t>
               </a:r>
               <a:r>
-                <a:rPr lang="ru-RU" sz="1400" b="1" dirty="0">
+                <a:rPr lang="el-GR" sz="2400" b="1" dirty="0">
                   <a:solidFill>
                     <a:sysClr val="windowText" lastClr="000000"/>
                   </a:solidFill>
@@ -5337,7 +7500,7 @@
                     </a:outerShdw>
                   </a:effectLst>
                 </a:rPr>
-                <a:t>0</a:t>
+                <a:t> </a:t>
               </a:r>
               <a:endParaRPr lang="ru-RU" sz="2400" b="1" dirty="0">
                 <a:solidFill>
@@ -5356,287 +7519,49 @@
         </p:sp>
         <p:sp>
           <p:nvSpPr>
-            <p:cNvPr id="61" name="Прямоугольник 60"/>
+            <p:cNvPr id="109" name="Параллелограмм 108">
+              <a:extLst>
+                <a:ext uri="{FF2B5EF4-FFF2-40B4-BE49-F238E27FC236}">
+                  <a16:creationId xmlns:a16="http://schemas.microsoft.com/office/drawing/2014/main" id="{4D554F0C-03B8-4A33-7113-9D750415F399}"/>
+                </a:ext>
+              </a:extLst>
+            </p:cNvPr>
             <p:cNvSpPr/>
             <p:nvPr/>
           </p:nvSpPr>
           <p:spPr>
-            <a:xfrm>
-              <a:off x="6346299" y="2917763"/>
-              <a:ext cx="346570" cy="369332"/>
+            <a:xfrm rot="9284611">
+              <a:off x="5271128" y="968644"/>
+              <a:ext cx="2326102" cy="1940371"/>
             </a:xfrm>
-            <a:prstGeom prst="rect">
-              <a:avLst/>
-            </a:prstGeom>
-          </p:spPr>
-          <p:txBody>
-            <a:bodyPr wrap="none">
-              <a:spAutoFit/>
-            </a:bodyPr>
-            <a:lstStyle/>
-            <a:p>
-              <a:r>
-                <a:rPr lang="el-GR" b="1" dirty="0">
-                  <a:solidFill>
-                    <a:sysClr val="windowText" lastClr="000000"/>
-                  </a:solidFill>
-                  <a:effectLst>
-                    <a:outerShdw blurRad="38100" dist="38100" dir="2700000" algn="tl">
-                      <a:srgbClr val="000000">
-                        <a:alpha val="43137"/>
-                      </a:srgbClr>
-                    </a:outerShdw>
-                  </a:effectLst>
-                </a:rPr>
-                <a:t>ϕ</a:t>
-              </a:r>
-              <a:endParaRPr lang="ru-RU" dirty="0"/>
-            </a:p>
-          </p:txBody>
-        </p:sp>
-        <p:sp>
-          <p:nvSpPr>
-            <p:cNvPr id="64" name="Прямоугольник 63"/>
-            <p:cNvSpPr/>
-            <p:nvPr/>
-          </p:nvSpPr>
-          <p:spPr>
-            <a:xfrm>
-              <a:off x="7600388" y="1686832"/>
-              <a:ext cx="1717137" cy="1569660"/>
-            </a:xfrm>
-            <a:prstGeom prst="rect">
-              <a:avLst/>
-            </a:prstGeom>
-          </p:spPr>
-          <p:txBody>
-            <a:bodyPr wrap="none">
-              <a:spAutoFit/>
-            </a:bodyPr>
-            <a:lstStyle/>
-            <a:p>
-              <a:r>
-                <a:rPr lang="ru-RU" sz="3200" b="1" dirty="0">
-                  <a:solidFill>
-                    <a:sysClr val="windowText" lastClr="000000"/>
-                  </a:solidFill>
-                  <a:effectLst>
-                    <a:outerShdw blurRad="38100" dist="38100" dir="2700000" algn="tl">
-                      <a:srgbClr val="000000">
-                        <a:alpha val="43137"/>
-                      </a:srgbClr>
-                    </a:outerShdw>
-                  </a:effectLst>
-                </a:rPr>
-                <a:t>0</a:t>
-              </a:r>
-              <a:r>
-                <a:rPr lang="en-GB" sz="3200" b="1" dirty="0">
-                  <a:solidFill>
-                    <a:sysClr val="windowText" lastClr="000000"/>
-                  </a:solidFill>
-                  <a:effectLst>
-                    <a:outerShdw blurRad="38100" dist="38100" dir="2700000" algn="tl">
-                      <a:srgbClr val="000000">
-                        <a:alpha val="43137"/>
-                      </a:srgbClr>
-                    </a:outerShdw>
-                  </a:effectLst>
-                </a:rPr>
-                <a:t>&lt;</a:t>
-              </a:r>
-              <a:r>
-                <a:rPr lang="el-GR" sz="3200" b="1" dirty="0">
-                  <a:solidFill>
-                    <a:sysClr val="windowText" lastClr="000000"/>
-                  </a:solidFill>
-                  <a:effectLst>
-                    <a:outerShdw blurRad="38100" dist="38100" dir="2700000" algn="tl">
-                      <a:srgbClr val="000000">
-                        <a:alpha val="43137"/>
-                      </a:srgbClr>
-                    </a:outerShdw>
-                  </a:effectLst>
-                </a:rPr>
-                <a:t>θ</a:t>
-              </a:r>
-              <a:r>
-                <a:rPr lang="ru-RU" sz="1800" b="1" dirty="0">
-                  <a:solidFill>
-                    <a:sysClr val="windowText" lastClr="000000"/>
-                  </a:solidFill>
-                  <a:effectLst>
-                    <a:outerShdw blurRad="38100" dist="38100" dir="2700000" algn="tl">
-                      <a:srgbClr val="000000">
-                        <a:alpha val="43137"/>
-                      </a:srgbClr>
-                    </a:outerShdw>
-                  </a:effectLst>
-                </a:rPr>
-                <a:t>0</a:t>
-              </a:r>
-              <a:r>
-                <a:rPr lang="en-US" sz="3200" b="1" dirty="0">
-                  <a:solidFill>
-                    <a:sysClr val="windowText" lastClr="000000"/>
-                  </a:solidFill>
-                  <a:effectLst>
-                    <a:outerShdw blurRad="38100" dist="38100" dir="2700000" algn="tl">
-                      <a:srgbClr val="000000">
-                        <a:alpha val="43137"/>
-                      </a:srgbClr>
-                    </a:outerShdw>
-                  </a:effectLst>
-                </a:rPr>
-                <a:t>&lt;90</a:t>
-              </a:r>
-            </a:p>
-            <a:p>
-              <a:r>
-                <a:rPr lang="en-US" sz="3200" b="1" dirty="0">
-                  <a:solidFill>
-                    <a:sysClr val="windowText" lastClr="000000"/>
-                  </a:solidFill>
-                  <a:effectLst>
-                    <a:outerShdw blurRad="38100" dist="38100" dir="2700000" algn="tl">
-                      <a:srgbClr val="000000">
-                        <a:alpha val="43137"/>
-                      </a:srgbClr>
-                    </a:outerShdw>
-                  </a:effectLst>
-                </a:rPr>
-                <a:t>0&lt;</a:t>
-              </a:r>
-              <a:r>
-                <a:rPr lang="el-GR" sz="3200" b="1" dirty="0">
-                  <a:solidFill>
-                    <a:sysClr val="windowText" lastClr="000000"/>
-                  </a:solidFill>
-                  <a:effectLst>
-                    <a:outerShdw blurRad="38100" dist="38100" dir="2700000" algn="tl">
-                      <a:srgbClr val="000000">
-                        <a:alpha val="43137"/>
-                      </a:srgbClr>
-                    </a:outerShdw>
-                  </a:effectLst>
-                </a:rPr>
-                <a:t>ϕ</a:t>
-              </a:r>
-              <a:r>
-                <a:rPr lang="en-US" sz="3200" b="1" dirty="0">
-                  <a:solidFill>
-                    <a:sysClr val="windowText" lastClr="000000"/>
-                  </a:solidFill>
-                  <a:effectLst>
-                    <a:outerShdw blurRad="38100" dist="38100" dir="2700000" algn="tl">
-                      <a:srgbClr val="000000">
-                        <a:alpha val="43137"/>
-                      </a:srgbClr>
-                    </a:outerShdw>
-                  </a:effectLst>
-                </a:rPr>
-                <a:t>&lt;360</a:t>
-              </a:r>
-            </a:p>
-            <a:p>
-              <a:r>
-                <a:rPr lang="en-US" sz="3200" b="1" dirty="0">
-                  <a:solidFill>
-                    <a:sysClr val="windowText" lastClr="000000"/>
-                  </a:solidFill>
-                  <a:effectLst>
-                    <a:outerShdw blurRad="38100" dist="38100" dir="2700000" algn="tl">
-                      <a:srgbClr val="000000">
-                        <a:alpha val="43137"/>
-                      </a:srgbClr>
-                    </a:outerShdw>
-                  </a:effectLst>
-                </a:rPr>
-                <a:t>0&lt;</a:t>
-              </a:r>
-              <a:r>
-                <a:rPr lang="el-GR" sz="3200" b="1" dirty="0">
-                  <a:solidFill>
-                    <a:sysClr val="windowText" lastClr="000000"/>
-                  </a:solidFill>
-                  <a:effectLst>
-                    <a:outerShdw blurRad="38100" dist="38100" dir="2700000" algn="tl">
-                      <a:srgbClr val="000000">
-                        <a:alpha val="43137"/>
-                      </a:srgbClr>
-                    </a:outerShdw>
-                  </a:effectLst>
-                </a:rPr>
-                <a:t>θ</a:t>
-              </a:r>
-              <a:r>
-                <a:rPr lang="en-US" sz="3200" b="1" dirty="0">
-                  <a:solidFill>
-                    <a:sysClr val="windowText" lastClr="000000"/>
-                  </a:solidFill>
-                  <a:effectLst>
-                    <a:outerShdw blurRad="38100" dist="38100" dir="2700000" algn="tl">
-                      <a:srgbClr val="000000">
-                        <a:alpha val="43137"/>
-                      </a:srgbClr>
-                    </a:outerShdw>
-                  </a:effectLst>
-                </a:rPr>
-                <a:t>&lt;90</a:t>
-              </a:r>
-              <a:endParaRPr lang="ru-RU" sz="3200" b="1" dirty="0">
-                <a:solidFill>
-                  <a:sysClr val="windowText" lastClr="000000"/>
-                </a:solidFill>
-                <a:effectLst>
-                  <a:outerShdw blurRad="38100" dist="38100" dir="2700000" algn="tl">
-                    <a:srgbClr val="000000">
-                      <a:alpha val="43137"/>
-                    </a:srgbClr>
-                  </a:outerShdw>
-                </a:effectLst>
-              </a:endParaRPr>
-            </a:p>
-          </p:txBody>
-        </p:sp>
-        <p:sp>
-          <p:nvSpPr>
-            <p:cNvPr id="65" name="Дуга 64"/>
-            <p:cNvSpPr/>
-            <p:nvPr/>
-          </p:nvSpPr>
-          <p:spPr>
-            <a:xfrm rot="19540383">
-              <a:off x="5200789" y="1845089"/>
-              <a:ext cx="1295400" cy="1191496"/>
-            </a:xfrm>
-            <a:prstGeom prst="arc">
+            <a:prstGeom prst="parallelogram">
               <a:avLst>
-                <a:gd name="adj1" fmla="val 18147507"/>
-                <a:gd name="adj2" fmla="val 0"/>
+                <a:gd name="adj" fmla="val 47269"/>
               </a:avLst>
             </a:prstGeom>
-            <a:ln w="28575">
-              <a:solidFill>
-                <a:schemeClr val="bg2">
-                  <a:lumMod val="75000"/>
-                </a:schemeClr>
-              </a:solidFill>
-              <a:prstDash val="solid"/>
+            <a:solidFill>
+              <a:srgbClr val="00B050">
+                <a:alpha val="22000"/>
+              </a:srgbClr>
+            </a:solidFill>
+            <a:ln>
+              <a:noFill/>
             </a:ln>
           </p:spPr>
           <p:style>
-            <a:lnRef idx="1">
-              <a:schemeClr val="accent1"/>
+            <a:lnRef idx="2">
+              <a:schemeClr val="accent1">
+                <a:shade val="15000"/>
+              </a:schemeClr>
             </a:lnRef>
-            <a:fillRef idx="0">
+            <a:fillRef idx="1">
               <a:schemeClr val="accent1"/>
             </a:fillRef>
             <a:effectRef idx="0">
               <a:schemeClr val="accent1"/>
             </a:effectRef>
             <a:fontRef idx="minor">
-              <a:schemeClr val="tx1"/>
+              <a:schemeClr val="lt1"/>
             </a:fontRef>
           </p:style>
           <p:txBody>
@@ -5650,19 +7575,31 @@
         </p:sp>
         <p:sp>
           <p:nvSpPr>
-            <p:cNvPr id="66" name="Прямоугольник 65"/>
+            <p:cNvPr id="111" name="Параллелограмм 110">
+              <a:extLst>
+                <a:ext uri="{FF2B5EF4-FFF2-40B4-BE49-F238E27FC236}">
+                  <a16:creationId xmlns:a16="http://schemas.microsoft.com/office/drawing/2014/main" id="{215EF375-4FDC-350C-069D-4A093983E789}"/>
+                </a:ext>
+              </a:extLst>
+            </p:cNvPr>
             <p:cNvSpPr/>
             <p:nvPr/>
           </p:nvSpPr>
           <p:spPr>
-            <a:xfrm>
-              <a:off x="5833244" y="1401298"/>
-              <a:ext cx="694267" cy="550755"/>
+            <a:xfrm rot="9284611">
+              <a:off x="5232066" y="3136272"/>
+              <a:ext cx="2392219" cy="2130903"/>
             </a:xfrm>
-            <a:prstGeom prst="rect">
-              <a:avLst/>
+            <a:prstGeom prst="parallelogram">
+              <a:avLst>
+                <a:gd name="adj" fmla="val 45813"/>
+              </a:avLst>
             </a:prstGeom>
-            <a:noFill/>
+            <a:solidFill>
+              <a:srgbClr val="0070C0">
+                <a:alpha val="22000"/>
+              </a:srgbClr>
+            </a:solidFill>
             <a:ln>
               <a:noFill/>
             </a:ln>
@@ -5670,7 +7607,7 @@
           <p:style>
             <a:lnRef idx="2">
               <a:schemeClr val="accent1">
-                <a:shade val="50000"/>
+                <a:shade val="15000"/>
               </a:schemeClr>
             </a:lnRef>
             <a:fillRef idx="1">
@@ -5688,36 +7625,56 @@
             <a:lstStyle/>
             <a:p>
               <a:pPr algn="ctr"/>
-              <a:r>
-                <a:rPr lang="el-GR" sz="2400" b="1" dirty="0">
-                  <a:solidFill>
-                    <a:sysClr val="windowText" lastClr="000000"/>
-                  </a:solidFill>
-                  <a:effectLst>
-                    <a:outerShdw blurRad="38100" dist="38100" dir="2700000" algn="tl">
-                      <a:srgbClr val="000000">
-                        <a:alpha val="43137"/>
-                      </a:srgbClr>
-                    </a:outerShdw>
-                  </a:effectLst>
-                </a:rPr>
-                <a:t>θ</a:t>
-              </a:r>
-              <a:endParaRPr lang="ru-RU" sz="2400" b="1" dirty="0">
-                <a:solidFill>
-                  <a:sysClr val="windowText" lastClr="000000"/>
-                </a:solidFill>
-                <a:effectLst>
-                  <a:outerShdw blurRad="38100" dist="38100" dir="2700000" algn="tl">
-                    <a:srgbClr val="000000">
-                      <a:alpha val="43137"/>
-                    </a:srgbClr>
-                  </a:outerShdw>
-                </a:effectLst>
-              </a:endParaRPr>
+              <a:endParaRPr lang="ru-RU"/>
             </a:p>
           </p:txBody>
         </p:sp>
+        <p:cxnSp>
+          <p:nvCxnSpPr>
+            <p:cNvPr id="114" name="Прямая соединительная линия 113">
+              <a:extLst>
+                <a:ext uri="{FF2B5EF4-FFF2-40B4-BE49-F238E27FC236}">
+                  <a16:creationId xmlns:a16="http://schemas.microsoft.com/office/drawing/2014/main" id="{F8272B50-5750-31EB-98D3-2E2525F57766}"/>
+                </a:ext>
+              </a:extLst>
+            </p:cNvPr>
+            <p:cNvCxnSpPr>
+              <a:cxnSpLocks/>
+            </p:cNvCxnSpPr>
+            <p:nvPr/>
+          </p:nvCxnSpPr>
+          <p:spPr>
+            <a:xfrm flipH="1">
+              <a:off x="5801656" y="5112556"/>
+              <a:ext cx="1256587" cy="582929"/>
+            </a:xfrm>
+            <a:prstGeom prst="line">
+              <a:avLst/>
+            </a:prstGeom>
+            <a:ln w="12700">
+              <a:solidFill>
+                <a:schemeClr val="bg1">
+                  <a:lumMod val="50000"/>
+                </a:schemeClr>
+              </a:solidFill>
+              <a:prstDash val="dash"/>
+            </a:ln>
+          </p:spPr>
+          <p:style>
+            <a:lnRef idx="1">
+              <a:schemeClr val="accent1"/>
+            </a:lnRef>
+            <a:fillRef idx="0">
+              <a:schemeClr val="accent1"/>
+            </a:fillRef>
+            <a:effectRef idx="0">
+              <a:schemeClr val="accent1"/>
+            </a:effectRef>
+            <a:fontRef idx="minor">
+              <a:schemeClr val="tx1"/>
+            </a:fontRef>
+          </p:style>
+        </p:cxnSp>
       </p:grpSp>
     </p:spTree>
     <p:extLst>
@@ -5991,4 +7948,299 @@
     </a:ext>
   </a:extLst>
 </a:theme>
+</file>
+
+<file path=ppt/theme/theme2.xml><?xml version="1.0" encoding="utf-8"?>
+<a:theme xmlns:a="http://schemas.openxmlformats.org/drawingml/2006/main" name="Тема Office">
+  <a:themeElements>
+    <a:clrScheme name="Стандартная">
+      <a:dk1>
+        <a:sysClr val="windowText" lastClr="000000"/>
+      </a:dk1>
+      <a:lt1>
+        <a:sysClr val="window" lastClr="FFFFFF"/>
+      </a:lt1>
+      <a:dk2>
+        <a:srgbClr val="44546A"/>
+      </a:dk2>
+      <a:lt2>
+        <a:srgbClr val="E7E6E6"/>
+      </a:lt2>
+      <a:accent1>
+        <a:srgbClr val="4472C4"/>
+      </a:accent1>
+      <a:accent2>
+        <a:srgbClr val="ED7D31"/>
+      </a:accent2>
+      <a:accent3>
+        <a:srgbClr val="A5A5A5"/>
+      </a:accent3>
+      <a:accent4>
+        <a:srgbClr val="FFC000"/>
+      </a:accent4>
+      <a:accent5>
+        <a:srgbClr val="5B9BD5"/>
+      </a:accent5>
+      <a:accent6>
+        <a:srgbClr val="70AD47"/>
+      </a:accent6>
+      <a:hlink>
+        <a:srgbClr val="0563C1"/>
+      </a:hlink>
+      <a:folHlink>
+        <a:srgbClr val="954F72"/>
+      </a:folHlink>
+    </a:clrScheme>
+    <a:fontScheme name="Стандартная">
+      <a:majorFont>
+        <a:latin typeface="Calibri Light" panose="020F0302020204030204"/>
+        <a:ea typeface=""/>
+        <a:cs typeface=""/>
+        <a:font script="Jpan" typeface="游ゴシック Light"/>
+        <a:font script="Hang" typeface="맑은 고딕"/>
+        <a:font script="Hans" typeface="等线 Light"/>
+        <a:font script="Hant" typeface="新細明體"/>
+        <a:font script="Arab" typeface="Times New Roman"/>
+        <a:font script="Hebr" typeface="Times New Roman"/>
+        <a:font script="Thai" typeface="Angsana New"/>
+        <a:font script="Ethi" typeface="Nyala"/>
+        <a:font script="Beng" typeface="Vrinda"/>
+        <a:font script="Gujr" typeface="Shruti"/>
+        <a:font script="Khmr" typeface="MoolBoran"/>
+        <a:font script="Knda" typeface="Tunga"/>
+        <a:font script="Guru" typeface="Raavi"/>
+        <a:font script="Cans" typeface="Euphemia"/>
+        <a:font script="Cher" typeface="Plantagenet Cherokee"/>
+        <a:font script="Yiii" typeface="Microsoft Yi Baiti"/>
+        <a:font script="Tibt" typeface="Microsoft Himalaya"/>
+        <a:font script="Thaa" typeface="MV Boli"/>
+        <a:font script="Deva" typeface="Mangal"/>
+        <a:font script="Telu" typeface="Gautami"/>
+        <a:font script="Taml" typeface="Latha"/>
+        <a:font script="Syrc" typeface="Estrangelo Edessa"/>
+        <a:font script="Orya" typeface="Kalinga"/>
+        <a:font script="Mlym" typeface="Kartika"/>
+        <a:font script="Laoo" typeface="DokChampa"/>
+        <a:font script="Sinh" typeface="Iskoola Pota"/>
+        <a:font script="Mong" typeface="Mongolian Baiti"/>
+        <a:font script="Viet" typeface="Times New Roman"/>
+        <a:font script="Uigh" typeface="Microsoft Uighur"/>
+        <a:font script="Geor" typeface="Sylfaen"/>
+        <a:font script="Armn" typeface="Arial"/>
+        <a:font script="Bugi" typeface="Leelawadee UI"/>
+        <a:font script="Bopo" typeface="Microsoft JhengHei"/>
+        <a:font script="Java" typeface="Javanese Text"/>
+        <a:font script="Lisu" typeface="Segoe UI"/>
+        <a:font script="Mymr" typeface="Myanmar Text"/>
+        <a:font script="Nkoo" typeface="Ebrima"/>
+        <a:font script="Olck" typeface="Nirmala UI"/>
+        <a:font script="Osma" typeface="Ebrima"/>
+        <a:font script="Phag" typeface="Phagspa"/>
+        <a:font script="Syrn" typeface="Estrangelo Edessa"/>
+        <a:font script="Syrj" typeface="Estrangelo Edessa"/>
+        <a:font script="Syre" typeface="Estrangelo Edessa"/>
+        <a:font script="Sora" typeface="Nirmala UI"/>
+        <a:font script="Tale" typeface="Microsoft Tai Le"/>
+        <a:font script="Talu" typeface="Microsoft New Tai Lue"/>
+        <a:font script="Tfng" typeface="Ebrima"/>
+      </a:majorFont>
+      <a:minorFont>
+        <a:latin typeface="Calibri" panose="020F0502020204030204"/>
+        <a:ea typeface=""/>
+        <a:cs typeface=""/>
+        <a:font script="Jpan" typeface="游ゴシック"/>
+        <a:font script="Hang" typeface="맑은 고딕"/>
+        <a:font script="Hans" typeface="等线"/>
+        <a:font script="Hant" typeface="新細明體"/>
+        <a:font script="Arab" typeface="Arial"/>
+        <a:font script="Hebr" typeface="Arial"/>
+        <a:font script="Thai" typeface="Cordia New"/>
+        <a:font script="Ethi" typeface="Nyala"/>
+        <a:font script="Beng" typeface="Vrinda"/>
+        <a:font script="Gujr" typeface="Shruti"/>
+        <a:font script="Khmr" typeface="DaunPenh"/>
+        <a:font script="Knda" typeface="Tunga"/>
+        <a:font script="Guru" typeface="Raavi"/>
+        <a:font script="Cans" typeface="Euphemia"/>
+        <a:font script="Cher" typeface="Plantagenet Cherokee"/>
+        <a:font script="Yiii" typeface="Microsoft Yi Baiti"/>
+        <a:font script="Tibt" typeface="Microsoft Himalaya"/>
+        <a:font script="Thaa" typeface="MV Boli"/>
+        <a:font script="Deva" typeface="Mangal"/>
+        <a:font script="Telu" typeface="Gautami"/>
+        <a:font script="Taml" typeface="Latha"/>
+        <a:font script="Syrc" typeface="Estrangelo Edessa"/>
+        <a:font script="Orya" typeface="Kalinga"/>
+        <a:font script="Mlym" typeface="Kartika"/>
+        <a:font script="Laoo" typeface="DokChampa"/>
+        <a:font script="Sinh" typeface="Iskoola Pota"/>
+        <a:font script="Mong" typeface="Mongolian Baiti"/>
+        <a:font script="Viet" typeface="Arial"/>
+        <a:font script="Uigh" typeface="Microsoft Uighur"/>
+        <a:font script="Geor" typeface="Sylfaen"/>
+        <a:font script="Armn" typeface="Arial"/>
+        <a:font script="Bugi" typeface="Leelawadee UI"/>
+        <a:font script="Bopo" typeface="Microsoft JhengHei"/>
+        <a:font script="Java" typeface="Javanese Text"/>
+        <a:font script="Lisu" typeface="Segoe UI"/>
+        <a:font script="Mymr" typeface="Myanmar Text"/>
+        <a:font script="Nkoo" typeface="Ebrima"/>
+        <a:font script="Olck" typeface="Nirmala UI"/>
+        <a:font script="Osma" typeface="Ebrima"/>
+        <a:font script="Phag" typeface="Phagspa"/>
+        <a:font script="Syrn" typeface="Estrangelo Edessa"/>
+        <a:font script="Syrj" typeface="Estrangelo Edessa"/>
+        <a:font script="Syre" typeface="Estrangelo Edessa"/>
+        <a:font script="Sora" typeface="Nirmala UI"/>
+        <a:font script="Tale" typeface="Microsoft Tai Le"/>
+        <a:font script="Talu" typeface="Microsoft New Tai Lue"/>
+        <a:font script="Tfng" typeface="Ebrima"/>
+      </a:minorFont>
+    </a:fontScheme>
+    <a:fmtScheme name="Стандартная">
+      <a:fillStyleLst>
+        <a:solidFill>
+          <a:schemeClr val="phClr"/>
+        </a:solidFill>
+        <a:gradFill rotWithShape="1">
+          <a:gsLst>
+            <a:gs pos="0">
+              <a:schemeClr val="phClr">
+                <a:lumMod val="110000"/>
+                <a:satMod val="105000"/>
+                <a:tint val="67000"/>
+              </a:schemeClr>
+            </a:gs>
+            <a:gs pos="50000">
+              <a:schemeClr val="phClr">
+                <a:lumMod val="105000"/>
+                <a:satMod val="103000"/>
+                <a:tint val="73000"/>
+              </a:schemeClr>
+            </a:gs>
+            <a:gs pos="100000">
+              <a:schemeClr val="phClr">
+                <a:lumMod val="105000"/>
+                <a:satMod val="109000"/>
+                <a:tint val="81000"/>
+              </a:schemeClr>
+            </a:gs>
+          </a:gsLst>
+          <a:lin ang="5400000" scaled="0"/>
+        </a:gradFill>
+        <a:gradFill rotWithShape="1">
+          <a:gsLst>
+            <a:gs pos="0">
+              <a:schemeClr val="phClr">
+                <a:satMod val="103000"/>
+                <a:lumMod val="102000"/>
+                <a:tint val="94000"/>
+              </a:schemeClr>
+            </a:gs>
+            <a:gs pos="50000">
+              <a:schemeClr val="phClr">
+                <a:satMod val="110000"/>
+                <a:lumMod val="100000"/>
+                <a:shade val="100000"/>
+              </a:schemeClr>
+            </a:gs>
+            <a:gs pos="100000">
+              <a:schemeClr val="phClr">
+                <a:lumMod val="99000"/>
+                <a:satMod val="120000"/>
+                <a:shade val="78000"/>
+              </a:schemeClr>
+            </a:gs>
+          </a:gsLst>
+          <a:lin ang="5400000" scaled="0"/>
+        </a:gradFill>
+      </a:fillStyleLst>
+      <a:lnStyleLst>
+        <a:ln w="6350" cap="flat" cmpd="sng" algn="ctr">
+          <a:solidFill>
+            <a:schemeClr val="phClr"/>
+          </a:solidFill>
+          <a:prstDash val="solid"/>
+          <a:miter lim="800000"/>
+        </a:ln>
+        <a:ln w="12700" cap="flat" cmpd="sng" algn="ctr">
+          <a:solidFill>
+            <a:schemeClr val="phClr"/>
+          </a:solidFill>
+          <a:prstDash val="solid"/>
+          <a:miter lim="800000"/>
+        </a:ln>
+        <a:ln w="19050" cap="flat" cmpd="sng" algn="ctr">
+          <a:solidFill>
+            <a:schemeClr val="phClr"/>
+          </a:solidFill>
+          <a:prstDash val="solid"/>
+          <a:miter lim="800000"/>
+        </a:ln>
+      </a:lnStyleLst>
+      <a:effectStyleLst>
+        <a:effectStyle>
+          <a:effectLst/>
+        </a:effectStyle>
+        <a:effectStyle>
+          <a:effectLst/>
+        </a:effectStyle>
+        <a:effectStyle>
+          <a:effectLst>
+            <a:outerShdw blurRad="57150" dist="19050" dir="5400000" algn="ctr" rotWithShape="0">
+              <a:srgbClr val="000000">
+                <a:alpha val="63000"/>
+              </a:srgbClr>
+            </a:outerShdw>
+          </a:effectLst>
+        </a:effectStyle>
+      </a:effectStyleLst>
+      <a:bgFillStyleLst>
+        <a:solidFill>
+          <a:schemeClr val="phClr"/>
+        </a:solidFill>
+        <a:solidFill>
+          <a:schemeClr val="phClr">
+            <a:tint val="95000"/>
+            <a:satMod val="170000"/>
+          </a:schemeClr>
+        </a:solidFill>
+        <a:gradFill rotWithShape="1">
+          <a:gsLst>
+            <a:gs pos="0">
+              <a:schemeClr val="phClr">
+                <a:tint val="93000"/>
+                <a:satMod val="150000"/>
+                <a:shade val="98000"/>
+                <a:lumMod val="102000"/>
+              </a:schemeClr>
+            </a:gs>
+            <a:gs pos="50000">
+              <a:schemeClr val="phClr">
+                <a:tint val="98000"/>
+                <a:satMod val="130000"/>
+                <a:shade val="90000"/>
+                <a:lumMod val="103000"/>
+              </a:schemeClr>
+            </a:gs>
+            <a:gs pos="100000">
+              <a:schemeClr val="phClr">
+                <a:shade val="63000"/>
+                <a:satMod val="120000"/>
+              </a:schemeClr>
+            </a:gs>
+          </a:gsLst>
+          <a:lin ang="5400000" scaled="0"/>
+        </a:gradFill>
+      </a:bgFillStyleLst>
+    </a:fmtScheme>
+  </a:themeElements>
+  <a:objectDefaults/>
+  <a:extraClrSchemeLst/>
+  <a:extLst>
+    <a:ext uri="{05A4C25C-085E-4340-85A3-A5531E510DB2}">
+      <thm15:themeFamily xmlns:thm15="http://schemas.microsoft.com/office/thememl/2012/main" name="Office Theme" id="{62F939B6-93AF-4DB8-9C6B-D6C7DFDC589F}" vid="{4A3C46E8-61CC-4603-A589-7422A47A8E4A}"/>
+    </a:ext>
+  </a:extLst>
+</a:theme>
 </file>
</xml_diff>

<commit_message>
fixed multiple small bugs. Removed ID from Energy spectra file names.
</commit_message>
<xml_diff>
--- a/out/pictures.pptx
+++ b/out/pictures.pptx
@@ -210,7 +210,7 @@
           <a:p>
             <a:fld id="{DF6124F9-195E-453D-9F90-F9370D18DA72}" type="datetimeFigureOut">
               <a:rPr lang="ru-RU" smtClean="0"/>
-              <a:t>04.12.2023</a:t>
+              <a:t>09.12.2023</a:t>
             </a:fld>
             <a:endParaRPr lang="ru-RU"/>
           </a:p>
@@ -690,7 +690,7 @@
           <a:p>
             <a:fld id="{0BCAC639-30B3-41D2-99B8-FB7EB2DDCB37}" type="datetimeFigureOut">
               <a:rPr lang="ru-RU" smtClean="0"/>
-              <a:t>04.12.2023</a:t>
+              <a:t>09.12.2023</a:t>
             </a:fld>
             <a:endParaRPr lang="ru-RU"/>
           </a:p>
@@ -858,7 +858,7 @@
           <a:p>
             <a:fld id="{0BCAC639-30B3-41D2-99B8-FB7EB2DDCB37}" type="datetimeFigureOut">
               <a:rPr lang="ru-RU" smtClean="0"/>
-              <a:t>04.12.2023</a:t>
+              <a:t>09.12.2023</a:t>
             </a:fld>
             <a:endParaRPr lang="ru-RU"/>
           </a:p>
@@ -1036,7 +1036,7 @@
           <a:p>
             <a:fld id="{0BCAC639-30B3-41D2-99B8-FB7EB2DDCB37}" type="datetimeFigureOut">
               <a:rPr lang="ru-RU" smtClean="0"/>
-              <a:t>04.12.2023</a:t>
+              <a:t>09.12.2023</a:t>
             </a:fld>
             <a:endParaRPr lang="ru-RU"/>
           </a:p>
@@ -1204,7 +1204,7 @@
           <a:p>
             <a:fld id="{0BCAC639-30B3-41D2-99B8-FB7EB2DDCB37}" type="datetimeFigureOut">
               <a:rPr lang="ru-RU" smtClean="0"/>
-              <a:t>04.12.2023</a:t>
+              <a:t>09.12.2023</a:t>
             </a:fld>
             <a:endParaRPr lang="ru-RU"/>
           </a:p>
@@ -1449,7 +1449,7 @@
           <a:p>
             <a:fld id="{0BCAC639-30B3-41D2-99B8-FB7EB2DDCB37}" type="datetimeFigureOut">
               <a:rPr lang="ru-RU" smtClean="0"/>
-              <a:t>04.12.2023</a:t>
+              <a:t>09.12.2023</a:t>
             </a:fld>
             <a:endParaRPr lang="ru-RU"/>
           </a:p>
@@ -1678,7 +1678,7 @@
           <a:p>
             <a:fld id="{0BCAC639-30B3-41D2-99B8-FB7EB2DDCB37}" type="datetimeFigureOut">
               <a:rPr lang="ru-RU" smtClean="0"/>
-              <a:t>04.12.2023</a:t>
+              <a:t>09.12.2023</a:t>
             </a:fld>
             <a:endParaRPr lang="ru-RU"/>
           </a:p>
@@ -2042,7 +2042,7 @@
           <a:p>
             <a:fld id="{0BCAC639-30B3-41D2-99B8-FB7EB2DDCB37}" type="datetimeFigureOut">
               <a:rPr lang="ru-RU" smtClean="0"/>
-              <a:t>04.12.2023</a:t>
+              <a:t>09.12.2023</a:t>
             </a:fld>
             <a:endParaRPr lang="ru-RU"/>
           </a:p>
@@ -2159,7 +2159,7 @@
           <a:p>
             <a:fld id="{0BCAC639-30B3-41D2-99B8-FB7EB2DDCB37}" type="datetimeFigureOut">
               <a:rPr lang="ru-RU" smtClean="0"/>
-              <a:t>04.12.2023</a:t>
+              <a:t>09.12.2023</a:t>
             </a:fld>
             <a:endParaRPr lang="ru-RU"/>
           </a:p>
@@ -2254,7 +2254,7 @@
           <a:p>
             <a:fld id="{0BCAC639-30B3-41D2-99B8-FB7EB2DDCB37}" type="datetimeFigureOut">
               <a:rPr lang="ru-RU" smtClean="0"/>
-              <a:t>04.12.2023</a:t>
+              <a:t>09.12.2023</a:t>
             </a:fld>
             <a:endParaRPr lang="ru-RU"/>
           </a:p>
@@ -2529,7 +2529,7 @@
           <a:p>
             <a:fld id="{0BCAC639-30B3-41D2-99B8-FB7EB2DDCB37}" type="datetimeFigureOut">
               <a:rPr lang="ru-RU" smtClean="0"/>
-              <a:t>04.12.2023</a:t>
+              <a:t>09.12.2023</a:t>
             </a:fld>
             <a:endParaRPr lang="ru-RU"/>
           </a:p>
@@ -2781,7 +2781,7 @@
           <a:p>
             <a:fld id="{0BCAC639-30B3-41D2-99B8-FB7EB2DDCB37}" type="datetimeFigureOut">
               <a:rPr lang="ru-RU" smtClean="0"/>
-              <a:t>04.12.2023</a:t>
+              <a:t>09.12.2023</a:t>
             </a:fld>
             <a:endParaRPr lang="ru-RU"/>
           </a:p>
@@ -2992,7 +2992,7 @@
           <a:p>
             <a:fld id="{0BCAC639-30B3-41D2-99B8-FB7EB2DDCB37}" type="datetimeFigureOut">
               <a:rPr lang="ru-RU" smtClean="0"/>
-              <a:t>04.12.2023</a:t>
+              <a:t>09.12.2023</a:t>
             </a:fld>
             <a:endParaRPr lang="ru-RU"/>
           </a:p>
@@ -4610,10 +4610,10 @@
       </p:grpSpPr>
       <p:grpSp>
         <p:nvGrpSpPr>
-          <p:cNvPr id="15" name="Группа 14">
+          <p:cNvPr id="42" name="Группа 41">
             <a:extLst>
               <a:ext uri="{FF2B5EF4-FFF2-40B4-BE49-F238E27FC236}">
-                <a16:creationId xmlns:a16="http://schemas.microsoft.com/office/drawing/2014/main" id="{BBAB5685-DD99-3272-34A6-9E745A06BDCD}"/>
+                <a16:creationId xmlns:a16="http://schemas.microsoft.com/office/drawing/2014/main" id="{DE413482-6571-ECA8-E71E-1A2BF4BB4E8A}"/>
               </a:ext>
             </a:extLst>
           </p:cNvPr>
@@ -7487,7 +7487,7 @@
           </p:nvSpPr>
           <p:spPr>
             <a:xfrm rot="9284611">
-              <a:off x="5280862" y="976194"/>
+              <a:off x="5267290" y="984082"/>
               <a:ext cx="2326102" cy="1940371"/>
             </a:xfrm>
             <a:prstGeom prst="parallelogram">
@@ -7815,6 +7815,94 @@
             </a:fontRef>
           </p:style>
         </p:cxnSp>
+        <p:cxnSp>
+          <p:nvCxnSpPr>
+            <p:cNvPr id="5" name="Прямая соединительная линия 4">
+              <a:extLst>
+                <a:ext uri="{FF2B5EF4-FFF2-40B4-BE49-F238E27FC236}">
+                  <a16:creationId xmlns:a16="http://schemas.microsoft.com/office/drawing/2014/main" id="{2F1BA28D-FE61-ACE1-0EFF-A0F00C020D64}"/>
+                </a:ext>
+              </a:extLst>
+            </p:cNvPr>
+            <p:cNvCxnSpPr>
+              <a:cxnSpLocks/>
+            </p:cNvCxnSpPr>
+            <p:nvPr/>
+          </p:nvCxnSpPr>
+          <p:spPr>
+            <a:xfrm flipH="1">
+              <a:off x="5760656" y="1156790"/>
+              <a:ext cx="1171791" cy="2206468"/>
+            </a:xfrm>
+            <a:prstGeom prst="line">
+              <a:avLst/>
+            </a:prstGeom>
+            <a:ln w="3175">
+              <a:solidFill>
+                <a:srgbClr val="00B050"/>
+              </a:solidFill>
+              <a:prstDash val="solid"/>
+            </a:ln>
+          </p:spPr>
+          <p:style>
+            <a:lnRef idx="1">
+              <a:schemeClr val="accent1"/>
+            </a:lnRef>
+            <a:fillRef idx="0">
+              <a:schemeClr val="accent1"/>
+            </a:fillRef>
+            <a:effectRef idx="0">
+              <a:schemeClr val="accent1"/>
+            </a:effectRef>
+            <a:fontRef idx="minor">
+              <a:schemeClr val="tx1"/>
+            </a:fontRef>
+          </p:style>
+        </p:cxnSp>
+        <p:cxnSp>
+          <p:nvCxnSpPr>
+            <p:cNvPr id="18" name="Прямая соединительная линия 17">
+              <a:extLst>
+                <a:ext uri="{FF2B5EF4-FFF2-40B4-BE49-F238E27FC236}">
+                  <a16:creationId xmlns:a16="http://schemas.microsoft.com/office/drawing/2014/main" id="{409FDF73-A846-C518-7CA4-E986C1C404D1}"/>
+                </a:ext>
+              </a:extLst>
+            </p:cNvPr>
+            <p:cNvCxnSpPr>
+              <a:cxnSpLocks/>
+            </p:cNvCxnSpPr>
+            <p:nvPr/>
+          </p:nvCxnSpPr>
+          <p:spPr>
+            <a:xfrm flipH="1">
+              <a:off x="5786378" y="971879"/>
+              <a:ext cx="889109" cy="2351817"/>
+            </a:xfrm>
+            <a:prstGeom prst="line">
+              <a:avLst/>
+            </a:prstGeom>
+            <a:ln w="3175">
+              <a:solidFill>
+                <a:srgbClr val="00B050"/>
+              </a:solidFill>
+              <a:prstDash val="solid"/>
+            </a:ln>
+          </p:spPr>
+          <p:style>
+            <a:lnRef idx="1">
+              <a:schemeClr val="accent1"/>
+            </a:lnRef>
+            <a:fillRef idx="0">
+              <a:schemeClr val="accent1"/>
+            </a:fillRef>
+            <a:effectRef idx="0">
+              <a:schemeClr val="accent1"/>
+            </a:effectRef>
+            <a:fontRef idx="minor">
+              <a:schemeClr val="tx1"/>
+            </a:fontRef>
+          </p:style>
+        </p:cxnSp>
         <p:sp>
           <p:nvSpPr>
             <p:cNvPr id="38" name="Овал 37">
@@ -7866,6 +7954,129 @@
             <a:p>
               <a:pPr algn="ctr"/>
               <a:endParaRPr lang="ru-RU"/>
+            </a:p>
+          </p:txBody>
+        </p:sp>
+        <p:sp>
+          <p:nvSpPr>
+            <p:cNvPr id="35" name="Дуга 34">
+              <a:extLst>
+                <a:ext uri="{FF2B5EF4-FFF2-40B4-BE49-F238E27FC236}">
+                  <a16:creationId xmlns:a16="http://schemas.microsoft.com/office/drawing/2014/main" id="{56D6ADD6-4F91-D6CA-0766-83C35E30AF29}"/>
+                </a:ext>
+              </a:extLst>
+            </p:cNvPr>
+            <p:cNvSpPr/>
+            <p:nvPr/>
+          </p:nvSpPr>
+          <p:spPr>
+            <a:xfrm rot="18722435">
+              <a:off x="5861950" y="1217562"/>
+              <a:ext cx="1177863" cy="1163151"/>
+            </a:xfrm>
+            <a:prstGeom prst="arc">
+              <a:avLst>
+                <a:gd name="adj1" fmla="val 19826836"/>
+                <a:gd name="adj2" fmla="val 0"/>
+              </a:avLst>
+            </a:prstGeom>
+            <a:ln w="3175">
+              <a:solidFill>
+                <a:srgbClr val="00B050"/>
+              </a:solidFill>
+              <a:prstDash val="solid"/>
+            </a:ln>
+          </p:spPr>
+          <p:style>
+            <a:lnRef idx="1">
+              <a:schemeClr val="accent1"/>
+            </a:lnRef>
+            <a:fillRef idx="0">
+              <a:schemeClr val="accent1"/>
+            </a:fillRef>
+            <a:effectRef idx="0">
+              <a:schemeClr val="accent1"/>
+            </a:effectRef>
+            <a:fontRef idx="minor">
+              <a:schemeClr val="tx1"/>
+            </a:fontRef>
+          </p:style>
+          <p:txBody>
+            <a:bodyPr rtlCol="0" anchor="ctr"/>
+            <a:lstStyle/>
+            <a:p>
+              <a:pPr algn="ctr"/>
+              <a:endParaRPr lang="ru-RU"/>
+            </a:p>
+          </p:txBody>
+        </p:sp>
+        <p:sp>
+          <p:nvSpPr>
+            <p:cNvPr id="36" name="Прямоугольник 35">
+              <a:extLst>
+                <a:ext uri="{FF2B5EF4-FFF2-40B4-BE49-F238E27FC236}">
+                  <a16:creationId xmlns:a16="http://schemas.microsoft.com/office/drawing/2014/main" id="{BFEFB985-50F2-F403-3DB2-4A1965FF9935}"/>
+                </a:ext>
+              </a:extLst>
+            </p:cNvPr>
+            <p:cNvSpPr/>
+            <p:nvPr/>
+          </p:nvSpPr>
+          <p:spPr>
+            <a:xfrm>
+              <a:off x="6591016" y="1159310"/>
+              <a:ext cx="694267" cy="550755"/>
+            </a:xfrm>
+            <a:prstGeom prst="rect">
+              <a:avLst/>
+            </a:prstGeom>
+            <a:noFill/>
+            <a:ln>
+              <a:noFill/>
+            </a:ln>
+          </p:spPr>
+          <p:style>
+            <a:lnRef idx="2">
+              <a:schemeClr val="accent1">
+                <a:shade val="50000"/>
+              </a:schemeClr>
+            </a:lnRef>
+            <a:fillRef idx="1">
+              <a:schemeClr val="accent1"/>
+            </a:fillRef>
+            <a:effectRef idx="0">
+              <a:schemeClr val="accent1"/>
+            </a:effectRef>
+            <a:fontRef idx="minor">
+              <a:schemeClr val="lt1"/>
+            </a:fontRef>
+          </p:style>
+          <p:txBody>
+            <a:bodyPr rtlCol="0" anchor="ctr"/>
+            <a:lstStyle/>
+            <a:p>
+              <a:pPr algn="ctr"/>
+              <a:r>
+                <a:rPr lang="en-US" dirty="0">
+                  <a:solidFill>
+                    <a:srgbClr val="00B050"/>
+                  </a:solidFill>
+                </a:rPr>
+                <a:t>d</a:t>
+              </a:r>
+              <a:r>
+                <a:rPr lang="el-GR" dirty="0">
+                  <a:solidFill>
+                    <a:srgbClr val="00B050"/>
+                  </a:solidFill>
+                </a:rPr>
+                <a:t>β</a:t>
+              </a:r>
+              <a:endParaRPr lang="ru-RU" dirty="0">
+                <a:solidFill>
+                  <a:srgbClr val="00B050"/>
+                </a:solidFill>
+              </a:endParaRPr>
             </a:p>
           </p:txBody>
         </p:sp>

</xml_diff>

<commit_message>
dEtoE mode is upgraded
</commit_message>
<xml_diff>
--- a/out/pictures.pptx
+++ b/out/pictures.pptx
@@ -5,12 +5,15 @@
     <p:sldMasterId id="2147483648" r:id="rId1"/>
   </p:sldMasterIdLst>
   <p:notesMasterIdLst>
-    <p:notesMasterId r:id="rId5"/>
+    <p:notesMasterId r:id="rId8"/>
   </p:notesMasterIdLst>
   <p:sldIdLst>
     <p:sldId id="256" r:id="rId2"/>
     <p:sldId id="257" r:id="rId3"/>
     <p:sldId id="258" r:id="rId4"/>
+    <p:sldId id="259" r:id="rId5"/>
+    <p:sldId id="260" r:id="rId6"/>
+    <p:sldId id="261" r:id="rId7"/>
   </p:sldIdLst>
   <p:sldSz cx="12192000" cy="6858000"/>
   <p:notesSz cx="6858000" cy="9144000"/>
@@ -210,7 +213,7 @@
           <a:p>
             <a:fld id="{DF6124F9-195E-453D-9F90-F9370D18DA72}" type="datetimeFigureOut">
               <a:rPr lang="ru-RU" smtClean="0"/>
-              <a:t>09.12.2023</a:t>
+              <a:t>11.12.2023</a:t>
             </a:fld>
             <a:endParaRPr lang="ru-RU"/>
           </a:p>
@@ -690,7 +693,7 @@
           <a:p>
             <a:fld id="{0BCAC639-30B3-41D2-99B8-FB7EB2DDCB37}" type="datetimeFigureOut">
               <a:rPr lang="ru-RU" smtClean="0"/>
-              <a:t>09.12.2023</a:t>
+              <a:t>11.12.2023</a:t>
             </a:fld>
             <a:endParaRPr lang="ru-RU"/>
           </a:p>
@@ -858,7 +861,7 @@
           <a:p>
             <a:fld id="{0BCAC639-30B3-41D2-99B8-FB7EB2DDCB37}" type="datetimeFigureOut">
               <a:rPr lang="ru-RU" smtClean="0"/>
-              <a:t>09.12.2023</a:t>
+              <a:t>11.12.2023</a:t>
             </a:fld>
             <a:endParaRPr lang="ru-RU"/>
           </a:p>
@@ -1036,7 +1039,7 @@
           <a:p>
             <a:fld id="{0BCAC639-30B3-41D2-99B8-FB7EB2DDCB37}" type="datetimeFigureOut">
               <a:rPr lang="ru-RU" smtClean="0"/>
-              <a:t>09.12.2023</a:t>
+              <a:t>11.12.2023</a:t>
             </a:fld>
             <a:endParaRPr lang="ru-RU"/>
           </a:p>
@@ -1204,7 +1207,7 @@
           <a:p>
             <a:fld id="{0BCAC639-30B3-41D2-99B8-FB7EB2DDCB37}" type="datetimeFigureOut">
               <a:rPr lang="ru-RU" smtClean="0"/>
-              <a:t>09.12.2023</a:t>
+              <a:t>11.12.2023</a:t>
             </a:fld>
             <a:endParaRPr lang="ru-RU"/>
           </a:p>
@@ -1449,7 +1452,7 @@
           <a:p>
             <a:fld id="{0BCAC639-30B3-41D2-99B8-FB7EB2DDCB37}" type="datetimeFigureOut">
               <a:rPr lang="ru-RU" smtClean="0"/>
-              <a:t>09.12.2023</a:t>
+              <a:t>11.12.2023</a:t>
             </a:fld>
             <a:endParaRPr lang="ru-RU"/>
           </a:p>
@@ -1678,7 +1681,7 @@
           <a:p>
             <a:fld id="{0BCAC639-30B3-41D2-99B8-FB7EB2DDCB37}" type="datetimeFigureOut">
               <a:rPr lang="ru-RU" smtClean="0"/>
-              <a:t>09.12.2023</a:t>
+              <a:t>11.12.2023</a:t>
             </a:fld>
             <a:endParaRPr lang="ru-RU"/>
           </a:p>
@@ -2042,7 +2045,7 @@
           <a:p>
             <a:fld id="{0BCAC639-30B3-41D2-99B8-FB7EB2DDCB37}" type="datetimeFigureOut">
               <a:rPr lang="ru-RU" smtClean="0"/>
-              <a:t>09.12.2023</a:t>
+              <a:t>11.12.2023</a:t>
             </a:fld>
             <a:endParaRPr lang="ru-RU"/>
           </a:p>
@@ -2159,7 +2162,7 @@
           <a:p>
             <a:fld id="{0BCAC639-30B3-41D2-99B8-FB7EB2DDCB37}" type="datetimeFigureOut">
               <a:rPr lang="ru-RU" smtClean="0"/>
-              <a:t>09.12.2023</a:t>
+              <a:t>11.12.2023</a:t>
             </a:fld>
             <a:endParaRPr lang="ru-RU"/>
           </a:p>
@@ -2254,7 +2257,7 @@
           <a:p>
             <a:fld id="{0BCAC639-30B3-41D2-99B8-FB7EB2DDCB37}" type="datetimeFigureOut">
               <a:rPr lang="ru-RU" smtClean="0"/>
-              <a:t>09.12.2023</a:t>
+              <a:t>11.12.2023</a:t>
             </a:fld>
             <a:endParaRPr lang="ru-RU"/>
           </a:p>
@@ -2529,7 +2532,7 @@
           <a:p>
             <a:fld id="{0BCAC639-30B3-41D2-99B8-FB7EB2DDCB37}" type="datetimeFigureOut">
               <a:rPr lang="ru-RU" smtClean="0"/>
-              <a:t>09.12.2023</a:t>
+              <a:t>11.12.2023</a:t>
             </a:fld>
             <a:endParaRPr lang="ru-RU"/>
           </a:p>
@@ -2781,7 +2784,7 @@
           <a:p>
             <a:fld id="{0BCAC639-30B3-41D2-99B8-FB7EB2DDCB37}" type="datetimeFigureOut">
               <a:rPr lang="ru-RU" smtClean="0"/>
-              <a:t>09.12.2023</a:t>
+              <a:t>11.12.2023</a:t>
             </a:fld>
             <a:endParaRPr lang="ru-RU"/>
           </a:p>
@@ -2992,7 +2995,7 @@
           <a:p>
             <a:fld id="{0BCAC639-30B3-41D2-99B8-FB7EB2DDCB37}" type="datetimeFigureOut">
               <a:rPr lang="ru-RU" smtClean="0"/>
-              <a:t>09.12.2023</a:t>
+              <a:t>11.12.2023</a:t>
             </a:fld>
             <a:endParaRPr lang="ru-RU"/>
           </a:p>
@@ -8271,6 +8274,1183 @@
     <p:extLst>
       <p:ext uri="{BB962C8B-B14F-4D97-AF65-F5344CB8AC3E}">
         <p14:creationId xmlns:p14="http://schemas.microsoft.com/office/powerpoint/2010/main" val="80012373"/>
+      </p:ext>
+    </p:extLst>
+  </p:cSld>
+  <p:clrMapOvr>
+    <a:masterClrMapping/>
+  </p:clrMapOvr>
+</p:sld>
+</file>
+
+<file path=ppt/slides/slide4.xml><?xml version="1.0" encoding="utf-8"?>
+<p:sld xmlns:a="http://schemas.openxmlformats.org/drawingml/2006/main" xmlns:r="http://schemas.openxmlformats.org/officeDocument/2006/relationships" xmlns:p="http://schemas.openxmlformats.org/presentationml/2006/main">
+  <p:cSld>
+    <p:spTree>
+      <p:nvGrpSpPr>
+        <p:cNvPr id="1" name=""/>
+        <p:cNvGrpSpPr/>
+        <p:nvPr/>
+      </p:nvGrpSpPr>
+      <p:grpSpPr>
+        <a:xfrm>
+          <a:off x="0" y="0"/>
+          <a:ext cx="0" cy="0"/>
+          <a:chOff x="0" y="0"/>
+          <a:chExt cx="0" cy="0"/>
+        </a:xfrm>
+      </p:grpSpPr>
+      <p:grpSp>
+        <p:nvGrpSpPr>
+          <p:cNvPr id="4" name="Группа 3">
+            <a:extLst>
+              <a:ext uri="{FF2B5EF4-FFF2-40B4-BE49-F238E27FC236}">
+                <a16:creationId xmlns:a16="http://schemas.microsoft.com/office/drawing/2014/main" id="{531E0445-8EBB-D9F2-FA2F-F454C7710415}"/>
+              </a:ext>
+            </a:extLst>
+          </p:cNvPr>
+          <p:cNvGrpSpPr/>
+          <p:nvPr/>
+        </p:nvGrpSpPr>
+        <p:grpSpPr>
+          <a:xfrm>
+            <a:off x="2399381" y="536510"/>
+            <a:ext cx="7109926" cy="5784980"/>
+            <a:chOff x="2537927" y="662473"/>
+            <a:chExt cx="7109926" cy="5784980"/>
+          </a:xfrm>
+        </p:grpSpPr>
+        <p:grpSp>
+          <p:nvGrpSpPr>
+            <p:cNvPr id="12" name="Группа 11">
+              <a:extLst>
+                <a:ext uri="{FF2B5EF4-FFF2-40B4-BE49-F238E27FC236}">
+                  <a16:creationId xmlns:a16="http://schemas.microsoft.com/office/drawing/2014/main" id="{440D8C8B-7484-8EB9-22E5-41E5F1DFC31A}"/>
+                </a:ext>
+              </a:extLst>
+            </p:cNvPr>
+            <p:cNvGrpSpPr/>
+            <p:nvPr/>
+          </p:nvGrpSpPr>
+          <p:grpSpPr>
+            <a:xfrm>
+              <a:off x="2537927" y="662473"/>
+              <a:ext cx="7109926" cy="5784980"/>
+              <a:chOff x="2537927" y="662473"/>
+              <a:chExt cx="7109926" cy="5784980"/>
+            </a:xfrm>
+          </p:grpSpPr>
+          <p:pic>
+            <p:nvPicPr>
+              <p:cNvPr id="7" name="Рисунок 6" descr="Изображение выглядит как текст, снимок экрана, Прямоугольник, диаграмма&#10;&#10;Автоматически созданное описание">
+                <a:extLst>
+                  <a:ext uri="{FF2B5EF4-FFF2-40B4-BE49-F238E27FC236}">
+                    <a16:creationId xmlns:a16="http://schemas.microsoft.com/office/drawing/2014/main" id="{26C666FF-723D-0E15-3296-2742CFE7221D}"/>
+                  </a:ext>
+                </a:extLst>
+              </p:cNvPr>
+              <p:cNvPicPr>
+                <a:picLocks noChangeAspect="1"/>
+              </p:cNvPicPr>
+              <p:nvPr/>
+            </p:nvPicPr>
+            <p:blipFill rotWithShape="1">
+              <a:blip r:embed="rId2" cstate="print">
+                <a:extLst>
+                  <a:ext uri="{28A0092B-C50C-407E-A947-70E740481C1C}">
+                    <a14:useLocalDpi xmlns:a14="http://schemas.microsoft.com/office/drawing/2010/main" val="0"/>
+                  </a:ext>
+                </a:extLst>
+              </a:blip>
+              <a:srcRect l="8728" t="9660" r="11921" b="5987"/>
+              <a:stretch/>
+            </p:blipFill>
+            <p:spPr>
+              <a:xfrm>
+                <a:off x="2537927" y="662473"/>
+                <a:ext cx="7109926" cy="5784980"/>
+              </a:xfrm>
+              <a:prstGeom prst="rect">
+                <a:avLst/>
+              </a:prstGeom>
+            </p:spPr>
+          </p:pic>
+          <p:sp>
+            <p:nvSpPr>
+              <p:cNvPr id="8" name="Правая фигурная скобка 7">
+                <a:extLst>
+                  <a:ext uri="{FF2B5EF4-FFF2-40B4-BE49-F238E27FC236}">
+                    <a16:creationId xmlns:a16="http://schemas.microsoft.com/office/drawing/2014/main" id="{218C3339-A376-50C6-D9C1-8D4F7A53647F}"/>
+                  </a:ext>
+                </a:extLst>
+              </p:cNvPr>
+              <p:cNvSpPr/>
+              <p:nvPr/>
+            </p:nvSpPr>
+            <p:spPr>
+              <a:xfrm rot="16200000">
+                <a:off x="7037712" y="1768835"/>
+                <a:ext cx="178835" cy="594237"/>
+              </a:xfrm>
+              <a:prstGeom prst="rightBrace">
+                <a:avLst/>
+              </a:prstGeom>
+              <a:ln w="19050">
+                <a:solidFill>
+                  <a:schemeClr val="bg1"/>
+                </a:solidFill>
+              </a:ln>
+            </p:spPr>
+            <p:style>
+              <a:lnRef idx="1">
+                <a:schemeClr val="accent1"/>
+              </a:lnRef>
+              <a:fillRef idx="0">
+                <a:schemeClr val="accent1"/>
+              </a:fillRef>
+              <a:effectRef idx="0">
+                <a:schemeClr val="accent1"/>
+              </a:effectRef>
+              <a:fontRef idx="minor">
+                <a:schemeClr val="tx1"/>
+              </a:fontRef>
+            </p:style>
+            <p:txBody>
+              <a:bodyPr rtlCol="0" anchor="ctr"/>
+              <a:lstStyle/>
+              <a:p>
+                <a:pPr algn="ctr"/>
+                <a:endParaRPr lang="ru-RU"/>
+              </a:p>
+            </p:txBody>
+          </p:sp>
+          <p:sp>
+            <p:nvSpPr>
+              <p:cNvPr id="9" name="Прямоугольник 8">
+                <a:extLst>
+                  <a:ext uri="{FF2B5EF4-FFF2-40B4-BE49-F238E27FC236}">
+                    <a16:creationId xmlns:a16="http://schemas.microsoft.com/office/drawing/2014/main" id="{300EEAEA-EA81-4B01-6A79-6970B5FD8EF7}"/>
+                  </a:ext>
+                </a:extLst>
+              </p:cNvPr>
+              <p:cNvSpPr/>
+              <p:nvPr/>
+            </p:nvSpPr>
+            <p:spPr>
+              <a:xfrm>
+                <a:off x="6716582" y="1552769"/>
+                <a:ext cx="821094" cy="466530"/>
+              </a:xfrm>
+              <a:prstGeom prst="rect">
+                <a:avLst/>
+              </a:prstGeom>
+              <a:noFill/>
+              <a:ln>
+                <a:noFill/>
+              </a:ln>
+            </p:spPr>
+            <p:style>
+              <a:lnRef idx="2">
+                <a:schemeClr val="accent1">
+                  <a:shade val="15000"/>
+                </a:schemeClr>
+              </a:lnRef>
+              <a:fillRef idx="1">
+                <a:schemeClr val="accent1"/>
+              </a:fillRef>
+              <a:effectRef idx="0">
+                <a:schemeClr val="accent1"/>
+              </a:effectRef>
+              <a:fontRef idx="minor">
+                <a:schemeClr val="lt1"/>
+              </a:fontRef>
+            </p:style>
+            <p:txBody>
+              <a:bodyPr rtlCol="0" anchor="ctr"/>
+              <a:lstStyle/>
+              <a:p>
+                <a:pPr algn="ctr"/>
+                <a:r>
+                  <a:rPr lang="en-US" dirty="0"/>
+                  <a:t>Estep</a:t>
+                </a:r>
+                <a:endParaRPr lang="ru-RU" dirty="0"/>
+              </a:p>
+            </p:txBody>
+          </p:sp>
+          <p:sp>
+            <p:nvSpPr>
+              <p:cNvPr id="10" name="Правая фигурная скобка 9">
+                <a:extLst>
+                  <a:ext uri="{FF2B5EF4-FFF2-40B4-BE49-F238E27FC236}">
+                    <a16:creationId xmlns:a16="http://schemas.microsoft.com/office/drawing/2014/main" id="{921525B8-7C81-DA4D-BFFB-3DAE4BB0AD61}"/>
+                  </a:ext>
+                </a:extLst>
+              </p:cNvPr>
+              <p:cNvSpPr/>
+              <p:nvPr/>
+            </p:nvSpPr>
+            <p:spPr>
+              <a:xfrm rot="16200000">
+                <a:off x="7918679" y="1446146"/>
+                <a:ext cx="199050" cy="416963"/>
+              </a:xfrm>
+              <a:prstGeom prst="rightBrace">
+                <a:avLst/>
+              </a:prstGeom>
+              <a:ln w="19050">
+                <a:solidFill>
+                  <a:schemeClr val="bg1"/>
+                </a:solidFill>
+              </a:ln>
+            </p:spPr>
+            <p:style>
+              <a:lnRef idx="1">
+                <a:schemeClr val="accent1"/>
+              </a:lnRef>
+              <a:fillRef idx="0">
+                <a:schemeClr val="accent1"/>
+              </a:fillRef>
+              <a:effectRef idx="0">
+                <a:schemeClr val="accent1"/>
+              </a:effectRef>
+              <a:fontRef idx="minor">
+                <a:schemeClr val="tx1"/>
+              </a:fontRef>
+            </p:style>
+            <p:txBody>
+              <a:bodyPr rtlCol="0" anchor="ctr"/>
+              <a:lstStyle/>
+              <a:p>
+                <a:pPr algn="ctr"/>
+                <a:endParaRPr lang="ru-RU"/>
+              </a:p>
+            </p:txBody>
+          </p:sp>
+          <p:sp>
+            <p:nvSpPr>
+              <p:cNvPr id="11" name="Прямоугольник 10">
+                <a:extLst>
+                  <a:ext uri="{FF2B5EF4-FFF2-40B4-BE49-F238E27FC236}">
+                    <a16:creationId xmlns:a16="http://schemas.microsoft.com/office/drawing/2014/main" id="{F8C517F0-7826-DFC2-215B-3E6854FCEA8A}"/>
+                  </a:ext>
+                </a:extLst>
+              </p:cNvPr>
+              <p:cNvSpPr/>
+              <p:nvPr/>
+            </p:nvSpPr>
+            <p:spPr>
+              <a:xfrm>
+                <a:off x="7607657" y="1132893"/>
+                <a:ext cx="821094" cy="466530"/>
+              </a:xfrm>
+              <a:prstGeom prst="rect">
+                <a:avLst/>
+              </a:prstGeom>
+              <a:noFill/>
+              <a:ln>
+                <a:noFill/>
+              </a:ln>
+            </p:spPr>
+            <p:style>
+              <a:lnRef idx="2">
+                <a:schemeClr val="accent1">
+                  <a:shade val="15000"/>
+                </a:schemeClr>
+              </a:lnRef>
+              <a:fillRef idx="1">
+                <a:schemeClr val="accent1"/>
+              </a:fillRef>
+              <a:effectRef idx="0">
+                <a:schemeClr val="accent1"/>
+              </a:effectRef>
+              <a:fontRef idx="minor">
+                <a:schemeClr val="lt1"/>
+              </a:fontRef>
+            </p:style>
+            <p:txBody>
+              <a:bodyPr rtlCol="0" anchor="ctr"/>
+              <a:lstStyle/>
+              <a:p>
+                <a:pPr algn="ctr"/>
+                <a:r>
+                  <a:rPr lang="en-US" dirty="0" err="1"/>
+                  <a:t>dE</a:t>
+                </a:r>
+                <a:endParaRPr lang="ru-RU" dirty="0"/>
+              </a:p>
+            </p:txBody>
+          </p:sp>
+        </p:grpSp>
+        <p:sp>
+          <p:nvSpPr>
+            <p:cNvPr id="2" name="Прямоугольник 1">
+              <a:extLst>
+                <a:ext uri="{FF2B5EF4-FFF2-40B4-BE49-F238E27FC236}">
+                  <a16:creationId xmlns:a16="http://schemas.microsoft.com/office/drawing/2014/main" id="{A84E00E9-85AF-B951-AF8D-62141D360742}"/>
+                </a:ext>
+              </a:extLst>
+            </p:cNvPr>
+            <p:cNvSpPr/>
+            <p:nvPr/>
+          </p:nvSpPr>
+          <p:spPr>
+            <a:xfrm>
+              <a:off x="6973455" y="6114473"/>
+              <a:ext cx="498763" cy="304800"/>
+            </a:xfrm>
+            <a:prstGeom prst="rect">
+              <a:avLst/>
+            </a:prstGeom>
+            <a:solidFill>
+              <a:schemeClr val="bg1"/>
+            </a:solidFill>
+            <a:ln>
+              <a:noFill/>
+            </a:ln>
+          </p:spPr>
+          <p:style>
+            <a:lnRef idx="2">
+              <a:schemeClr val="accent1">
+                <a:shade val="15000"/>
+              </a:schemeClr>
+            </a:lnRef>
+            <a:fillRef idx="1">
+              <a:schemeClr val="accent1"/>
+            </a:fillRef>
+            <a:effectRef idx="0">
+              <a:schemeClr val="accent1"/>
+            </a:effectRef>
+            <a:fontRef idx="minor">
+              <a:schemeClr val="lt1"/>
+            </a:fontRef>
+          </p:style>
+          <p:txBody>
+            <a:bodyPr rtlCol="0" anchor="ctr"/>
+            <a:lstStyle/>
+            <a:p>
+              <a:pPr algn="ctr"/>
+              <a:endParaRPr lang="ru-RU" dirty="0"/>
+            </a:p>
+          </p:txBody>
+        </p:sp>
+      </p:grpSp>
+    </p:spTree>
+    <p:extLst>
+      <p:ext uri="{BB962C8B-B14F-4D97-AF65-F5344CB8AC3E}">
+        <p14:creationId xmlns:p14="http://schemas.microsoft.com/office/powerpoint/2010/main" val="1377244698"/>
+      </p:ext>
+    </p:extLst>
+  </p:cSld>
+  <p:clrMapOvr>
+    <a:masterClrMapping/>
+  </p:clrMapOvr>
+</p:sld>
+</file>
+
+<file path=ppt/slides/slide5.xml><?xml version="1.0" encoding="utf-8"?>
+<p:sld xmlns:a="http://schemas.openxmlformats.org/drawingml/2006/main" xmlns:r="http://schemas.openxmlformats.org/officeDocument/2006/relationships" xmlns:p="http://schemas.openxmlformats.org/presentationml/2006/main">
+  <p:cSld>
+    <p:spTree>
+      <p:nvGrpSpPr>
+        <p:cNvPr id="1" name=""/>
+        <p:cNvGrpSpPr/>
+        <p:nvPr/>
+      </p:nvGrpSpPr>
+      <p:grpSpPr>
+        <a:xfrm>
+          <a:off x="0" y="0"/>
+          <a:ext cx="0" cy="0"/>
+          <a:chOff x="0" y="0"/>
+          <a:chExt cx="0" cy="0"/>
+        </a:xfrm>
+      </p:grpSpPr>
+      <p:pic>
+        <p:nvPicPr>
+          <p:cNvPr id="3" name="Рисунок 2" descr="Изображение выглядит как текст, снимок экрана, Прямоугольник, диаграмма&#10;&#10;Автоматически созданное описание">
+            <a:extLst>
+              <a:ext uri="{FF2B5EF4-FFF2-40B4-BE49-F238E27FC236}">
+                <a16:creationId xmlns:a16="http://schemas.microsoft.com/office/drawing/2014/main" id="{F30D884F-85DB-48B0-B8FD-1E251BFA7092}"/>
+              </a:ext>
+            </a:extLst>
+          </p:cNvPr>
+          <p:cNvPicPr>
+            <a:picLocks noChangeAspect="1"/>
+          </p:cNvPicPr>
+          <p:nvPr/>
+        </p:nvPicPr>
+        <p:blipFill rotWithShape="1">
+          <a:blip r:embed="rId2" cstate="print">
+            <a:extLst>
+              <a:ext uri="{28A0092B-C50C-407E-A947-70E740481C1C}">
+                <a14:useLocalDpi xmlns:a14="http://schemas.microsoft.com/office/drawing/2010/main" val="0"/>
+              </a:ext>
+            </a:extLst>
+          </a:blip>
+          <a:srcRect l="7999" t="8436" r="12754" b="5987"/>
+          <a:stretch/>
+        </p:blipFill>
+        <p:spPr>
+          <a:xfrm>
+            <a:off x="2453950" y="485192"/>
+            <a:ext cx="7100597" cy="5868955"/>
+          </a:xfrm>
+          <a:prstGeom prst="rect">
+            <a:avLst/>
+          </a:prstGeom>
+        </p:spPr>
+      </p:pic>
+      <p:sp>
+        <p:nvSpPr>
+          <p:cNvPr id="8" name="Правая фигурная скобка 7">
+            <a:extLst>
+              <a:ext uri="{FF2B5EF4-FFF2-40B4-BE49-F238E27FC236}">
+                <a16:creationId xmlns:a16="http://schemas.microsoft.com/office/drawing/2014/main" id="{218C3339-A376-50C6-D9C1-8D4F7A53647F}"/>
+              </a:ext>
+            </a:extLst>
+          </p:cNvPr>
+          <p:cNvSpPr/>
+          <p:nvPr/>
+        </p:nvSpPr>
+        <p:spPr>
+          <a:xfrm rot="16200000">
+            <a:off x="7037712" y="1768835"/>
+            <a:ext cx="178835" cy="594237"/>
+          </a:xfrm>
+          <a:prstGeom prst="rightBrace">
+            <a:avLst/>
+          </a:prstGeom>
+          <a:ln w="19050">
+            <a:solidFill>
+              <a:schemeClr val="bg1"/>
+            </a:solidFill>
+          </a:ln>
+        </p:spPr>
+        <p:style>
+          <a:lnRef idx="1">
+            <a:schemeClr val="accent1"/>
+          </a:lnRef>
+          <a:fillRef idx="0">
+            <a:schemeClr val="accent1"/>
+          </a:fillRef>
+          <a:effectRef idx="0">
+            <a:schemeClr val="accent1"/>
+          </a:effectRef>
+          <a:fontRef idx="minor">
+            <a:schemeClr val="tx1"/>
+          </a:fontRef>
+        </p:style>
+        <p:txBody>
+          <a:bodyPr rtlCol="0" anchor="ctr"/>
+          <a:lstStyle/>
+          <a:p>
+            <a:pPr algn="ctr"/>
+            <a:endParaRPr lang="ru-RU"/>
+          </a:p>
+        </p:txBody>
+      </p:sp>
+      <p:sp>
+        <p:nvSpPr>
+          <p:cNvPr id="9" name="Прямоугольник 8">
+            <a:extLst>
+              <a:ext uri="{FF2B5EF4-FFF2-40B4-BE49-F238E27FC236}">
+                <a16:creationId xmlns:a16="http://schemas.microsoft.com/office/drawing/2014/main" id="{300EEAEA-EA81-4B01-6A79-6970B5FD8EF7}"/>
+              </a:ext>
+            </a:extLst>
+          </p:cNvPr>
+          <p:cNvSpPr/>
+          <p:nvPr/>
+        </p:nvSpPr>
+        <p:spPr>
+          <a:xfrm>
+            <a:off x="6716582" y="1552769"/>
+            <a:ext cx="821094" cy="466530"/>
+          </a:xfrm>
+          <a:prstGeom prst="rect">
+            <a:avLst/>
+          </a:prstGeom>
+          <a:noFill/>
+          <a:ln>
+            <a:noFill/>
+          </a:ln>
+        </p:spPr>
+        <p:style>
+          <a:lnRef idx="2">
+            <a:schemeClr val="accent1">
+              <a:shade val="15000"/>
+            </a:schemeClr>
+          </a:lnRef>
+          <a:fillRef idx="1">
+            <a:schemeClr val="accent1"/>
+          </a:fillRef>
+          <a:effectRef idx="0">
+            <a:schemeClr val="accent1"/>
+          </a:effectRef>
+          <a:fontRef idx="minor">
+            <a:schemeClr val="lt1"/>
+          </a:fontRef>
+        </p:style>
+        <p:txBody>
+          <a:bodyPr rtlCol="0" anchor="ctr"/>
+          <a:lstStyle/>
+          <a:p>
+            <a:pPr algn="ctr"/>
+            <a:r>
+              <a:rPr lang="en-US" dirty="0"/>
+              <a:t>Estep</a:t>
+            </a:r>
+            <a:endParaRPr lang="ru-RU" dirty="0"/>
+          </a:p>
+        </p:txBody>
+      </p:sp>
+      <p:sp>
+        <p:nvSpPr>
+          <p:cNvPr id="10" name="Правая фигурная скобка 9">
+            <a:extLst>
+              <a:ext uri="{FF2B5EF4-FFF2-40B4-BE49-F238E27FC236}">
+                <a16:creationId xmlns:a16="http://schemas.microsoft.com/office/drawing/2014/main" id="{921525B8-7C81-DA4D-BFFB-3DAE4BB0AD61}"/>
+              </a:ext>
+            </a:extLst>
+          </p:cNvPr>
+          <p:cNvSpPr/>
+          <p:nvPr/>
+        </p:nvSpPr>
+        <p:spPr>
+          <a:xfrm rot="16200000">
+            <a:off x="7896810" y="1412031"/>
+            <a:ext cx="180393" cy="354566"/>
+          </a:xfrm>
+          <a:prstGeom prst="rightBrace">
+            <a:avLst/>
+          </a:prstGeom>
+          <a:ln w="19050">
+            <a:solidFill>
+              <a:schemeClr val="bg1"/>
+            </a:solidFill>
+          </a:ln>
+        </p:spPr>
+        <p:style>
+          <a:lnRef idx="1">
+            <a:schemeClr val="accent1"/>
+          </a:lnRef>
+          <a:fillRef idx="0">
+            <a:schemeClr val="accent1"/>
+          </a:fillRef>
+          <a:effectRef idx="0">
+            <a:schemeClr val="accent1"/>
+          </a:effectRef>
+          <a:fontRef idx="minor">
+            <a:schemeClr val="tx1"/>
+          </a:fontRef>
+        </p:style>
+        <p:txBody>
+          <a:bodyPr rtlCol="0" anchor="ctr"/>
+          <a:lstStyle/>
+          <a:p>
+            <a:pPr algn="ctr"/>
+            <a:endParaRPr lang="ru-RU"/>
+          </a:p>
+        </p:txBody>
+      </p:sp>
+      <p:sp>
+        <p:nvSpPr>
+          <p:cNvPr id="11" name="Прямоугольник 10">
+            <a:extLst>
+              <a:ext uri="{FF2B5EF4-FFF2-40B4-BE49-F238E27FC236}">
+                <a16:creationId xmlns:a16="http://schemas.microsoft.com/office/drawing/2014/main" id="{F8C517F0-7826-DFC2-215B-3E6854FCEA8A}"/>
+              </a:ext>
+            </a:extLst>
+          </p:cNvPr>
+          <p:cNvSpPr/>
+          <p:nvPr/>
+        </p:nvSpPr>
+        <p:spPr>
+          <a:xfrm>
+            <a:off x="7570333" y="1114231"/>
+            <a:ext cx="821094" cy="466530"/>
+          </a:xfrm>
+          <a:prstGeom prst="rect">
+            <a:avLst/>
+          </a:prstGeom>
+          <a:noFill/>
+          <a:ln>
+            <a:noFill/>
+          </a:ln>
+        </p:spPr>
+        <p:style>
+          <a:lnRef idx="2">
+            <a:schemeClr val="accent1">
+              <a:shade val="15000"/>
+            </a:schemeClr>
+          </a:lnRef>
+          <a:fillRef idx="1">
+            <a:schemeClr val="accent1"/>
+          </a:fillRef>
+          <a:effectRef idx="0">
+            <a:schemeClr val="accent1"/>
+          </a:effectRef>
+          <a:fontRef idx="minor">
+            <a:schemeClr val="lt1"/>
+          </a:fontRef>
+        </p:style>
+        <p:txBody>
+          <a:bodyPr rtlCol="0" anchor="ctr"/>
+          <a:lstStyle/>
+          <a:p>
+            <a:pPr algn="ctr"/>
+            <a:r>
+              <a:rPr lang="en-US" dirty="0" err="1"/>
+              <a:t>dE</a:t>
+            </a:r>
+            <a:endParaRPr lang="ru-RU" dirty="0"/>
+          </a:p>
+        </p:txBody>
+      </p:sp>
+      <p:sp>
+        <p:nvSpPr>
+          <p:cNvPr id="2" name="Прямоугольник 1">
+            <a:extLst>
+              <a:ext uri="{FF2B5EF4-FFF2-40B4-BE49-F238E27FC236}">
+                <a16:creationId xmlns:a16="http://schemas.microsoft.com/office/drawing/2014/main" id="{D58AEE49-3B7F-EBEC-E997-AF009D683D03}"/>
+              </a:ext>
+            </a:extLst>
+          </p:cNvPr>
+          <p:cNvSpPr/>
+          <p:nvPr/>
+        </p:nvSpPr>
+        <p:spPr>
+          <a:xfrm>
+            <a:off x="6925485" y="6040111"/>
+            <a:ext cx="498763" cy="304800"/>
+          </a:xfrm>
+          <a:prstGeom prst="rect">
+            <a:avLst/>
+          </a:prstGeom>
+          <a:solidFill>
+            <a:schemeClr val="bg1"/>
+          </a:solidFill>
+          <a:ln>
+            <a:noFill/>
+          </a:ln>
+        </p:spPr>
+        <p:style>
+          <a:lnRef idx="2">
+            <a:schemeClr val="accent1">
+              <a:shade val="15000"/>
+            </a:schemeClr>
+          </a:lnRef>
+          <a:fillRef idx="1">
+            <a:schemeClr val="accent1"/>
+          </a:fillRef>
+          <a:effectRef idx="0">
+            <a:schemeClr val="accent1"/>
+          </a:effectRef>
+          <a:fontRef idx="minor">
+            <a:schemeClr val="lt1"/>
+          </a:fontRef>
+        </p:style>
+        <p:txBody>
+          <a:bodyPr rtlCol="0" anchor="ctr"/>
+          <a:lstStyle/>
+          <a:p>
+            <a:pPr algn="ctr"/>
+            <a:endParaRPr lang="ru-RU" dirty="0"/>
+          </a:p>
+        </p:txBody>
+      </p:sp>
+    </p:spTree>
+    <p:extLst>
+      <p:ext uri="{BB962C8B-B14F-4D97-AF65-F5344CB8AC3E}">
+        <p14:creationId xmlns:p14="http://schemas.microsoft.com/office/powerpoint/2010/main" val="884970772"/>
+      </p:ext>
+    </p:extLst>
+  </p:cSld>
+  <p:clrMapOvr>
+    <a:masterClrMapping/>
+  </p:clrMapOvr>
+</p:sld>
+</file>
+
+<file path=ppt/slides/slide6.xml><?xml version="1.0" encoding="utf-8"?>
+<p:sld xmlns:a="http://schemas.openxmlformats.org/drawingml/2006/main" xmlns:r="http://schemas.openxmlformats.org/officeDocument/2006/relationships" xmlns:p="http://schemas.openxmlformats.org/presentationml/2006/main">
+  <p:cSld>
+    <p:spTree>
+      <p:nvGrpSpPr>
+        <p:cNvPr id="1" name=""/>
+        <p:cNvGrpSpPr/>
+        <p:nvPr/>
+      </p:nvGrpSpPr>
+      <p:grpSpPr>
+        <a:xfrm>
+          <a:off x="0" y="0"/>
+          <a:ext cx="0" cy="0"/>
+          <a:chOff x="0" y="0"/>
+          <a:chExt cx="0" cy="0"/>
+        </a:xfrm>
+      </p:grpSpPr>
+      <p:sp>
+        <p:nvSpPr>
+          <p:cNvPr id="3" name="Прямоугольник 2">
+            <a:extLst>
+              <a:ext uri="{FF2B5EF4-FFF2-40B4-BE49-F238E27FC236}">
+                <a16:creationId xmlns:a16="http://schemas.microsoft.com/office/drawing/2014/main" id="{9EF7AB93-8556-22E2-467F-0FB3C6F234F6}"/>
+              </a:ext>
+            </a:extLst>
+          </p:cNvPr>
+          <p:cNvSpPr/>
+          <p:nvPr/>
+        </p:nvSpPr>
+        <p:spPr>
+          <a:xfrm>
+            <a:off x="1196110" y="3276600"/>
+            <a:ext cx="498763" cy="304800"/>
+          </a:xfrm>
+          <a:prstGeom prst="rect">
+            <a:avLst/>
+          </a:prstGeom>
+          <a:solidFill>
+            <a:schemeClr val="bg1"/>
+          </a:solidFill>
+          <a:ln>
+            <a:noFill/>
+          </a:ln>
+        </p:spPr>
+        <p:style>
+          <a:lnRef idx="2">
+            <a:schemeClr val="accent1">
+              <a:shade val="15000"/>
+            </a:schemeClr>
+          </a:lnRef>
+          <a:fillRef idx="1">
+            <a:schemeClr val="accent1"/>
+          </a:fillRef>
+          <a:effectRef idx="0">
+            <a:schemeClr val="accent1"/>
+          </a:effectRef>
+          <a:fontRef idx="minor">
+            <a:schemeClr val="lt1"/>
+          </a:fontRef>
+        </p:style>
+        <p:txBody>
+          <a:bodyPr rtlCol="0" anchor="ctr"/>
+          <a:lstStyle/>
+          <a:p>
+            <a:pPr algn="ctr"/>
+            <a:endParaRPr lang="ru-RU" dirty="0"/>
+          </a:p>
+        </p:txBody>
+      </p:sp>
+      <p:grpSp>
+        <p:nvGrpSpPr>
+          <p:cNvPr id="12" name="Группа 11">
+            <a:extLst>
+              <a:ext uri="{FF2B5EF4-FFF2-40B4-BE49-F238E27FC236}">
+                <a16:creationId xmlns:a16="http://schemas.microsoft.com/office/drawing/2014/main" id="{B3CB87F2-B7C8-AFCE-AABD-5B1FDCA0B9E7}"/>
+              </a:ext>
+            </a:extLst>
+          </p:cNvPr>
+          <p:cNvGrpSpPr/>
+          <p:nvPr/>
+        </p:nvGrpSpPr>
+        <p:grpSpPr>
+          <a:xfrm>
+            <a:off x="2491274" y="625151"/>
+            <a:ext cx="7063274" cy="5803642"/>
+            <a:chOff x="2491274" y="625151"/>
+            <a:chExt cx="7063274" cy="5803642"/>
+          </a:xfrm>
+        </p:grpSpPr>
+        <p:grpSp>
+          <p:nvGrpSpPr>
+            <p:cNvPr id="5" name="Группа 4">
+              <a:extLst>
+                <a:ext uri="{FF2B5EF4-FFF2-40B4-BE49-F238E27FC236}">
+                  <a16:creationId xmlns:a16="http://schemas.microsoft.com/office/drawing/2014/main" id="{58566BF0-683A-CA40-B16E-C8F293D53549}"/>
+                </a:ext>
+              </a:extLst>
+            </p:cNvPr>
+            <p:cNvGrpSpPr/>
+            <p:nvPr/>
+          </p:nvGrpSpPr>
+          <p:grpSpPr>
+            <a:xfrm>
+              <a:off x="2491274" y="625151"/>
+              <a:ext cx="7063274" cy="5803642"/>
+              <a:chOff x="2491274" y="625151"/>
+              <a:chExt cx="7063274" cy="5803642"/>
+            </a:xfrm>
+          </p:grpSpPr>
+          <p:pic>
+            <p:nvPicPr>
+              <p:cNvPr id="4" name="Рисунок 3" descr="Изображение выглядит как текст, Прямоугольник, снимок экрана, диаграмма&#10;&#10;Автоматически созданное описание">
+                <a:extLst>
+                  <a:ext uri="{FF2B5EF4-FFF2-40B4-BE49-F238E27FC236}">
+                    <a16:creationId xmlns:a16="http://schemas.microsoft.com/office/drawing/2014/main" id="{FD52026B-B41D-E7C3-72E3-4A5A4676C2FB}"/>
+                  </a:ext>
+                </a:extLst>
+              </p:cNvPr>
+              <p:cNvPicPr>
+                <a:picLocks noChangeAspect="1"/>
+              </p:cNvPicPr>
+              <p:nvPr/>
+            </p:nvPicPr>
+            <p:blipFill rotWithShape="1">
+              <a:blip r:embed="rId2" cstate="print">
+                <a:extLst>
+                  <a:ext uri="{28A0092B-C50C-407E-A947-70E740481C1C}">
+                    <a14:useLocalDpi xmlns:a14="http://schemas.microsoft.com/office/drawing/2010/main" val="0"/>
+                  </a:ext>
+                </a:extLst>
+              </a:blip>
+              <a:srcRect l="8414" t="9115" r="12755" b="6259"/>
+              <a:stretch/>
+            </p:blipFill>
+            <p:spPr>
+              <a:xfrm>
+                <a:off x="2491274" y="625151"/>
+                <a:ext cx="7063274" cy="5803642"/>
+              </a:xfrm>
+              <a:prstGeom prst="rect">
+                <a:avLst/>
+              </a:prstGeom>
+            </p:spPr>
+          </p:pic>
+          <p:sp>
+            <p:nvSpPr>
+              <p:cNvPr id="8" name="Правая фигурная скобка 7">
+                <a:extLst>
+                  <a:ext uri="{FF2B5EF4-FFF2-40B4-BE49-F238E27FC236}">
+                    <a16:creationId xmlns:a16="http://schemas.microsoft.com/office/drawing/2014/main" id="{218C3339-A376-50C6-D9C1-8D4F7A53647F}"/>
+                  </a:ext>
+                </a:extLst>
+              </p:cNvPr>
+              <p:cNvSpPr/>
+              <p:nvPr/>
+            </p:nvSpPr>
+            <p:spPr>
+              <a:xfrm rot="16200000">
+                <a:off x="7037712" y="1768835"/>
+                <a:ext cx="178835" cy="594237"/>
+              </a:xfrm>
+              <a:prstGeom prst="rightBrace">
+                <a:avLst/>
+              </a:prstGeom>
+              <a:ln w="19050">
+                <a:solidFill>
+                  <a:schemeClr val="bg1"/>
+                </a:solidFill>
+              </a:ln>
+            </p:spPr>
+            <p:style>
+              <a:lnRef idx="1">
+                <a:schemeClr val="accent1"/>
+              </a:lnRef>
+              <a:fillRef idx="0">
+                <a:schemeClr val="accent1"/>
+              </a:fillRef>
+              <a:effectRef idx="0">
+                <a:schemeClr val="accent1"/>
+              </a:effectRef>
+              <a:fontRef idx="minor">
+                <a:schemeClr val="tx1"/>
+              </a:fontRef>
+            </p:style>
+            <p:txBody>
+              <a:bodyPr rtlCol="0" anchor="ctr"/>
+              <a:lstStyle/>
+              <a:p>
+                <a:pPr algn="ctr"/>
+                <a:endParaRPr lang="ru-RU"/>
+              </a:p>
+            </p:txBody>
+          </p:sp>
+          <p:sp>
+            <p:nvSpPr>
+              <p:cNvPr id="9" name="Прямоугольник 8">
+                <a:extLst>
+                  <a:ext uri="{FF2B5EF4-FFF2-40B4-BE49-F238E27FC236}">
+                    <a16:creationId xmlns:a16="http://schemas.microsoft.com/office/drawing/2014/main" id="{300EEAEA-EA81-4B01-6A79-6970B5FD8EF7}"/>
+                  </a:ext>
+                </a:extLst>
+              </p:cNvPr>
+              <p:cNvSpPr/>
+              <p:nvPr/>
+            </p:nvSpPr>
+            <p:spPr>
+              <a:xfrm>
+                <a:off x="6716582" y="1552769"/>
+                <a:ext cx="821094" cy="466530"/>
+              </a:xfrm>
+              <a:prstGeom prst="rect">
+                <a:avLst/>
+              </a:prstGeom>
+              <a:noFill/>
+              <a:ln>
+                <a:noFill/>
+              </a:ln>
+            </p:spPr>
+            <p:style>
+              <a:lnRef idx="2">
+                <a:schemeClr val="accent1">
+                  <a:shade val="15000"/>
+                </a:schemeClr>
+              </a:lnRef>
+              <a:fillRef idx="1">
+                <a:schemeClr val="accent1"/>
+              </a:fillRef>
+              <a:effectRef idx="0">
+                <a:schemeClr val="accent1"/>
+              </a:effectRef>
+              <a:fontRef idx="minor">
+                <a:schemeClr val="lt1"/>
+              </a:fontRef>
+            </p:style>
+            <p:txBody>
+              <a:bodyPr rtlCol="0" anchor="ctr"/>
+              <a:lstStyle/>
+              <a:p>
+                <a:pPr algn="ctr"/>
+                <a:r>
+                  <a:rPr lang="en-US" dirty="0"/>
+                  <a:t>Estep</a:t>
+                </a:r>
+                <a:endParaRPr lang="ru-RU" dirty="0"/>
+              </a:p>
+            </p:txBody>
+          </p:sp>
+          <p:sp>
+            <p:nvSpPr>
+              <p:cNvPr id="10" name="Правая фигурная скобка 9">
+                <a:extLst>
+                  <a:ext uri="{FF2B5EF4-FFF2-40B4-BE49-F238E27FC236}">
+                    <a16:creationId xmlns:a16="http://schemas.microsoft.com/office/drawing/2014/main" id="{921525B8-7C81-DA4D-BFFB-3DAE4BB0AD61}"/>
+                  </a:ext>
+                </a:extLst>
+              </p:cNvPr>
+              <p:cNvSpPr/>
+              <p:nvPr/>
+            </p:nvSpPr>
+            <p:spPr>
+              <a:xfrm rot="16200000">
+                <a:off x="7887483" y="1365377"/>
+                <a:ext cx="199054" cy="541181"/>
+              </a:xfrm>
+              <a:prstGeom prst="rightBrace">
+                <a:avLst/>
+              </a:prstGeom>
+              <a:ln w="19050">
+                <a:solidFill>
+                  <a:schemeClr val="bg1"/>
+                </a:solidFill>
+              </a:ln>
+            </p:spPr>
+            <p:style>
+              <a:lnRef idx="1">
+                <a:schemeClr val="accent1"/>
+              </a:lnRef>
+              <a:fillRef idx="0">
+                <a:schemeClr val="accent1"/>
+              </a:fillRef>
+              <a:effectRef idx="0">
+                <a:schemeClr val="accent1"/>
+              </a:effectRef>
+              <a:fontRef idx="minor">
+                <a:schemeClr val="tx1"/>
+              </a:fontRef>
+            </p:style>
+            <p:txBody>
+              <a:bodyPr rtlCol="0" anchor="ctr"/>
+              <a:lstStyle/>
+              <a:p>
+                <a:pPr algn="ctr"/>
+                <a:endParaRPr lang="ru-RU"/>
+              </a:p>
+            </p:txBody>
+          </p:sp>
+          <p:sp>
+            <p:nvSpPr>
+              <p:cNvPr id="11" name="Прямоугольник 10">
+                <a:extLst>
+                  <a:ext uri="{FF2B5EF4-FFF2-40B4-BE49-F238E27FC236}">
+                    <a16:creationId xmlns:a16="http://schemas.microsoft.com/office/drawing/2014/main" id="{F8C517F0-7826-DFC2-215B-3E6854FCEA8A}"/>
+                  </a:ext>
+                </a:extLst>
+              </p:cNvPr>
+              <p:cNvSpPr/>
+              <p:nvPr/>
+            </p:nvSpPr>
+            <p:spPr>
+              <a:xfrm>
+                <a:off x="7561002" y="1142224"/>
+                <a:ext cx="821094" cy="466530"/>
+              </a:xfrm>
+              <a:prstGeom prst="rect">
+                <a:avLst/>
+              </a:prstGeom>
+              <a:noFill/>
+              <a:ln>
+                <a:noFill/>
+              </a:ln>
+            </p:spPr>
+            <p:style>
+              <a:lnRef idx="2">
+                <a:schemeClr val="accent1">
+                  <a:shade val="15000"/>
+                </a:schemeClr>
+              </a:lnRef>
+              <a:fillRef idx="1">
+                <a:schemeClr val="accent1"/>
+              </a:fillRef>
+              <a:effectRef idx="0">
+                <a:schemeClr val="accent1"/>
+              </a:effectRef>
+              <a:fontRef idx="minor">
+                <a:schemeClr val="lt1"/>
+              </a:fontRef>
+            </p:style>
+            <p:txBody>
+              <a:bodyPr rtlCol="0" anchor="ctr"/>
+              <a:lstStyle/>
+              <a:p>
+                <a:pPr algn="ctr"/>
+                <a:r>
+                  <a:rPr lang="en-US" dirty="0" err="1"/>
+                  <a:t>dE</a:t>
+                </a:r>
+                <a:endParaRPr lang="ru-RU" dirty="0"/>
+              </a:p>
+            </p:txBody>
+          </p:sp>
+        </p:grpSp>
+        <p:sp>
+          <p:nvSpPr>
+            <p:cNvPr id="2" name="Прямоугольник 1">
+              <a:extLst>
+                <a:ext uri="{FF2B5EF4-FFF2-40B4-BE49-F238E27FC236}">
+                  <a16:creationId xmlns:a16="http://schemas.microsoft.com/office/drawing/2014/main" id="{EC5B39C4-624B-CA05-6CEA-9138E76C1117}"/>
+                </a:ext>
+              </a:extLst>
+            </p:cNvPr>
+            <p:cNvSpPr/>
+            <p:nvPr/>
+          </p:nvSpPr>
+          <p:spPr>
+            <a:xfrm>
+              <a:off x="6973455" y="6114473"/>
+              <a:ext cx="498763" cy="304800"/>
+            </a:xfrm>
+            <a:prstGeom prst="rect">
+              <a:avLst/>
+            </a:prstGeom>
+            <a:solidFill>
+              <a:schemeClr val="bg1"/>
+            </a:solidFill>
+            <a:ln>
+              <a:noFill/>
+            </a:ln>
+          </p:spPr>
+          <p:style>
+            <a:lnRef idx="2">
+              <a:schemeClr val="accent1">
+                <a:shade val="15000"/>
+              </a:schemeClr>
+            </a:lnRef>
+            <a:fillRef idx="1">
+              <a:schemeClr val="accent1"/>
+            </a:fillRef>
+            <a:effectRef idx="0">
+              <a:schemeClr val="accent1"/>
+            </a:effectRef>
+            <a:fontRef idx="minor">
+              <a:schemeClr val="lt1"/>
+            </a:fontRef>
+          </p:style>
+          <p:txBody>
+            <a:bodyPr rtlCol="0" anchor="ctr"/>
+            <a:lstStyle/>
+            <a:p>
+              <a:pPr algn="ctr"/>
+              <a:endParaRPr lang="ru-RU" dirty="0"/>
+            </a:p>
+          </p:txBody>
+        </p:sp>
+        <p:sp>
+          <p:nvSpPr>
+            <p:cNvPr id="6" name="Прямоугольник 5">
+              <a:extLst>
+                <a:ext uri="{FF2B5EF4-FFF2-40B4-BE49-F238E27FC236}">
+                  <a16:creationId xmlns:a16="http://schemas.microsoft.com/office/drawing/2014/main" id="{39362B61-C5F9-CE6F-7BDA-A06EE44BA6F9}"/>
+                </a:ext>
+              </a:extLst>
+            </p:cNvPr>
+            <p:cNvSpPr/>
+            <p:nvPr/>
+          </p:nvSpPr>
+          <p:spPr>
+            <a:xfrm>
+              <a:off x="3900337" y="1298837"/>
+              <a:ext cx="1419807" cy="436658"/>
+            </a:xfrm>
+            <a:prstGeom prst="rect">
+              <a:avLst/>
+            </a:prstGeom>
+            <a:solidFill>
+              <a:schemeClr val="bg1"/>
+            </a:solidFill>
+            <a:ln>
+              <a:noFill/>
+            </a:ln>
+          </p:spPr>
+          <p:style>
+            <a:lnRef idx="2">
+              <a:schemeClr val="accent1">
+                <a:shade val="15000"/>
+              </a:schemeClr>
+            </a:lnRef>
+            <a:fillRef idx="1">
+              <a:schemeClr val="accent1"/>
+            </a:fillRef>
+            <a:effectRef idx="0">
+              <a:schemeClr val="accent1"/>
+            </a:effectRef>
+            <a:fontRef idx="minor">
+              <a:schemeClr val="lt1"/>
+            </a:fontRef>
+          </p:style>
+          <p:txBody>
+            <a:bodyPr rtlCol="0" anchor="ctr"/>
+            <a:lstStyle/>
+            <a:p>
+              <a:pPr algn="r"/>
+              <a:r>
+                <a:rPr lang="en-US" sz="2400" dirty="0" err="1">
+                  <a:solidFill>
+                    <a:schemeClr val="tx1"/>
+                  </a:solidFill>
+                </a:rPr>
+                <a:t>dE</a:t>
+              </a:r>
+              <a:r>
+                <a:rPr lang="en-US" sz="2400" dirty="0">
+                  <a:solidFill>
+                    <a:schemeClr val="tx1"/>
+                  </a:solidFill>
+                </a:rPr>
+                <a:t>=Estep</a:t>
+              </a:r>
+              <a:endParaRPr lang="ru-RU" sz="2400" dirty="0">
+                <a:solidFill>
+                  <a:schemeClr val="tx1"/>
+                </a:solidFill>
+              </a:endParaRPr>
+            </a:p>
+          </p:txBody>
+        </p:sp>
+      </p:grpSp>
+    </p:spTree>
+    <p:extLst>
+      <p:ext uri="{BB962C8B-B14F-4D97-AF65-F5344CB8AC3E}">
+        <p14:creationId xmlns:p14="http://schemas.microsoft.com/office/powerpoint/2010/main" val="1309980855"/>
       </p:ext>
     </p:extLst>
   </p:cSld>

</xml_diff>